<commit_message>
adding todo slides on content to add
</commit_message>
<xml_diff>
--- a/server/presentations/02_SDKs.pptx
+++ b/server/presentations/02_SDKs.pptx
@@ -5,37 +5,40 @@
     <p:sldMasterId id="2147483648" r:id="rId1"/>
   </p:sldMasterIdLst>
   <p:notesMasterIdLst>
-    <p:notesMasterId r:id="rId27"/>
+    <p:notesMasterId r:id="rId30"/>
   </p:notesMasterIdLst>
   <p:handoutMasterIdLst>
-    <p:handoutMasterId r:id="rId28"/>
+    <p:handoutMasterId r:id="rId31"/>
   </p:handoutMasterIdLst>
   <p:sldIdLst>
     <p:sldId id="282" r:id="rId2"/>
     <p:sldId id="256" r:id="rId3"/>
     <p:sldId id="286" r:id="rId4"/>
     <p:sldId id="283" r:id="rId5"/>
-    <p:sldId id="285" r:id="rId6"/>
-    <p:sldId id="284" r:id="rId7"/>
-    <p:sldId id="287" r:id="rId8"/>
-    <p:sldId id="288" r:id="rId9"/>
-    <p:sldId id="289" r:id="rId10"/>
-    <p:sldId id="290" r:id="rId11"/>
-    <p:sldId id="291" r:id="rId12"/>
-    <p:sldId id="292" r:id="rId13"/>
-    <p:sldId id="267" r:id="rId14"/>
-    <p:sldId id="279" r:id="rId15"/>
-    <p:sldId id="280" r:id="rId16"/>
-    <p:sldId id="281" r:id="rId17"/>
-    <p:sldId id="264" r:id="rId18"/>
-    <p:sldId id="270" r:id="rId19"/>
-    <p:sldId id="276" r:id="rId20"/>
-    <p:sldId id="277" r:id="rId21"/>
-    <p:sldId id="272" r:id="rId22"/>
-    <p:sldId id="275" r:id="rId23"/>
-    <p:sldId id="273" r:id="rId24"/>
-    <p:sldId id="274" r:id="rId25"/>
-    <p:sldId id="269" r:id="rId26"/>
+    <p:sldId id="296" r:id="rId6"/>
+    <p:sldId id="285" r:id="rId7"/>
+    <p:sldId id="295" r:id="rId8"/>
+    <p:sldId id="284" r:id="rId9"/>
+    <p:sldId id="294" r:id="rId10"/>
+    <p:sldId id="287" r:id="rId11"/>
+    <p:sldId id="288" r:id="rId12"/>
+    <p:sldId id="289" r:id="rId13"/>
+    <p:sldId id="290" r:id="rId14"/>
+    <p:sldId id="291" r:id="rId15"/>
+    <p:sldId id="292" r:id="rId16"/>
+    <p:sldId id="267" r:id="rId17"/>
+    <p:sldId id="279" r:id="rId18"/>
+    <p:sldId id="280" r:id="rId19"/>
+    <p:sldId id="281" r:id="rId20"/>
+    <p:sldId id="264" r:id="rId21"/>
+    <p:sldId id="270" r:id="rId22"/>
+    <p:sldId id="276" r:id="rId23"/>
+    <p:sldId id="277" r:id="rId24"/>
+    <p:sldId id="272" r:id="rId25"/>
+    <p:sldId id="275" r:id="rId26"/>
+    <p:sldId id="273" r:id="rId27"/>
+    <p:sldId id="274" r:id="rId28"/>
+    <p:sldId id="269" r:id="rId29"/>
   </p:sldIdLst>
   <p:sldSz cx="9144000" cy="5143500" type="screen16x9"/>
   <p:notesSz cx="6858000" cy="9144000"/>
@@ -4724,6 +4727,1355 @@
       </p:grpSpPr>
       <p:sp>
         <p:nvSpPr>
+          <p:cNvPr id="2" name="Content Placeholder 1"/>
+          <p:cNvSpPr>
+            <a:spLocks noGrp="1"/>
+          </p:cNvSpPr>
+          <p:nvPr>
+            <p:ph idx="1"/>
+          </p:nvPr>
+        </p:nvSpPr>
+        <p:spPr>
+          <a:xfrm>
+            <a:off x="466344" y="685800"/>
+            <a:ext cx="7998595" cy="2128520"/>
+          </a:xfrm>
+        </p:spPr>
+        <p:txBody>
+          <a:bodyPr/>
+          <a:lstStyle/>
+          <a:p>
+            <a:pPr marL="285750" indent="-285750">
+              <a:buFont typeface="Wingdings" charset="2"/>
+              <a:buChar char="§"/>
+            </a:pPr>
+            <a:r>
+              <a:rPr lang="en-US" dirty="0" smtClean="0"/>
+              <a:t>Documents are integral to the </a:t>
+            </a:r>
+            <a:r>
+              <a:rPr lang="en-US" dirty="0" smtClean="0"/>
+              <a:t>SDKs</a:t>
+            </a:r>
+            <a:endParaRPr lang="en-US" dirty="0" smtClean="0"/>
+          </a:p>
+          <a:p>
+            <a:pPr marL="285750" indent="-285750">
+              <a:buFont typeface="Wingdings" charset="2"/>
+              <a:buChar char="§"/>
+            </a:pPr>
+            <a:r>
+              <a:rPr lang="en-US" dirty="0" smtClean="0"/>
+              <a:t>There are many implementations, depending on the content type.</a:t>
+            </a:r>
+          </a:p>
+          <a:p>
+            <a:pPr marL="285750" indent="-285750">
+              <a:buFont typeface="Wingdings" charset="2"/>
+              <a:buChar char="§"/>
+            </a:pPr>
+            <a:endParaRPr lang="en-US" dirty="0"/>
+          </a:p>
+          <a:p>
+            <a:pPr marL="285750" indent="-285750">
+              <a:buFont typeface="Wingdings" charset="2"/>
+              <a:buChar char="§"/>
+            </a:pPr>
+            <a:r>
+              <a:rPr lang="en-US" dirty="0" smtClean="0"/>
+              <a:t>A Document contains:</a:t>
+            </a:r>
+          </a:p>
+          <a:p>
+            <a:pPr marL="285750" indent="-285750">
+              <a:buFont typeface="Wingdings" charset="2"/>
+              <a:buChar char="§"/>
+            </a:pPr>
+            <a:endParaRPr lang="en-US" dirty="0"/>
+          </a:p>
+        </p:txBody>
+      </p:sp>
+      <p:sp>
+        <p:nvSpPr>
+          <p:cNvPr id="3" name="Title 2"/>
+          <p:cNvSpPr>
+            <a:spLocks noGrp="1"/>
+          </p:cNvSpPr>
+          <p:nvPr>
+            <p:ph type="title"/>
+          </p:nvPr>
+        </p:nvSpPr>
+        <p:spPr/>
+        <p:txBody>
+          <a:bodyPr/>
+          <a:lstStyle/>
+          <a:p>
+            <a:r>
+              <a:rPr lang="en-US" dirty="0" smtClean="0"/>
+              <a:t>The Document</a:t>
+            </a:r>
+            <a:endParaRPr lang="en-US" dirty="0"/>
+          </a:p>
+        </p:txBody>
+      </p:sp>
+      <p:sp>
+        <p:nvSpPr>
+          <p:cNvPr id="6" name="TextBox 5"/>
+          <p:cNvSpPr txBox="1"/>
+          <p:nvPr/>
+        </p:nvSpPr>
+        <p:spPr>
+          <a:xfrm>
+            <a:off x="1241632" y="-1364650"/>
+            <a:ext cx="184666" cy="369332"/>
+          </a:xfrm>
+          <a:prstGeom prst="rect">
+            <a:avLst/>
+          </a:prstGeom>
+          <a:noFill/>
+        </p:spPr>
+        <p:txBody>
+          <a:bodyPr wrap="none" rtlCol="0">
+            <a:spAutoFit/>
+          </a:bodyPr>
+          <a:lstStyle/>
+          <a:p>
+            <a:endParaRPr lang="en-US" dirty="0" err="1">
+              <a:solidFill>
+                <a:srgbClr val="333333"/>
+              </a:solidFill>
+              <a:latin typeface="Arial"/>
+              <a:cs typeface="Arial"/>
+            </a:endParaRPr>
+          </a:p>
+        </p:txBody>
+      </p:sp>
+      <p:sp>
+        <p:nvSpPr>
+          <p:cNvPr id="7" name="Rectangle 6"/>
+          <p:cNvSpPr/>
+          <p:nvPr/>
+        </p:nvSpPr>
+        <p:spPr>
+          <a:xfrm>
+            <a:off x="2928734" y="-1895348"/>
+            <a:ext cx="2521175" cy="1222500"/>
+          </a:xfrm>
+          <a:prstGeom prst="rect">
+            <a:avLst/>
+          </a:prstGeom>
+          <a:solidFill>
+            <a:schemeClr val="accent1"/>
+          </a:solidFill>
+          <a:ln>
+            <a:noFill/>
+          </a:ln>
+          <a:effectLst/>
+        </p:spPr>
+        <p:style>
+          <a:lnRef idx="1">
+            <a:schemeClr val="accent1"/>
+          </a:lnRef>
+          <a:fillRef idx="3">
+            <a:schemeClr val="accent1"/>
+          </a:fillRef>
+          <a:effectRef idx="2">
+            <a:schemeClr val="accent1"/>
+          </a:effectRef>
+          <a:fontRef idx="minor">
+            <a:schemeClr val="lt1"/>
+          </a:fontRef>
+        </p:style>
+        <p:txBody>
+          <a:bodyPr rtlCol="0" anchor="ctr"/>
+          <a:lstStyle/>
+          <a:p>
+            <a:pPr algn="ctr"/>
+            <a:r>
+              <a:rPr lang="en-US" dirty="0" smtClean="0">
+                <a:solidFill>
+                  <a:srgbClr val="333333"/>
+                </a:solidFill>
+                <a:latin typeface="Arial"/>
+                <a:cs typeface="Arial"/>
+              </a:rPr>
+              <a:t>j</a:t>
+            </a:r>
+            <a:endParaRPr lang="en-US" dirty="0">
+              <a:solidFill>
+                <a:srgbClr val="333333"/>
+              </a:solidFill>
+              <a:latin typeface="Arial"/>
+              <a:cs typeface="Arial"/>
+            </a:endParaRPr>
+          </a:p>
+        </p:txBody>
+      </p:sp>
+      <p:graphicFrame>
+        <p:nvGraphicFramePr>
+          <p:cNvPr id="9" name="Table 4"/>
+          <p:cNvGraphicFramePr>
+            <a:graphicFrameLocks noGrp="1"/>
+          </p:cNvGraphicFramePr>
+          <p:nvPr>
+            <p:extLst>
+              <p:ext uri="{D42A27DB-BD31-4B8C-83A1-F6EECF244321}">
+                <p14:modId xmlns:p14="http://schemas.microsoft.com/office/powerpoint/2010/main" val="873057609"/>
+              </p:ext>
+            </p:extLst>
+          </p:nvPr>
+        </p:nvGraphicFramePr>
+        <p:xfrm>
+          <a:off x="1680836" y="2902382"/>
+          <a:ext cx="6233804" cy="1523999"/>
+        </p:xfrm>
+        <a:graphic>
+          <a:graphicData uri="http://schemas.openxmlformats.org/drawingml/2006/table">
+            <a:tbl>
+              <a:tblPr>
+                <a:tableStyleId>{5C22544A-7EE6-4342-B048-85BDC9FD1C3A}</a:tableStyleId>
+              </a:tblPr>
+              <a:tblGrid>
+                <a:gridCol w="2271404"/>
+                <a:gridCol w="3962400"/>
+              </a:tblGrid>
+              <a:tr h="205456">
+                <a:tc>
+                  <a:txBody>
+                    <a:bodyPr/>
+                    <a:lstStyle/>
+                    <a:p>
+                      <a:pPr algn="ctr"/>
+                      <a:r>
+                        <a:rPr lang="en-US" sz="1400" b="1" dirty="0" smtClean="0">
+                          <a:solidFill>
+                            <a:schemeClr val="bg1"/>
+                          </a:solidFill>
+                        </a:rPr>
+                        <a:t>Property</a:t>
+                      </a:r>
+                      <a:endParaRPr lang="en-US" sz="1400" b="1" dirty="0">
+                        <a:solidFill>
+                          <a:schemeClr val="bg1"/>
+                        </a:solidFill>
+                      </a:endParaRPr>
+                    </a:p>
+                  </a:txBody>
+                  <a:tcPr anchor="ctr">
+                    <a:lnL w="9525" cap="flat" cmpd="sng" algn="ctr">
+                      <a:solidFill>
+                        <a:srgbClr val="E40121"/>
+                      </a:solidFill>
+                      <a:prstDash val="solid"/>
+                      <a:round/>
+                      <a:headEnd type="none" w="med" len="med"/>
+                      <a:tailEnd type="none" w="med" len="med"/>
+                    </a:lnL>
+                    <a:lnR w="12700" cmpd="sng">
+                      <a:noFill/>
+                    </a:lnR>
+                    <a:lnT w="9525" cap="flat" cmpd="sng" algn="ctr">
+                      <a:solidFill>
+                        <a:srgbClr val="E40121"/>
+                      </a:solidFill>
+                      <a:prstDash val="solid"/>
+                      <a:round/>
+                      <a:headEnd type="none" w="med" len="med"/>
+                      <a:tailEnd type="none" w="med" len="med"/>
+                    </a:lnT>
+                    <a:lnB w="9525" cap="flat" cmpd="sng" algn="ctr">
+                      <a:solidFill>
+                        <a:srgbClr val="E40121"/>
+                      </a:solidFill>
+                      <a:prstDash val="solid"/>
+                      <a:round/>
+                      <a:headEnd type="none" w="med" len="med"/>
+                      <a:tailEnd type="none" w="med" len="med"/>
+                    </a:lnB>
+                    <a:solidFill>
+                      <a:srgbClr val="E40121"/>
+                    </a:solidFill>
+                  </a:tcPr>
+                </a:tc>
+                <a:tc>
+                  <a:txBody>
+                    <a:bodyPr/>
+                    <a:lstStyle/>
+                    <a:p>
+                      <a:pPr algn="ctr"/>
+                      <a:r>
+                        <a:rPr lang="en-US" sz="1400" b="1" dirty="0" smtClean="0">
+                          <a:solidFill>
+                            <a:schemeClr val="bg1"/>
+                          </a:solidFill>
+                        </a:rPr>
+                        <a:t>Desc</a:t>
+                      </a:r>
+                      <a:r>
+                        <a:rPr lang="en-US" sz="1400" b="1" baseline="0" dirty="0" smtClean="0">
+                          <a:solidFill>
+                            <a:schemeClr val="bg1"/>
+                          </a:solidFill>
+                        </a:rPr>
+                        <a:t>ription</a:t>
+                      </a:r>
+                      <a:endParaRPr lang="en-US" sz="1400" b="1" dirty="0">
+                        <a:solidFill>
+                          <a:schemeClr val="bg1"/>
+                        </a:solidFill>
+                      </a:endParaRPr>
+                    </a:p>
+                  </a:txBody>
+                  <a:tcPr anchor="ctr">
+                    <a:lnL w="12700" cmpd="sng">
+                      <a:noFill/>
+                    </a:lnL>
+                    <a:lnR w="12700" cmpd="sng">
+                      <a:noFill/>
+                    </a:lnR>
+                    <a:lnT w="9525" cap="flat" cmpd="sng" algn="ctr">
+                      <a:solidFill>
+                        <a:srgbClr val="E40121"/>
+                      </a:solidFill>
+                      <a:prstDash val="solid"/>
+                      <a:round/>
+                      <a:headEnd type="none" w="med" len="med"/>
+                      <a:tailEnd type="none" w="med" len="med"/>
+                    </a:lnT>
+                    <a:lnB w="9525" cap="flat" cmpd="sng" algn="ctr">
+                      <a:solidFill>
+                        <a:srgbClr val="E40121"/>
+                      </a:solidFill>
+                      <a:prstDash val="solid"/>
+                      <a:round/>
+                      <a:headEnd type="none" w="med" len="med"/>
+                      <a:tailEnd type="none" w="med" len="med"/>
+                    </a:lnB>
+                    <a:solidFill>
+                      <a:srgbClr val="E40121"/>
+                    </a:solidFill>
+                  </a:tcPr>
+                </a:tc>
+              </a:tr>
+              <a:tr h="205456">
+                <a:tc>
+                  <a:txBody>
+                    <a:bodyPr/>
+                    <a:lstStyle/>
+                    <a:p>
+                      <a:r>
+                        <a:rPr lang="en-US" sz="1400" b="1" dirty="0" smtClean="0">
+                          <a:solidFill>
+                            <a:schemeClr val="tx1"/>
+                          </a:solidFill>
+                        </a:rPr>
+                        <a:t>ID</a:t>
+                      </a:r>
+                      <a:endParaRPr lang="en-US" sz="1400" b="1" dirty="0">
+                        <a:solidFill>
+                          <a:schemeClr val="tx1"/>
+                        </a:solidFill>
+                      </a:endParaRPr>
+                    </a:p>
+                  </a:txBody>
+                  <a:tcPr anchor="ctr">
+                    <a:lnL w="9525" cap="flat" cmpd="sng" algn="ctr">
+                      <a:solidFill>
+                        <a:srgbClr val="E40121"/>
+                      </a:solidFill>
+                      <a:prstDash val="solid"/>
+                      <a:round/>
+                      <a:headEnd type="none" w="med" len="med"/>
+                      <a:tailEnd type="none" w="med" len="med"/>
+                    </a:lnL>
+                    <a:lnR w="9525" cap="flat" cmpd="sng" algn="ctr">
+                      <a:solidFill>
+                        <a:srgbClr val="E40121"/>
+                      </a:solidFill>
+                      <a:prstDash val="solid"/>
+                      <a:round/>
+                      <a:headEnd type="none" w="med" len="med"/>
+                      <a:tailEnd type="none" w="med" len="med"/>
+                    </a:lnR>
+                    <a:lnT w="9525" cap="flat" cmpd="sng" algn="ctr">
+                      <a:solidFill>
+                        <a:srgbClr val="E40121"/>
+                      </a:solidFill>
+                      <a:prstDash val="solid"/>
+                      <a:round/>
+                      <a:headEnd type="none" w="med" len="med"/>
+                      <a:tailEnd type="none" w="med" len="med"/>
+                    </a:lnT>
+                    <a:lnB w="9525" cap="flat" cmpd="sng" algn="ctr">
+                      <a:solidFill>
+                        <a:srgbClr val="E40121"/>
+                      </a:solidFill>
+                      <a:prstDash val="solid"/>
+                      <a:round/>
+                      <a:headEnd type="none" w="med" len="med"/>
+                      <a:tailEnd type="none" w="med" len="med"/>
+                    </a:lnB>
+                    <a:noFill/>
+                  </a:tcPr>
+                </a:tc>
+                <a:tc>
+                  <a:txBody>
+                    <a:bodyPr/>
+                    <a:lstStyle/>
+                    <a:p>
+                      <a:pPr marL="0" marR="0" indent="0" algn="l" defTabSz="457200" rtl="0" eaLnBrk="1" fontAlgn="auto" latinLnBrk="0" hangingPunct="1">
+                        <a:lnSpc>
+                          <a:spcPct val="100000"/>
+                        </a:lnSpc>
+                        <a:spcBef>
+                          <a:spcPts val="0"/>
+                        </a:spcBef>
+                        <a:spcAft>
+                          <a:spcPts val="0"/>
+                        </a:spcAft>
+                        <a:buClrTx/>
+                        <a:buSzTx/>
+                        <a:buFontTx/>
+                        <a:buNone/>
+                        <a:tabLst/>
+                        <a:defRPr/>
+                      </a:pPr>
+                      <a:r>
+                        <a:rPr lang="en-US" sz="1400" dirty="0" smtClean="0"/>
+                        <a:t>The bucket-unique identifier</a:t>
+                      </a:r>
+                    </a:p>
+                  </a:txBody>
+                  <a:tcPr>
+                    <a:lnL w="9525" cap="flat" cmpd="sng" algn="ctr">
+                      <a:solidFill>
+                        <a:srgbClr val="E40121"/>
+                      </a:solidFill>
+                      <a:prstDash val="solid"/>
+                      <a:round/>
+                      <a:headEnd type="none" w="med" len="med"/>
+                      <a:tailEnd type="none" w="med" len="med"/>
+                    </a:lnL>
+                    <a:lnR w="9525" cap="flat" cmpd="sng" algn="ctr">
+                      <a:solidFill>
+                        <a:srgbClr val="E40121"/>
+                      </a:solidFill>
+                      <a:prstDash val="solid"/>
+                      <a:round/>
+                      <a:headEnd type="none" w="med" len="med"/>
+                      <a:tailEnd type="none" w="med" len="med"/>
+                    </a:lnR>
+                    <a:lnT w="9525" cap="flat" cmpd="sng" algn="ctr">
+                      <a:solidFill>
+                        <a:srgbClr val="E40121"/>
+                      </a:solidFill>
+                      <a:prstDash val="solid"/>
+                      <a:round/>
+                      <a:headEnd type="none" w="med" len="med"/>
+                      <a:tailEnd type="none" w="med" len="med"/>
+                    </a:lnT>
+                    <a:lnB w="9525" cap="flat" cmpd="sng" algn="ctr">
+                      <a:solidFill>
+                        <a:srgbClr val="E40121"/>
+                      </a:solidFill>
+                      <a:prstDash val="solid"/>
+                      <a:round/>
+                      <a:headEnd type="none" w="med" len="med"/>
+                      <a:tailEnd type="none" w="med" len="med"/>
+                    </a:lnB>
+                    <a:noFill/>
+                  </a:tcPr>
+                </a:tc>
+              </a:tr>
+              <a:tr h="205456">
+                <a:tc>
+                  <a:txBody>
+                    <a:bodyPr/>
+                    <a:lstStyle/>
+                    <a:p>
+                      <a:r>
+                        <a:rPr lang="en-US" sz="1400" b="1" dirty="0" smtClean="0">
+                          <a:solidFill>
+                            <a:schemeClr val="tx1"/>
+                          </a:solidFill>
+                        </a:rPr>
+                        <a:t>Content</a:t>
+                      </a:r>
+                      <a:endParaRPr lang="en-US" sz="1400" b="1" dirty="0">
+                        <a:solidFill>
+                          <a:schemeClr val="tx1"/>
+                        </a:solidFill>
+                      </a:endParaRPr>
+                    </a:p>
+                  </a:txBody>
+                  <a:tcPr>
+                    <a:lnL w="9525" cap="flat" cmpd="sng" algn="ctr">
+                      <a:solidFill>
+                        <a:srgbClr val="E40121"/>
+                      </a:solidFill>
+                      <a:prstDash val="solid"/>
+                      <a:round/>
+                      <a:headEnd type="none" w="med" len="med"/>
+                      <a:tailEnd type="none" w="med" len="med"/>
+                    </a:lnL>
+                    <a:lnR w="9525" cap="flat" cmpd="sng" algn="ctr">
+                      <a:solidFill>
+                        <a:srgbClr val="E40121"/>
+                      </a:solidFill>
+                      <a:prstDash val="solid"/>
+                      <a:round/>
+                      <a:headEnd type="none" w="med" len="med"/>
+                      <a:tailEnd type="none" w="med" len="med"/>
+                    </a:lnR>
+                    <a:lnT w="9525" cap="flat" cmpd="sng" algn="ctr">
+                      <a:solidFill>
+                        <a:srgbClr val="E40121"/>
+                      </a:solidFill>
+                      <a:prstDash val="solid"/>
+                      <a:round/>
+                      <a:headEnd type="none" w="med" len="med"/>
+                      <a:tailEnd type="none" w="med" len="med"/>
+                    </a:lnT>
+                    <a:lnB w="9525" cap="flat" cmpd="sng" algn="ctr">
+                      <a:solidFill>
+                        <a:srgbClr val="E40121"/>
+                      </a:solidFill>
+                      <a:prstDash val="solid"/>
+                      <a:round/>
+                      <a:headEnd type="none" w="med" len="med"/>
+                      <a:tailEnd type="none" w="med" len="med"/>
+                    </a:lnB>
+                    <a:noFill/>
+                  </a:tcPr>
+                </a:tc>
+                <a:tc>
+                  <a:txBody>
+                    <a:bodyPr/>
+                    <a:lstStyle/>
+                    <a:p>
+                      <a:pPr marL="0" marR="0" indent="0" algn="l" defTabSz="457200" rtl="0" eaLnBrk="1" fontAlgn="auto" latinLnBrk="0" hangingPunct="1">
+                        <a:lnSpc>
+                          <a:spcPct val="100000"/>
+                        </a:lnSpc>
+                        <a:spcBef>
+                          <a:spcPts val="0"/>
+                        </a:spcBef>
+                        <a:spcAft>
+                          <a:spcPts val="0"/>
+                        </a:spcAft>
+                        <a:buClrTx/>
+                        <a:buSzTx/>
+                        <a:buFontTx/>
+                        <a:buNone/>
+                        <a:tabLst/>
+                        <a:defRPr/>
+                      </a:pPr>
+                      <a:r>
+                        <a:rPr lang="en-US" sz="1400" dirty="0" smtClean="0"/>
+                        <a:t>The value that is stored</a:t>
+                      </a:r>
+                    </a:p>
+                  </a:txBody>
+                  <a:tcPr>
+                    <a:lnL w="9525" cap="flat" cmpd="sng" algn="ctr">
+                      <a:solidFill>
+                        <a:srgbClr val="E40121"/>
+                      </a:solidFill>
+                      <a:prstDash val="solid"/>
+                      <a:round/>
+                      <a:headEnd type="none" w="med" len="med"/>
+                      <a:tailEnd type="none" w="med" len="med"/>
+                    </a:lnL>
+                    <a:lnR w="9525" cap="flat" cmpd="sng" algn="ctr">
+                      <a:solidFill>
+                        <a:srgbClr val="E40121"/>
+                      </a:solidFill>
+                      <a:prstDash val="solid"/>
+                      <a:round/>
+                      <a:headEnd type="none" w="med" len="med"/>
+                      <a:tailEnd type="none" w="med" len="med"/>
+                    </a:lnR>
+                    <a:lnT w="9525" cap="flat" cmpd="sng" algn="ctr">
+                      <a:solidFill>
+                        <a:srgbClr val="E40121"/>
+                      </a:solidFill>
+                      <a:prstDash val="solid"/>
+                      <a:round/>
+                      <a:headEnd type="none" w="med" len="med"/>
+                      <a:tailEnd type="none" w="med" len="med"/>
+                    </a:lnT>
+                    <a:lnB w="9525" cap="flat" cmpd="sng" algn="ctr">
+                      <a:solidFill>
+                        <a:srgbClr val="E40121"/>
+                      </a:solidFill>
+                      <a:prstDash val="solid"/>
+                      <a:round/>
+                      <a:headEnd type="none" w="med" len="med"/>
+                      <a:tailEnd type="none" w="med" len="med"/>
+                    </a:lnB>
+                    <a:noFill/>
+                  </a:tcPr>
+                </a:tc>
+              </a:tr>
+              <a:tr h="205456">
+                <a:tc>
+                  <a:txBody>
+                    <a:bodyPr/>
+                    <a:lstStyle/>
+                    <a:p>
+                      <a:r>
+                        <a:rPr lang="en-US" sz="1400" b="1" dirty="0" smtClean="0">
+                          <a:solidFill>
+                            <a:schemeClr val="tx1"/>
+                          </a:solidFill>
+                        </a:rPr>
+                        <a:t>Expiry</a:t>
+                      </a:r>
+                      <a:endParaRPr lang="en-US" sz="1400" b="1" dirty="0">
+                        <a:solidFill>
+                          <a:schemeClr val="tx1"/>
+                        </a:solidFill>
+                      </a:endParaRPr>
+                    </a:p>
+                  </a:txBody>
+                  <a:tcPr>
+                    <a:lnL w="9525" cap="flat" cmpd="sng" algn="ctr">
+                      <a:solidFill>
+                        <a:srgbClr val="E40121"/>
+                      </a:solidFill>
+                      <a:prstDash val="solid"/>
+                      <a:round/>
+                      <a:headEnd type="none" w="med" len="med"/>
+                      <a:tailEnd type="none" w="med" len="med"/>
+                    </a:lnL>
+                    <a:lnR w="9525" cap="flat" cmpd="sng" algn="ctr">
+                      <a:solidFill>
+                        <a:srgbClr val="E40121"/>
+                      </a:solidFill>
+                      <a:prstDash val="solid"/>
+                      <a:round/>
+                      <a:headEnd type="none" w="med" len="med"/>
+                      <a:tailEnd type="none" w="med" len="med"/>
+                    </a:lnR>
+                    <a:lnT w="9525" cap="flat" cmpd="sng" algn="ctr">
+                      <a:solidFill>
+                        <a:srgbClr val="E40121"/>
+                      </a:solidFill>
+                      <a:prstDash val="solid"/>
+                      <a:round/>
+                      <a:headEnd type="none" w="med" len="med"/>
+                      <a:tailEnd type="none" w="med" len="med"/>
+                    </a:lnT>
+                    <a:lnB w="9525" cap="flat" cmpd="sng" algn="ctr">
+                      <a:solidFill>
+                        <a:srgbClr val="E40121"/>
+                      </a:solidFill>
+                      <a:prstDash val="solid"/>
+                      <a:round/>
+                      <a:headEnd type="none" w="med" len="med"/>
+                      <a:tailEnd type="none" w="med" len="med"/>
+                    </a:lnB>
+                    <a:noFill/>
+                  </a:tcPr>
+                </a:tc>
+                <a:tc>
+                  <a:txBody>
+                    <a:bodyPr/>
+                    <a:lstStyle/>
+                    <a:p>
+                      <a:pPr marL="0" marR="0" indent="0" algn="l" defTabSz="457200" rtl="0" eaLnBrk="1" fontAlgn="auto" latinLnBrk="0" hangingPunct="1">
+                        <a:lnSpc>
+                          <a:spcPct val="100000"/>
+                        </a:lnSpc>
+                        <a:spcBef>
+                          <a:spcPts val="0"/>
+                        </a:spcBef>
+                        <a:spcAft>
+                          <a:spcPts val="0"/>
+                        </a:spcAft>
+                        <a:buClrTx/>
+                        <a:buSzTx/>
+                        <a:buFontTx/>
+                        <a:buNone/>
+                        <a:tabLst/>
+                        <a:defRPr/>
+                      </a:pPr>
+                      <a:r>
+                        <a:rPr lang="en-US" sz="1400" dirty="0" smtClean="0"/>
+                        <a:t>An expiration</a:t>
+                      </a:r>
+                      <a:r>
+                        <a:rPr lang="en-US" sz="1400" baseline="0" dirty="0" smtClean="0"/>
+                        <a:t> time</a:t>
+                      </a:r>
+                      <a:endParaRPr lang="en-US" sz="1400" dirty="0" smtClean="0"/>
+                    </a:p>
+                  </a:txBody>
+                  <a:tcPr>
+                    <a:lnL w="9525" cap="flat" cmpd="sng" algn="ctr">
+                      <a:solidFill>
+                        <a:srgbClr val="E40121"/>
+                      </a:solidFill>
+                      <a:prstDash val="solid"/>
+                      <a:round/>
+                      <a:headEnd type="none" w="med" len="med"/>
+                      <a:tailEnd type="none" w="med" len="med"/>
+                    </a:lnL>
+                    <a:lnR w="9525" cap="flat" cmpd="sng" algn="ctr">
+                      <a:solidFill>
+                        <a:srgbClr val="E40121"/>
+                      </a:solidFill>
+                      <a:prstDash val="solid"/>
+                      <a:round/>
+                      <a:headEnd type="none" w="med" len="med"/>
+                      <a:tailEnd type="none" w="med" len="med"/>
+                    </a:lnR>
+                    <a:lnT w="9525" cap="flat" cmpd="sng" algn="ctr">
+                      <a:solidFill>
+                        <a:srgbClr val="E40121"/>
+                      </a:solidFill>
+                      <a:prstDash val="solid"/>
+                      <a:round/>
+                      <a:headEnd type="none" w="med" len="med"/>
+                      <a:tailEnd type="none" w="med" len="med"/>
+                    </a:lnT>
+                    <a:lnB w="9525" cap="flat" cmpd="sng" algn="ctr">
+                      <a:solidFill>
+                        <a:srgbClr val="E40121"/>
+                      </a:solidFill>
+                      <a:prstDash val="solid"/>
+                      <a:round/>
+                      <a:headEnd type="none" w="med" len="med"/>
+                      <a:tailEnd type="none" w="med" len="med"/>
+                    </a:lnB>
+                    <a:noFill/>
+                  </a:tcPr>
+                </a:tc>
+              </a:tr>
+              <a:tr h="205456">
+                <a:tc>
+                  <a:txBody>
+                    <a:bodyPr/>
+                    <a:lstStyle/>
+                    <a:p>
+                      <a:r>
+                        <a:rPr lang="en-US" sz="1400" b="1" dirty="0" smtClean="0">
+                          <a:solidFill>
+                            <a:schemeClr val="tx1"/>
+                          </a:solidFill>
+                        </a:rPr>
+                        <a:t>CAS</a:t>
+                      </a:r>
+                      <a:endParaRPr lang="en-US" sz="1400" b="1" dirty="0">
+                        <a:solidFill>
+                          <a:schemeClr val="tx1"/>
+                        </a:solidFill>
+                      </a:endParaRPr>
+                    </a:p>
+                  </a:txBody>
+                  <a:tcPr>
+                    <a:lnL w="9525" cap="flat" cmpd="sng" algn="ctr">
+                      <a:solidFill>
+                        <a:srgbClr val="E40121"/>
+                      </a:solidFill>
+                      <a:prstDash val="solid"/>
+                      <a:round/>
+                      <a:headEnd type="none" w="med" len="med"/>
+                      <a:tailEnd type="none" w="med" len="med"/>
+                    </a:lnL>
+                    <a:lnR w="9525" cap="flat" cmpd="sng" algn="ctr">
+                      <a:solidFill>
+                        <a:srgbClr val="E40121"/>
+                      </a:solidFill>
+                      <a:prstDash val="solid"/>
+                      <a:round/>
+                      <a:headEnd type="none" w="med" len="med"/>
+                      <a:tailEnd type="none" w="med" len="med"/>
+                    </a:lnR>
+                    <a:lnT w="9525" cap="flat" cmpd="sng" algn="ctr">
+                      <a:solidFill>
+                        <a:srgbClr val="E40121"/>
+                      </a:solidFill>
+                      <a:prstDash val="solid"/>
+                      <a:round/>
+                      <a:headEnd type="none" w="med" len="med"/>
+                      <a:tailEnd type="none" w="med" len="med"/>
+                    </a:lnT>
+                    <a:lnB w="9525" cap="flat" cmpd="sng" algn="ctr">
+                      <a:solidFill>
+                        <a:srgbClr val="E40121"/>
+                      </a:solidFill>
+                      <a:prstDash val="solid"/>
+                      <a:round/>
+                      <a:headEnd type="none" w="med" len="med"/>
+                      <a:tailEnd type="none" w="med" len="med"/>
+                    </a:lnB>
+                    <a:noFill/>
+                  </a:tcPr>
+                </a:tc>
+                <a:tc>
+                  <a:txBody>
+                    <a:bodyPr/>
+                    <a:lstStyle/>
+                    <a:p>
+                      <a:pPr marL="0" marR="0" indent="0" algn="l" defTabSz="457200" rtl="0" eaLnBrk="1" fontAlgn="auto" latinLnBrk="0" hangingPunct="1">
+                        <a:lnSpc>
+                          <a:spcPct val="100000"/>
+                        </a:lnSpc>
+                        <a:spcBef>
+                          <a:spcPts val="0"/>
+                        </a:spcBef>
+                        <a:spcAft>
+                          <a:spcPts val="0"/>
+                        </a:spcAft>
+                        <a:buClrTx/>
+                        <a:buSzTx/>
+                        <a:buFontTx/>
+                        <a:buNone/>
+                        <a:tabLst/>
+                        <a:defRPr/>
+                      </a:pPr>
+                      <a:r>
+                        <a:rPr lang="en-US" sz="1400" dirty="0" smtClean="0"/>
+                        <a:t>The Compare-And-Swap</a:t>
+                      </a:r>
+                      <a:r>
+                        <a:rPr lang="en-US" sz="1400" baseline="0" dirty="0" smtClean="0"/>
+                        <a:t> identifier</a:t>
+                      </a:r>
+                      <a:endParaRPr lang="en-US" sz="1400" dirty="0" smtClean="0"/>
+                    </a:p>
+                  </a:txBody>
+                  <a:tcPr>
+                    <a:lnL w="9525" cap="flat" cmpd="sng" algn="ctr">
+                      <a:solidFill>
+                        <a:srgbClr val="E40121"/>
+                      </a:solidFill>
+                      <a:prstDash val="solid"/>
+                      <a:round/>
+                      <a:headEnd type="none" w="med" len="med"/>
+                      <a:tailEnd type="none" w="med" len="med"/>
+                    </a:lnL>
+                    <a:lnR w="9525" cap="flat" cmpd="sng" algn="ctr">
+                      <a:solidFill>
+                        <a:srgbClr val="E40121"/>
+                      </a:solidFill>
+                      <a:prstDash val="solid"/>
+                      <a:round/>
+                      <a:headEnd type="none" w="med" len="med"/>
+                      <a:tailEnd type="none" w="med" len="med"/>
+                    </a:lnR>
+                    <a:lnT w="9525" cap="flat" cmpd="sng" algn="ctr">
+                      <a:solidFill>
+                        <a:srgbClr val="E40121"/>
+                      </a:solidFill>
+                      <a:prstDash val="solid"/>
+                      <a:round/>
+                      <a:headEnd type="none" w="med" len="med"/>
+                      <a:tailEnd type="none" w="med" len="med"/>
+                    </a:lnT>
+                    <a:lnB w="9525" cap="flat" cmpd="sng" algn="ctr">
+                      <a:solidFill>
+                        <a:srgbClr val="E40121"/>
+                      </a:solidFill>
+                      <a:prstDash val="solid"/>
+                      <a:round/>
+                      <a:headEnd type="none" w="med" len="med"/>
+                      <a:tailEnd type="none" w="med" len="med"/>
+                    </a:lnB>
+                    <a:noFill/>
+                  </a:tcPr>
+                </a:tc>
+              </a:tr>
+            </a:tbl>
+          </a:graphicData>
+        </a:graphic>
+      </p:graphicFrame>
+    </p:spTree>
+    <p:extLst>
+      <p:ext uri="{BB962C8B-B14F-4D97-AF65-F5344CB8AC3E}">
+        <p14:creationId xmlns:p14="http://schemas.microsoft.com/office/powerpoint/2010/main" val="636974870"/>
+      </p:ext>
+    </p:extLst>
+  </p:cSld>
+  <p:clrMapOvr>
+    <a:masterClrMapping/>
+  </p:clrMapOvr>
+  <p:timing>
+    <p:tnLst>
+      <p:par>
+        <p:cTn xmlns:p14="http://schemas.microsoft.com/office/powerpoint/2010/main" id="1" dur="indefinite" restart="never" nodeType="tmRoot"/>
+      </p:par>
+    </p:tnLst>
+  </p:timing>
+</p:sld>
+</file>
+
+<file path=ppt/slides/slide11.xml><?xml version="1.0" encoding="utf-8"?>
+<p:sld xmlns:a="http://schemas.openxmlformats.org/drawingml/2006/main" xmlns:r="http://schemas.openxmlformats.org/officeDocument/2006/relationships" xmlns:p="http://schemas.openxmlformats.org/presentationml/2006/main">
+  <p:cSld>
+    <p:spTree>
+      <p:nvGrpSpPr>
+        <p:cNvPr id="1" name=""/>
+        <p:cNvGrpSpPr/>
+        <p:nvPr/>
+      </p:nvGrpSpPr>
+      <p:grpSpPr>
+        <a:xfrm>
+          <a:off x="0" y="0"/>
+          <a:ext cx="0" cy="0"/>
+          <a:chOff x="0" y="0"/>
+          <a:chExt cx="0" cy="0"/>
+        </a:xfrm>
+      </p:grpSpPr>
+      <p:sp>
+        <p:nvSpPr>
+          <p:cNvPr id="3" name="Title 2"/>
+          <p:cNvSpPr>
+            <a:spLocks noGrp="1"/>
+          </p:cNvSpPr>
+          <p:nvPr>
+            <p:ph type="title"/>
+          </p:nvPr>
+        </p:nvSpPr>
+        <p:spPr/>
+        <p:txBody>
+          <a:bodyPr/>
+          <a:lstStyle/>
+          <a:p>
+            <a:r>
+              <a:rPr lang="en-US" dirty="0" smtClean="0"/>
+              <a:t>The Document</a:t>
+            </a:r>
+            <a:endParaRPr lang="en-US" dirty="0"/>
+          </a:p>
+        </p:txBody>
+      </p:sp>
+      <p:sp>
+        <p:nvSpPr>
+          <p:cNvPr id="6" name="TextBox 5"/>
+          <p:cNvSpPr txBox="1"/>
+          <p:nvPr/>
+        </p:nvSpPr>
+        <p:spPr>
+          <a:xfrm>
+            <a:off x="1241632" y="-1364650"/>
+            <a:ext cx="184666" cy="369332"/>
+          </a:xfrm>
+          <a:prstGeom prst="rect">
+            <a:avLst/>
+          </a:prstGeom>
+          <a:noFill/>
+        </p:spPr>
+        <p:txBody>
+          <a:bodyPr wrap="none" rtlCol="0">
+            <a:spAutoFit/>
+          </a:bodyPr>
+          <a:lstStyle/>
+          <a:p>
+            <a:endParaRPr lang="en-US" dirty="0" err="1">
+              <a:solidFill>
+                <a:srgbClr val="333333"/>
+              </a:solidFill>
+              <a:latin typeface="Arial"/>
+              <a:cs typeface="Arial"/>
+            </a:endParaRPr>
+          </a:p>
+        </p:txBody>
+      </p:sp>
+      <p:sp>
+        <p:nvSpPr>
+          <p:cNvPr id="7" name="Rectangle 6"/>
+          <p:cNvSpPr/>
+          <p:nvPr/>
+        </p:nvSpPr>
+        <p:spPr>
+          <a:xfrm>
+            <a:off x="2928734" y="-1895348"/>
+            <a:ext cx="2521175" cy="1222500"/>
+          </a:xfrm>
+          <a:prstGeom prst="rect">
+            <a:avLst/>
+          </a:prstGeom>
+          <a:solidFill>
+            <a:schemeClr val="accent1"/>
+          </a:solidFill>
+          <a:ln>
+            <a:noFill/>
+          </a:ln>
+          <a:effectLst/>
+        </p:spPr>
+        <p:style>
+          <a:lnRef idx="1">
+            <a:schemeClr val="accent1"/>
+          </a:lnRef>
+          <a:fillRef idx="3">
+            <a:schemeClr val="accent1"/>
+          </a:fillRef>
+          <a:effectRef idx="2">
+            <a:schemeClr val="accent1"/>
+          </a:effectRef>
+          <a:fontRef idx="minor">
+            <a:schemeClr val="lt1"/>
+          </a:fontRef>
+        </p:style>
+        <p:txBody>
+          <a:bodyPr rtlCol="0" anchor="ctr"/>
+          <a:lstStyle/>
+          <a:p>
+            <a:pPr algn="ctr"/>
+            <a:r>
+              <a:rPr lang="en-US" dirty="0" smtClean="0">
+                <a:solidFill>
+                  <a:srgbClr val="333333"/>
+                </a:solidFill>
+                <a:latin typeface="Arial"/>
+                <a:cs typeface="Arial"/>
+              </a:rPr>
+              <a:t>j</a:t>
+            </a:r>
+            <a:endParaRPr lang="en-US" dirty="0">
+              <a:solidFill>
+                <a:srgbClr val="333333"/>
+              </a:solidFill>
+              <a:latin typeface="Arial"/>
+              <a:cs typeface="Arial"/>
+            </a:endParaRPr>
+          </a:p>
+        </p:txBody>
+      </p:sp>
+      <p:pic>
+        <p:nvPicPr>
+          <p:cNvPr id="10" name="Picture 9" descr="Screen Shot 2014-09-18 at 13.40.07.png"/>
+          <p:cNvPicPr>
+            <a:picLocks noChangeAspect="1"/>
+          </p:cNvPicPr>
+          <p:nvPr/>
+        </p:nvPicPr>
+        <p:blipFill>
+          <a:blip r:embed="rId2">
+            <a:extLst>
+              <a:ext uri="{28A0092B-C50C-407E-A947-70E740481C1C}">
+                <a14:useLocalDpi xmlns:a14="http://schemas.microsoft.com/office/drawing/2010/main" val="0"/>
+              </a:ext>
+            </a:extLst>
+          </a:blip>
+          <a:stretch>
+            <a:fillRect/>
+          </a:stretch>
+        </p:blipFill>
+        <p:spPr>
+          <a:xfrm>
+            <a:off x="2322135" y="823570"/>
+            <a:ext cx="4812793" cy="3773410"/>
+          </a:xfrm>
+          <a:prstGeom prst="rect">
+            <a:avLst/>
+          </a:prstGeom>
+        </p:spPr>
+      </p:pic>
+    </p:spTree>
+    <p:extLst>
+      <p:ext uri="{BB962C8B-B14F-4D97-AF65-F5344CB8AC3E}">
+        <p14:creationId xmlns:p14="http://schemas.microsoft.com/office/powerpoint/2010/main" val="667413171"/>
+      </p:ext>
+    </p:extLst>
+  </p:cSld>
+  <p:clrMapOvr>
+    <a:masterClrMapping/>
+  </p:clrMapOvr>
+  <p:timing>
+    <p:tnLst>
+      <p:par>
+        <p:cTn xmlns:p14="http://schemas.microsoft.com/office/powerpoint/2010/main" id="1" dur="indefinite" restart="never" nodeType="tmRoot"/>
+      </p:par>
+    </p:tnLst>
+  </p:timing>
+</p:sld>
+</file>
+
+<file path=ppt/slides/slide12.xml><?xml version="1.0" encoding="utf-8"?>
+<p:sld xmlns:a="http://schemas.openxmlformats.org/drawingml/2006/main" xmlns:r="http://schemas.openxmlformats.org/officeDocument/2006/relationships" xmlns:p="http://schemas.openxmlformats.org/presentationml/2006/main">
+  <p:cSld>
+    <p:spTree>
+      <p:nvGrpSpPr>
+        <p:cNvPr id="1" name=""/>
+        <p:cNvGrpSpPr/>
+        <p:nvPr/>
+      </p:nvGrpSpPr>
+      <p:grpSpPr>
+        <a:xfrm>
+          <a:off x="0" y="0"/>
+          <a:ext cx="0" cy="0"/>
+          <a:chOff x="0" y="0"/>
+          <a:chExt cx="0" cy="0"/>
+        </a:xfrm>
+      </p:grpSpPr>
+      <p:sp>
+        <p:nvSpPr>
+          <p:cNvPr id="2" name="Content Placeholder 1"/>
+          <p:cNvSpPr>
+            <a:spLocks noGrp="1"/>
+          </p:cNvSpPr>
+          <p:nvPr>
+            <p:ph idx="1"/>
+          </p:nvPr>
+        </p:nvSpPr>
+        <p:spPr/>
+        <p:txBody>
+          <a:bodyPr/>
+          <a:lstStyle/>
+          <a:p>
+            <a:pPr marL="285750" indent="-285750">
+              <a:buFont typeface="Wingdings" charset="2"/>
+              <a:buChar char="§"/>
+            </a:pPr>
+            <a:r>
+              <a:rPr lang="en-US" dirty="0" smtClean="0"/>
+              <a:t>Document implementations are language specific.</a:t>
+            </a:r>
+          </a:p>
+          <a:p>
+            <a:pPr marL="285750" indent="-285750">
+              <a:buFont typeface="Wingdings" charset="2"/>
+              <a:buChar char="§"/>
+            </a:pPr>
+            <a:r>
+              <a:rPr lang="en-US" dirty="0" smtClean="0"/>
+              <a:t>All support JSON in its different forms.</a:t>
+            </a:r>
+          </a:p>
+          <a:p>
+            <a:pPr marL="285750" indent="-285750">
+              <a:buFont typeface="Wingdings" charset="2"/>
+              <a:buChar char="§"/>
+            </a:pPr>
+            <a:endParaRPr lang="en-US" dirty="0"/>
+          </a:p>
+          <a:p>
+            <a:pPr marL="285750" indent="-285750">
+              <a:buFont typeface="Wingdings" charset="2"/>
+              <a:buChar char="§"/>
+            </a:pPr>
+            <a:r>
+              <a:rPr lang="en-US" dirty="0" smtClean="0"/>
+              <a:t>In addition, some support:</a:t>
+            </a:r>
+          </a:p>
+          <a:p>
+            <a:pPr marL="587375" lvl="1" indent="-285750">
+              <a:buFont typeface="Wingdings" charset="2"/>
+              <a:buChar char="§"/>
+            </a:pPr>
+            <a:r>
+              <a:rPr lang="en-US" dirty="0" smtClean="0"/>
+              <a:t>Serialized objects</a:t>
+            </a:r>
+          </a:p>
+          <a:p>
+            <a:pPr marL="587375" lvl="1" indent="-285750">
+              <a:buFont typeface="Wingdings" charset="2"/>
+              <a:buChar char="§"/>
+            </a:pPr>
+            <a:r>
+              <a:rPr lang="en-US" dirty="0" smtClean="0"/>
+              <a:t>Unquoted Strings</a:t>
+            </a:r>
+          </a:p>
+          <a:p>
+            <a:pPr marL="587375" lvl="1" indent="-285750">
+              <a:buFont typeface="Wingdings" charset="2"/>
+              <a:buChar char="§"/>
+            </a:pPr>
+            <a:r>
+              <a:rPr lang="en-US" dirty="0" smtClean="0"/>
+              <a:t>Binary pass-through</a:t>
+            </a:r>
+          </a:p>
+          <a:p>
+            <a:pPr marL="587375" lvl="1" indent="-285750">
+              <a:buFont typeface="Wingdings" charset="2"/>
+              <a:buChar char="§"/>
+            </a:pPr>
+            <a:r>
+              <a:rPr lang="en-US" dirty="0" smtClean="0"/>
+              <a:t>Legacy</a:t>
+            </a:r>
+          </a:p>
+          <a:p>
+            <a:pPr marL="587375" lvl="1" indent="-285750">
+              <a:buFont typeface="Wingdings" charset="2"/>
+              <a:buChar char="§"/>
+            </a:pPr>
+            <a:r>
+              <a:rPr lang="en-US" dirty="0" smtClean="0"/>
+              <a:t>…</a:t>
+            </a:r>
+          </a:p>
+          <a:p>
+            <a:pPr marL="587375" lvl="1" indent="-285750">
+              <a:buFont typeface="Wingdings" charset="2"/>
+              <a:buChar char="§"/>
+            </a:pPr>
+            <a:endParaRPr lang="en-US" dirty="0"/>
+          </a:p>
+        </p:txBody>
+      </p:sp>
+      <p:sp>
+        <p:nvSpPr>
+          <p:cNvPr id="3" name="Title 2"/>
+          <p:cNvSpPr>
+            <a:spLocks noGrp="1"/>
+          </p:cNvSpPr>
+          <p:nvPr>
+            <p:ph type="title"/>
+          </p:nvPr>
+        </p:nvSpPr>
+        <p:spPr/>
+        <p:txBody>
+          <a:bodyPr/>
+          <a:lstStyle/>
+          <a:p>
+            <a:r>
+              <a:rPr lang="en-US" dirty="0" smtClean="0"/>
+              <a:t>Document Implementations</a:t>
+            </a:r>
+            <a:endParaRPr lang="en-US" dirty="0"/>
+          </a:p>
+        </p:txBody>
+      </p:sp>
+      <p:sp>
+        <p:nvSpPr>
+          <p:cNvPr id="6" name="TextBox 5"/>
+          <p:cNvSpPr txBox="1"/>
+          <p:nvPr/>
+        </p:nvSpPr>
+        <p:spPr>
+          <a:xfrm>
+            <a:off x="1241632" y="-1364650"/>
+            <a:ext cx="184666" cy="369332"/>
+          </a:xfrm>
+          <a:prstGeom prst="rect">
+            <a:avLst/>
+          </a:prstGeom>
+          <a:noFill/>
+        </p:spPr>
+        <p:txBody>
+          <a:bodyPr wrap="none" rtlCol="0">
+            <a:spAutoFit/>
+          </a:bodyPr>
+          <a:lstStyle/>
+          <a:p>
+            <a:endParaRPr lang="en-US" dirty="0" err="1">
+              <a:solidFill>
+                <a:srgbClr val="333333"/>
+              </a:solidFill>
+              <a:latin typeface="Arial"/>
+              <a:cs typeface="Arial"/>
+            </a:endParaRPr>
+          </a:p>
+        </p:txBody>
+      </p:sp>
+      <p:sp>
+        <p:nvSpPr>
+          <p:cNvPr id="7" name="Rectangle 6"/>
+          <p:cNvSpPr/>
+          <p:nvPr/>
+        </p:nvSpPr>
+        <p:spPr>
+          <a:xfrm>
+            <a:off x="2928734" y="-1895348"/>
+            <a:ext cx="2521175" cy="1222500"/>
+          </a:xfrm>
+          <a:prstGeom prst="rect">
+            <a:avLst/>
+          </a:prstGeom>
+          <a:solidFill>
+            <a:schemeClr val="accent1"/>
+          </a:solidFill>
+          <a:ln>
+            <a:noFill/>
+          </a:ln>
+          <a:effectLst/>
+        </p:spPr>
+        <p:style>
+          <a:lnRef idx="1">
+            <a:schemeClr val="accent1"/>
+          </a:lnRef>
+          <a:fillRef idx="3">
+            <a:schemeClr val="accent1"/>
+          </a:fillRef>
+          <a:effectRef idx="2">
+            <a:schemeClr val="accent1"/>
+          </a:effectRef>
+          <a:fontRef idx="minor">
+            <a:schemeClr val="lt1"/>
+          </a:fontRef>
+        </p:style>
+        <p:txBody>
+          <a:bodyPr rtlCol="0" anchor="ctr"/>
+          <a:lstStyle/>
+          <a:p>
+            <a:pPr algn="ctr"/>
+            <a:r>
+              <a:rPr lang="en-US" dirty="0" smtClean="0">
+                <a:solidFill>
+                  <a:srgbClr val="333333"/>
+                </a:solidFill>
+                <a:latin typeface="Arial"/>
+                <a:cs typeface="Arial"/>
+              </a:rPr>
+              <a:t>j</a:t>
+            </a:r>
+            <a:endParaRPr lang="en-US" dirty="0">
+              <a:solidFill>
+                <a:srgbClr val="333333"/>
+              </a:solidFill>
+              <a:latin typeface="Arial"/>
+              <a:cs typeface="Arial"/>
+            </a:endParaRPr>
+          </a:p>
+        </p:txBody>
+      </p:sp>
+    </p:spTree>
+    <p:extLst>
+      <p:ext uri="{BB962C8B-B14F-4D97-AF65-F5344CB8AC3E}">
+        <p14:creationId xmlns:p14="http://schemas.microsoft.com/office/powerpoint/2010/main" val="1499859300"/>
+      </p:ext>
+    </p:extLst>
+  </p:cSld>
+  <p:clrMapOvr>
+    <a:masterClrMapping/>
+  </p:clrMapOvr>
+  <p:timing>
+    <p:tnLst>
+      <p:par>
+        <p:cTn xmlns:p14="http://schemas.microsoft.com/office/powerpoint/2010/main" id="1" dur="indefinite" restart="never" nodeType="tmRoot"/>
+      </p:par>
+    </p:tnLst>
+  </p:timing>
+</p:sld>
+</file>
+
+<file path=ppt/slides/slide13.xml><?xml version="1.0" encoding="utf-8"?>
+<p:sld xmlns:a="http://schemas.openxmlformats.org/drawingml/2006/main" xmlns:r="http://schemas.openxmlformats.org/officeDocument/2006/relationships" xmlns:p="http://schemas.openxmlformats.org/presentationml/2006/main">
+  <p:cSld>
+    <p:spTree>
+      <p:nvGrpSpPr>
+        <p:cNvPr id="1" name=""/>
+        <p:cNvGrpSpPr/>
+        <p:nvPr/>
+      </p:nvGrpSpPr>
+      <p:grpSpPr>
+        <a:xfrm>
+          <a:off x="0" y="0"/>
+          <a:ext cx="0" cy="0"/>
+          <a:chOff x="0" y="0"/>
+          <a:chExt cx="0" cy="0"/>
+        </a:xfrm>
+      </p:grpSpPr>
+      <p:sp>
+        <p:nvSpPr>
           <p:cNvPr id="3" name="Title 2"/>
           <p:cNvSpPr>
             <a:spLocks noGrp="1"/>
@@ -4788,7 +6140,7 @@
 </p:sld>
 </file>
 
-<file path=ppt/slides/slide11.xml><?xml version="1.0" encoding="utf-8"?>
+<file path=ppt/slides/slide14.xml><?xml version="1.0" encoding="utf-8"?>
 <p:sld xmlns:a="http://schemas.openxmlformats.org/drawingml/2006/main" xmlns:r="http://schemas.openxmlformats.org/officeDocument/2006/relationships" xmlns:p="http://schemas.openxmlformats.org/presentationml/2006/main">
   <p:cSld>
     <p:spTree>
@@ -4871,7 +6223,7 @@
 </p:sld>
 </file>
 
-<file path=ppt/slides/slide12.xml><?xml version="1.0" encoding="utf-8"?>
+<file path=ppt/slides/slide15.xml><?xml version="1.0" encoding="utf-8"?>
 <p:sld xmlns:a="http://schemas.openxmlformats.org/drawingml/2006/main" xmlns:r="http://schemas.openxmlformats.org/officeDocument/2006/relationships" xmlns:p="http://schemas.openxmlformats.org/presentationml/2006/main">
   <p:cSld>
     <p:spTree>
@@ -4950,7 +6302,7 @@
 </p:sld>
 </file>
 
-<file path=ppt/slides/slide13.xml><?xml version="1.0" encoding="utf-8"?>
+<file path=ppt/slides/slide16.xml><?xml version="1.0" encoding="utf-8"?>
 <p:sld xmlns:a="http://schemas.openxmlformats.org/drawingml/2006/main" xmlns:r="http://schemas.openxmlformats.org/officeDocument/2006/relationships" xmlns:p="http://schemas.openxmlformats.org/presentationml/2006/main">
   <p:cSld>
     <p:spTree>
@@ -5000,442 +6352,6 @@
   <p:clrMapOvr>
     <a:masterClrMapping/>
   </p:clrMapOvr>
-  <p:timing>
-    <p:tnLst>
-      <p:par>
-        <p:cTn xmlns:p14="http://schemas.microsoft.com/office/powerpoint/2010/main" id="1" dur="indefinite" restart="never" nodeType="tmRoot"/>
-      </p:par>
-    </p:tnLst>
-  </p:timing>
-</p:sld>
-</file>
-
-<file path=ppt/slides/slide14.xml><?xml version="1.0" encoding="utf-8"?>
-<p:sld xmlns:a="http://schemas.openxmlformats.org/drawingml/2006/main" xmlns:r="http://schemas.openxmlformats.org/officeDocument/2006/relationships" xmlns:p="http://schemas.openxmlformats.org/presentationml/2006/main" show="0">
-  <p:cSld>
-    <p:spTree>
-      <p:nvGrpSpPr>
-        <p:cNvPr id="1" name=""/>
-        <p:cNvGrpSpPr/>
-        <p:nvPr/>
-      </p:nvGrpSpPr>
-      <p:grpSpPr>
-        <a:xfrm>
-          <a:off x="0" y="0"/>
-          <a:ext cx="0" cy="0"/>
-          <a:chOff x="0" y="0"/>
-          <a:chExt cx="0" cy="0"/>
-        </a:xfrm>
-      </p:grpSpPr>
-      <p:sp>
-        <p:nvSpPr>
-          <p:cNvPr id="2" name="Title 1"/>
-          <p:cNvSpPr>
-            <a:spLocks noGrp="1"/>
-          </p:cNvSpPr>
-          <p:nvPr>
-            <p:ph type="title"/>
-          </p:nvPr>
-        </p:nvSpPr>
-        <p:spPr/>
-        <p:txBody>
-          <a:bodyPr/>
-          <a:lstStyle/>
-          <a:p>
-            <a:r>
-              <a:rPr lang="en-US" dirty="0" smtClean="0"/>
-              <a:t>Title and Bullets</a:t>
-            </a:r>
-            <a:endParaRPr lang="en-US" dirty="0"/>
-          </a:p>
-        </p:txBody>
-      </p:sp>
-      <p:sp>
-        <p:nvSpPr>
-          <p:cNvPr id="3" name="Content Placeholder 2"/>
-          <p:cNvSpPr>
-            <a:spLocks noGrp="1"/>
-          </p:cNvSpPr>
-          <p:nvPr>
-            <p:ph idx="1"/>
-          </p:nvPr>
-        </p:nvSpPr>
-        <p:spPr/>
-        <p:txBody>
-          <a:bodyPr/>
-          <a:lstStyle/>
-          <a:p>
-            <a:r>
-              <a:rPr lang="en-US" dirty="0" smtClean="0"/>
-              <a:t>First Level Bullet</a:t>
-            </a:r>
-          </a:p>
-          <a:p>
-            <a:pPr lvl="1"/>
-            <a:r>
-              <a:rPr lang="en-US" dirty="0" smtClean="0"/>
-              <a:t>Second Level Bullet</a:t>
-            </a:r>
-          </a:p>
-          <a:p>
-            <a:pPr lvl="2"/>
-            <a:r>
-              <a:rPr lang="en-US" dirty="0" smtClean="0"/>
-              <a:t>Third Level Bullet</a:t>
-            </a:r>
-          </a:p>
-          <a:p>
-            <a:pPr lvl="3"/>
-            <a:r>
-              <a:rPr lang="en-US" dirty="0" smtClean="0"/>
-              <a:t>Fourth Level Bullet</a:t>
-            </a:r>
-          </a:p>
-          <a:p>
-            <a:pPr lvl="4"/>
-            <a:r>
-              <a:rPr lang="en-US" dirty="0" smtClean="0"/>
-              <a:t>Fifth Level Bullet</a:t>
-            </a:r>
-            <a:endParaRPr lang="en-US" dirty="0"/>
-          </a:p>
-        </p:txBody>
-      </p:sp>
-    </p:spTree>
-    <p:extLst>
-      <p:ext uri="{BB962C8B-B14F-4D97-AF65-F5344CB8AC3E}">
-        <p14:creationId xmlns:p14="http://schemas.microsoft.com/office/powerpoint/2010/main" val="1910273132"/>
-      </p:ext>
-    </p:extLst>
-  </p:cSld>
-  <p:clrMapOvr>
-    <a:masterClrMapping/>
-  </p:clrMapOvr>
-  <mc:AlternateContent xmlns:mc="http://schemas.openxmlformats.org/markup-compatibility/2006">
-    <mc:Choice xmlns:p14="http://schemas.microsoft.com/office/powerpoint/2010/main" Requires="p14">
-      <p:transition spd="slow" p14:dur="2000"/>
-    </mc:Choice>
-    <mc:Fallback>
-      <p:transition xmlns:p14="http://schemas.microsoft.com/office/powerpoint/2010/main" spd="slow"/>
-    </mc:Fallback>
-  </mc:AlternateContent>
-  <p:timing>
-    <p:tnLst>
-      <p:par>
-        <p:cTn xmlns:p14="http://schemas.microsoft.com/office/powerpoint/2010/main" id="1" dur="indefinite" restart="never" nodeType="tmRoot"/>
-      </p:par>
-    </p:tnLst>
-  </p:timing>
-</p:sld>
-</file>
-
-<file path=ppt/slides/slide15.xml><?xml version="1.0" encoding="utf-8"?>
-<p:sld xmlns:a="http://schemas.openxmlformats.org/drawingml/2006/main" xmlns:r="http://schemas.openxmlformats.org/officeDocument/2006/relationships" xmlns:p="http://schemas.openxmlformats.org/presentationml/2006/main" show="0">
-  <p:cSld>
-    <p:spTree>
-      <p:nvGrpSpPr>
-        <p:cNvPr id="1" name=""/>
-        <p:cNvGrpSpPr/>
-        <p:nvPr/>
-      </p:nvGrpSpPr>
-      <p:grpSpPr>
-        <a:xfrm>
-          <a:off x="0" y="0"/>
-          <a:ext cx="0" cy="0"/>
-          <a:chOff x="0" y="0"/>
-          <a:chExt cx="0" cy="0"/>
-        </a:xfrm>
-      </p:grpSpPr>
-      <p:sp>
-        <p:nvSpPr>
-          <p:cNvPr id="2" name="Title 1"/>
-          <p:cNvSpPr>
-            <a:spLocks noGrp="1"/>
-          </p:cNvSpPr>
-          <p:nvPr>
-            <p:ph type="title"/>
-          </p:nvPr>
-        </p:nvSpPr>
-        <p:spPr/>
-        <p:txBody>
-          <a:bodyPr/>
-          <a:lstStyle/>
-          <a:p>
-            <a:r>
-              <a:rPr lang="en-US" dirty="0" smtClean="0"/>
-              <a:t>Title and Text</a:t>
-            </a:r>
-            <a:endParaRPr lang="en-US" dirty="0"/>
-          </a:p>
-        </p:txBody>
-      </p:sp>
-      <p:sp>
-        <p:nvSpPr>
-          <p:cNvPr id="3" name="Content Placeholder 2"/>
-          <p:cNvSpPr>
-            <a:spLocks noGrp="1"/>
-          </p:cNvSpPr>
-          <p:nvPr>
-            <p:ph idx="1"/>
-          </p:nvPr>
-        </p:nvSpPr>
-        <p:spPr/>
-        <p:txBody>
-          <a:bodyPr/>
-          <a:lstStyle/>
-          <a:p>
-            <a:r>
-              <a:rPr lang="en-US" dirty="0" err="1"/>
-              <a:t>Lorem</a:t>
-            </a:r>
-            <a:r>
-              <a:rPr lang="en-US" dirty="0"/>
-              <a:t> </a:t>
-            </a:r>
-            <a:r>
-              <a:rPr lang="en-US" dirty="0" err="1"/>
-              <a:t>ipsum</a:t>
-            </a:r>
-            <a:r>
-              <a:rPr lang="en-US" dirty="0"/>
-              <a:t> dolor sit </a:t>
-            </a:r>
-            <a:r>
-              <a:rPr lang="en-US" dirty="0" err="1"/>
-              <a:t>amet</a:t>
-            </a:r>
-            <a:r>
-              <a:rPr lang="en-US" dirty="0"/>
-              <a:t>, </a:t>
-            </a:r>
-            <a:r>
-              <a:rPr lang="en-US" dirty="0" err="1"/>
-              <a:t>consectetur</a:t>
-            </a:r>
-            <a:r>
-              <a:rPr lang="en-US" dirty="0"/>
-              <a:t> </a:t>
-            </a:r>
-            <a:r>
-              <a:rPr lang="en-US" dirty="0" err="1"/>
-              <a:t>adipiscing</a:t>
-            </a:r>
-            <a:r>
-              <a:rPr lang="en-US" dirty="0"/>
-              <a:t> </a:t>
-            </a:r>
-            <a:r>
-              <a:rPr lang="en-US" dirty="0" err="1"/>
-              <a:t>elit</a:t>
-            </a:r>
-            <a:r>
-              <a:rPr lang="en-US" dirty="0"/>
-              <a:t>. </a:t>
-            </a:r>
-            <a:r>
-              <a:rPr lang="en-US" dirty="0" err="1"/>
-              <a:t>Donec</a:t>
-            </a:r>
-            <a:r>
-              <a:rPr lang="en-US" dirty="0"/>
-              <a:t> </a:t>
-            </a:r>
-            <a:r>
-              <a:rPr lang="en-US" dirty="0" err="1"/>
-              <a:t>risus</a:t>
-            </a:r>
-            <a:r>
-              <a:rPr lang="en-US" dirty="0"/>
-              <a:t> </a:t>
-            </a:r>
-            <a:r>
-              <a:rPr lang="en-US" dirty="0" err="1"/>
-              <a:t>purus</a:t>
-            </a:r>
-            <a:r>
-              <a:rPr lang="en-US" dirty="0"/>
-              <a:t>, tempus in </a:t>
-            </a:r>
-            <a:r>
-              <a:rPr lang="en-US" dirty="0" err="1"/>
-              <a:t>quis</a:t>
-            </a:r>
-            <a:r>
-              <a:rPr lang="en-US" dirty="0"/>
-              <a:t>, </a:t>
-            </a:r>
-            <a:r>
-              <a:rPr lang="en-US" dirty="0" err="1"/>
-              <a:t>ultricies</a:t>
-            </a:r>
-            <a:r>
-              <a:rPr lang="en-US" dirty="0"/>
-              <a:t> </a:t>
-            </a:r>
-            <a:r>
-              <a:rPr lang="en-US" dirty="0" err="1"/>
-              <a:t>eu</a:t>
-            </a:r>
-            <a:r>
-              <a:rPr lang="en-US" dirty="0"/>
-              <a:t> diam. </a:t>
-            </a:r>
-            <a:r>
-              <a:rPr lang="en-US" dirty="0" err="1"/>
-              <a:t>Donec</a:t>
-            </a:r>
-            <a:r>
-              <a:rPr lang="en-US" dirty="0"/>
-              <a:t> </a:t>
-            </a:r>
-            <a:r>
-              <a:rPr lang="en-US" dirty="0" err="1"/>
-              <a:t>convallis</a:t>
-            </a:r>
-            <a:r>
-              <a:rPr lang="en-US" dirty="0"/>
-              <a:t> </a:t>
-            </a:r>
-            <a:r>
-              <a:rPr lang="en-US" dirty="0" err="1"/>
-              <a:t>enim</a:t>
-            </a:r>
-            <a:r>
-              <a:rPr lang="en-US" dirty="0"/>
-              <a:t> in mi </a:t>
-            </a:r>
-            <a:r>
-              <a:rPr lang="en-US" dirty="0" err="1"/>
-              <a:t>lacinia</a:t>
-            </a:r>
-            <a:r>
-              <a:rPr lang="en-US" dirty="0"/>
-              <a:t>, id </a:t>
-            </a:r>
-            <a:r>
-              <a:rPr lang="en-US" dirty="0" err="1"/>
-              <a:t>viverra</a:t>
-            </a:r>
-            <a:r>
-              <a:rPr lang="en-US" dirty="0"/>
-              <a:t> </a:t>
-            </a:r>
-            <a:r>
-              <a:rPr lang="en-US" dirty="0" err="1"/>
-              <a:t>neque</a:t>
-            </a:r>
-            <a:r>
-              <a:rPr lang="en-US" dirty="0"/>
-              <a:t> </a:t>
-            </a:r>
-            <a:r>
-              <a:rPr lang="en-US" dirty="0" err="1"/>
-              <a:t>pretium</a:t>
-            </a:r>
-            <a:r>
-              <a:rPr lang="en-US" dirty="0"/>
-              <a:t>. </a:t>
-            </a:r>
-            <a:r>
-              <a:rPr lang="en-US" dirty="0" err="1"/>
-              <a:t>Phasellus</a:t>
-            </a:r>
-            <a:r>
-              <a:rPr lang="en-US" dirty="0"/>
-              <a:t> et.</a:t>
-            </a:r>
-          </a:p>
-          <a:p>
-            <a:endParaRPr lang="en-US" dirty="0"/>
-          </a:p>
-        </p:txBody>
-      </p:sp>
-    </p:spTree>
-    <p:extLst>
-      <p:ext uri="{BB962C8B-B14F-4D97-AF65-F5344CB8AC3E}">
-        <p14:creationId xmlns:p14="http://schemas.microsoft.com/office/powerpoint/2010/main" val="2354427935"/>
-      </p:ext>
-    </p:extLst>
-  </p:cSld>
-  <p:clrMapOvr>
-    <a:masterClrMapping/>
-  </p:clrMapOvr>
-  <mc:AlternateContent xmlns:mc="http://schemas.openxmlformats.org/markup-compatibility/2006">
-    <mc:Choice xmlns:p14="http://schemas.microsoft.com/office/powerpoint/2010/main" Requires="p14">
-      <p:transition spd="slow" p14:dur="2000"/>
-    </mc:Choice>
-    <mc:Fallback>
-      <p:transition xmlns:p14="http://schemas.microsoft.com/office/powerpoint/2010/main" spd="slow"/>
-    </mc:Fallback>
-  </mc:AlternateContent>
-  <p:timing>
-    <p:tnLst>
-      <p:par>
-        <p:cTn xmlns:p14="http://schemas.microsoft.com/office/powerpoint/2010/main" id="1" dur="indefinite" restart="never" nodeType="tmRoot"/>
-      </p:par>
-    </p:tnLst>
-  </p:timing>
-</p:sld>
-</file>
-
-<file path=ppt/slides/slide16.xml><?xml version="1.0" encoding="utf-8"?>
-<p:sld xmlns:a="http://schemas.openxmlformats.org/drawingml/2006/main" xmlns:r="http://schemas.openxmlformats.org/officeDocument/2006/relationships" xmlns:p="http://schemas.openxmlformats.org/presentationml/2006/main" show="0">
-  <p:cSld>
-    <p:spTree>
-      <p:nvGrpSpPr>
-        <p:cNvPr id="1" name=""/>
-        <p:cNvGrpSpPr/>
-        <p:nvPr/>
-      </p:nvGrpSpPr>
-      <p:grpSpPr>
-        <a:xfrm>
-          <a:off x="0" y="0"/>
-          <a:ext cx="0" cy="0"/>
-          <a:chOff x="0" y="0"/>
-          <a:chExt cx="0" cy="0"/>
-        </a:xfrm>
-      </p:grpSpPr>
-      <p:sp>
-        <p:nvSpPr>
-          <p:cNvPr id="5" name="Title 4"/>
-          <p:cNvSpPr>
-            <a:spLocks noGrp="1"/>
-          </p:cNvSpPr>
-          <p:nvPr>
-            <p:ph type="title"/>
-          </p:nvPr>
-        </p:nvSpPr>
-        <p:spPr/>
-        <p:txBody>
-          <a:bodyPr/>
-          <a:lstStyle/>
-          <a:p>
-            <a:r>
-              <a:rPr lang="en-US" dirty="0" smtClean="0"/>
-              <a:t>Title Only</a:t>
-            </a:r>
-            <a:endParaRPr lang="en-US" dirty="0"/>
-          </a:p>
-        </p:txBody>
-      </p:sp>
-    </p:spTree>
-    <p:extLst>
-      <p:ext uri="{BB962C8B-B14F-4D97-AF65-F5344CB8AC3E}">
-        <p14:creationId xmlns:p14="http://schemas.microsoft.com/office/powerpoint/2010/main" val="1439852271"/>
-      </p:ext>
-    </p:extLst>
-  </p:cSld>
-  <p:clrMapOvr>
-    <a:masterClrMapping/>
-  </p:clrMapOvr>
-  <mc:AlternateContent xmlns:mc="http://schemas.openxmlformats.org/markup-compatibility/2006">
-    <mc:Choice xmlns:p14="http://schemas.microsoft.com/office/powerpoint/2010/main" Requires="p14">
-      <p:transition spd="slow" p14:dur="2000"/>
-    </mc:Choice>
-    <mc:Fallback>
-      <p:transition xmlns:p14="http://schemas.microsoft.com/office/powerpoint/2010/main" spd="slow"/>
-    </mc:Fallback>
-  </mc:AlternateContent>
   <p:timing>
     <p:tnLst>
       <p:par>
@@ -5470,6 +6386,525 @@
             <a:spLocks noGrp="1"/>
           </p:cNvSpPr>
           <p:nvPr>
+            <p:ph type="title"/>
+          </p:nvPr>
+        </p:nvSpPr>
+        <p:spPr/>
+        <p:txBody>
+          <a:bodyPr/>
+          <a:lstStyle/>
+          <a:p>
+            <a:r>
+              <a:rPr lang="en-US" dirty="0" smtClean="0"/>
+              <a:t>Title and Bullets</a:t>
+            </a:r>
+            <a:endParaRPr lang="en-US" dirty="0"/>
+          </a:p>
+        </p:txBody>
+      </p:sp>
+      <p:sp>
+        <p:nvSpPr>
+          <p:cNvPr id="3" name="Content Placeholder 2"/>
+          <p:cNvSpPr>
+            <a:spLocks noGrp="1"/>
+          </p:cNvSpPr>
+          <p:nvPr>
+            <p:ph idx="1"/>
+          </p:nvPr>
+        </p:nvSpPr>
+        <p:spPr/>
+        <p:txBody>
+          <a:bodyPr/>
+          <a:lstStyle/>
+          <a:p>
+            <a:r>
+              <a:rPr lang="en-US" dirty="0" smtClean="0"/>
+              <a:t>First Level Bullet</a:t>
+            </a:r>
+          </a:p>
+          <a:p>
+            <a:pPr lvl="1"/>
+            <a:r>
+              <a:rPr lang="en-US" dirty="0" smtClean="0"/>
+              <a:t>Second Level Bullet</a:t>
+            </a:r>
+          </a:p>
+          <a:p>
+            <a:pPr lvl="2"/>
+            <a:r>
+              <a:rPr lang="en-US" dirty="0" smtClean="0"/>
+              <a:t>Third Level Bullet</a:t>
+            </a:r>
+          </a:p>
+          <a:p>
+            <a:pPr lvl="3"/>
+            <a:r>
+              <a:rPr lang="en-US" dirty="0" smtClean="0"/>
+              <a:t>Fourth Level Bullet</a:t>
+            </a:r>
+          </a:p>
+          <a:p>
+            <a:pPr lvl="4"/>
+            <a:r>
+              <a:rPr lang="en-US" dirty="0" smtClean="0"/>
+              <a:t>Fifth Level Bullet</a:t>
+            </a:r>
+            <a:endParaRPr lang="en-US" dirty="0"/>
+          </a:p>
+        </p:txBody>
+      </p:sp>
+    </p:spTree>
+    <p:extLst>
+      <p:ext uri="{BB962C8B-B14F-4D97-AF65-F5344CB8AC3E}">
+        <p14:creationId xmlns:p14="http://schemas.microsoft.com/office/powerpoint/2010/main" val="1910273132"/>
+      </p:ext>
+    </p:extLst>
+  </p:cSld>
+  <p:clrMapOvr>
+    <a:masterClrMapping/>
+  </p:clrMapOvr>
+  <mc:AlternateContent xmlns:mc="http://schemas.openxmlformats.org/markup-compatibility/2006">
+    <mc:Choice xmlns:p14="http://schemas.microsoft.com/office/powerpoint/2010/main" Requires="p14">
+      <p:transition spd="slow" p14:dur="2000"/>
+    </mc:Choice>
+    <mc:Fallback>
+      <p:transition xmlns:p14="http://schemas.microsoft.com/office/powerpoint/2010/main" spd="slow"/>
+    </mc:Fallback>
+  </mc:AlternateContent>
+  <p:timing>
+    <p:tnLst>
+      <p:par>
+        <p:cTn xmlns:p14="http://schemas.microsoft.com/office/powerpoint/2010/main" id="1" dur="indefinite" restart="never" nodeType="tmRoot"/>
+      </p:par>
+    </p:tnLst>
+  </p:timing>
+</p:sld>
+</file>
+
+<file path=ppt/slides/slide18.xml><?xml version="1.0" encoding="utf-8"?>
+<p:sld xmlns:a="http://schemas.openxmlformats.org/drawingml/2006/main" xmlns:r="http://schemas.openxmlformats.org/officeDocument/2006/relationships" xmlns:p="http://schemas.openxmlformats.org/presentationml/2006/main" show="0">
+  <p:cSld>
+    <p:spTree>
+      <p:nvGrpSpPr>
+        <p:cNvPr id="1" name=""/>
+        <p:cNvGrpSpPr/>
+        <p:nvPr/>
+      </p:nvGrpSpPr>
+      <p:grpSpPr>
+        <a:xfrm>
+          <a:off x="0" y="0"/>
+          <a:ext cx="0" cy="0"/>
+          <a:chOff x="0" y="0"/>
+          <a:chExt cx="0" cy="0"/>
+        </a:xfrm>
+      </p:grpSpPr>
+      <p:sp>
+        <p:nvSpPr>
+          <p:cNvPr id="2" name="Title 1"/>
+          <p:cNvSpPr>
+            <a:spLocks noGrp="1"/>
+          </p:cNvSpPr>
+          <p:nvPr>
+            <p:ph type="title"/>
+          </p:nvPr>
+        </p:nvSpPr>
+        <p:spPr/>
+        <p:txBody>
+          <a:bodyPr/>
+          <a:lstStyle/>
+          <a:p>
+            <a:r>
+              <a:rPr lang="en-US" dirty="0" smtClean="0"/>
+              <a:t>Title and Text</a:t>
+            </a:r>
+            <a:endParaRPr lang="en-US" dirty="0"/>
+          </a:p>
+        </p:txBody>
+      </p:sp>
+      <p:sp>
+        <p:nvSpPr>
+          <p:cNvPr id="3" name="Content Placeholder 2"/>
+          <p:cNvSpPr>
+            <a:spLocks noGrp="1"/>
+          </p:cNvSpPr>
+          <p:nvPr>
+            <p:ph idx="1"/>
+          </p:nvPr>
+        </p:nvSpPr>
+        <p:spPr/>
+        <p:txBody>
+          <a:bodyPr/>
+          <a:lstStyle/>
+          <a:p>
+            <a:r>
+              <a:rPr lang="en-US" dirty="0" err="1"/>
+              <a:t>Lorem</a:t>
+            </a:r>
+            <a:r>
+              <a:rPr lang="en-US" dirty="0"/>
+              <a:t> </a:t>
+            </a:r>
+            <a:r>
+              <a:rPr lang="en-US" dirty="0" err="1"/>
+              <a:t>ipsum</a:t>
+            </a:r>
+            <a:r>
+              <a:rPr lang="en-US" dirty="0"/>
+              <a:t> dolor sit </a:t>
+            </a:r>
+            <a:r>
+              <a:rPr lang="en-US" dirty="0" err="1"/>
+              <a:t>amet</a:t>
+            </a:r>
+            <a:r>
+              <a:rPr lang="en-US" dirty="0"/>
+              <a:t>, </a:t>
+            </a:r>
+            <a:r>
+              <a:rPr lang="en-US" dirty="0" err="1"/>
+              <a:t>consectetur</a:t>
+            </a:r>
+            <a:r>
+              <a:rPr lang="en-US" dirty="0"/>
+              <a:t> </a:t>
+            </a:r>
+            <a:r>
+              <a:rPr lang="en-US" dirty="0" err="1"/>
+              <a:t>adipiscing</a:t>
+            </a:r>
+            <a:r>
+              <a:rPr lang="en-US" dirty="0"/>
+              <a:t> </a:t>
+            </a:r>
+            <a:r>
+              <a:rPr lang="en-US" dirty="0" err="1"/>
+              <a:t>elit</a:t>
+            </a:r>
+            <a:r>
+              <a:rPr lang="en-US" dirty="0"/>
+              <a:t>. </a:t>
+            </a:r>
+            <a:r>
+              <a:rPr lang="en-US" dirty="0" err="1"/>
+              <a:t>Donec</a:t>
+            </a:r>
+            <a:r>
+              <a:rPr lang="en-US" dirty="0"/>
+              <a:t> </a:t>
+            </a:r>
+            <a:r>
+              <a:rPr lang="en-US" dirty="0" err="1"/>
+              <a:t>risus</a:t>
+            </a:r>
+            <a:r>
+              <a:rPr lang="en-US" dirty="0"/>
+              <a:t> </a:t>
+            </a:r>
+            <a:r>
+              <a:rPr lang="en-US" dirty="0" err="1"/>
+              <a:t>purus</a:t>
+            </a:r>
+            <a:r>
+              <a:rPr lang="en-US" dirty="0"/>
+              <a:t>, tempus in </a:t>
+            </a:r>
+            <a:r>
+              <a:rPr lang="en-US" dirty="0" err="1"/>
+              <a:t>quis</a:t>
+            </a:r>
+            <a:r>
+              <a:rPr lang="en-US" dirty="0"/>
+              <a:t>, </a:t>
+            </a:r>
+            <a:r>
+              <a:rPr lang="en-US" dirty="0" err="1"/>
+              <a:t>ultricies</a:t>
+            </a:r>
+            <a:r>
+              <a:rPr lang="en-US" dirty="0"/>
+              <a:t> </a:t>
+            </a:r>
+            <a:r>
+              <a:rPr lang="en-US" dirty="0" err="1"/>
+              <a:t>eu</a:t>
+            </a:r>
+            <a:r>
+              <a:rPr lang="en-US" dirty="0"/>
+              <a:t> diam. </a:t>
+            </a:r>
+            <a:r>
+              <a:rPr lang="en-US" dirty="0" err="1"/>
+              <a:t>Donec</a:t>
+            </a:r>
+            <a:r>
+              <a:rPr lang="en-US" dirty="0"/>
+              <a:t> </a:t>
+            </a:r>
+            <a:r>
+              <a:rPr lang="en-US" dirty="0" err="1"/>
+              <a:t>convallis</a:t>
+            </a:r>
+            <a:r>
+              <a:rPr lang="en-US" dirty="0"/>
+              <a:t> </a:t>
+            </a:r>
+            <a:r>
+              <a:rPr lang="en-US" dirty="0" err="1"/>
+              <a:t>enim</a:t>
+            </a:r>
+            <a:r>
+              <a:rPr lang="en-US" dirty="0"/>
+              <a:t> in mi </a:t>
+            </a:r>
+            <a:r>
+              <a:rPr lang="en-US" dirty="0" err="1"/>
+              <a:t>lacinia</a:t>
+            </a:r>
+            <a:r>
+              <a:rPr lang="en-US" dirty="0"/>
+              <a:t>, id </a:t>
+            </a:r>
+            <a:r>
+              <a:rPr lang="en-US" dirty="0" err="1"/>
+              <a:t>viverra</a:t>
+            </a:r>
+            <a:r>
+              <a:rPr lang="en-US" dirty="0"/>
+              <a:t> </a:t>
+            </a:r>
+            <a:r>
+              <a:rPr lang="en-US" dirty="0" err="1"/>
+              <a:t>neque</a:t>
+            </a:r>
+            <a:r>
+              <a:rPr lang="en-US" dirty="0"/>
+              <a:t> </a:t>
+            </a:r>
+            <a:r>
+              <a:rPr lang="en-US" dirty="0" err="1"/>
+              <a:t>pretium</a:t>
+            </a:r>
+            <a:r>
+              <a:rPr lang="en-US" dirty="0"/>
+              <a:t>. </a:t>
+            </a:r>
+            <a:r>
+              <a:rPr lang="en-US" dirty="0" err="1"/>
+              <a:t>Phasellus</a:t>
+            </a:r>
+            <a:r>
+              <a:rPr lang="en-US" dirty="0"/>
+              <a:t> et.</a:t>
+            </a:r>
+          </a:p>
+          <a:p>
+            <a:endParaRPr lang="en-US" dirty="0"/>
+          </a:p>
+        </p:txBody>
+      </p:sp>
+    </p:spTree>
+    <p:extLst>
+      <p:ext uri="{BB962C8B-B14F-4D97-AF65-F5344CB8AC3E}">
+        <p14:creationId xmlns:p14="http://schemas.microsoft.com/office/powerpoint/2010/main" val="2354427935"/>
+      </p:ext>
+    </p:extLst>
+  </p:cSld>
+  <p:clrMapOvr>
+    <a:masterClrMapping/>
+  </p:clrMapOvr>
+  <mc:AlternateContent xmlns:mc="http://schemas.openxmlformats.org/markup-compatibility/2006">
+    <mc:Choice xmlns:p14="http://schemas.microsoft.com/office/powerpoint/2010/main" Requires="p14">
+      <p:transition spd="slow" p14:dur="2000"/>
+    </mc:Choice>
+    <mc:Fallback>
+      <p:transition xmlns:p14="http://schemas.microsoft.com/office/powerpoint/2010/main" spd="slow"/>
+    </mc:Fallback>
+  </mc:AlternateContent>
+  <p:timing>
+    <p:tnLst>
+      <p:par>
+        <p:cTn xmlns:p14="http://schemas.microsoft.com/office/powerpoint/2010/main" id="1" dur="indefinite" restart="never" nodeType="tmRoot"/>
+      </p:par>
+    </p:tnLst>
+  </p:timing>
+</p:sld>
+</file>
+
+<file path=ppt/slides/slide19.xml><?xml version="1.0" encoding="utf-8"?>
+<p:sld xmlns:a="http://schemas.openxmlformats.org/drawingml/2006/main" xmlns:r="http://schemas.openxmlformats.org/officeDocument/2006/relationships" xmlns:p="http://schemas.openxmlformats.org/presentationml/2006/main" show="0">
+  <p:cSld>
+    <p:spTree>
+      <p:nvGrpSpPr>
+        <p:cNvPr id="1" name=""/>
+        <p:cNvGrpSpPr/>
+        <p:nvPr/>
+      </p:nvGrpSpPr>
+      <p:grpSpPr>
+        <a:xfrm>
+          <a:off x="0" y="0"/>
+          <a:ext cx="0" cy="0"/>
+          <a:chOff x="0" y="0"/>
+          <a:chExt cx="0" cy="0"/>
+        </a:xfrm>
+      </p:grpSpPr>
+      <p:sp>
+        <p:nvSpPr>
+          <p:cNvPr id="5" name="Title 4"/>
+          <p:cNvSpPr>
+            <a:spLocks noGrp="1"/>
+          </p:cNvSpPr>
+          <p:nvPr>
+            <p:ph type="title"/>
+          </p:nvPr>
+        </p:nvSpPr>
+        <p:spPr/>
+        <p:txBody>
+          <a:bodyPr/>
+          <a:lstStyle/>
+          <a:p>
+            <a:r>
+              <a:rPr lang="en-US" dirty="0" smtClean="0"/>
+              <a:t>Title Only</a:t>
+            </a:r>
+            <a:endParaRPr lang="en-US" dirty="0"/>
+          </a:p>
+        </p:txBody>
+      </p:sp>
+    </p:spTree>
+    <p:extLst>
+      <p:ext uri="{BB962C8B-B14F-4D97-AF65-F5344CB8AC3E}">
+        <p14:creationId xmlns:p14="http://schemas.microsoft.com/office/powerpoint/2010/main" val="1439852271"/>
+      </p:ext>
+    </p:extLst>
+  </p:cSld>
+  <p:clrMapOvr>
+    <a:masterClrMapping/>
+  </p:clrMapOvr>
+  <mc:AlternateContent xmlns:mc="http://schemas.openxmlformats.org/markup-compatibility/2006">
+    <mc:Choice xmlns:p14="http://schemas.microsoft.com/office/powerpoint/2010/main" Requires="p14">
+      <p:transition spd="slow" p14:dur="2000"/>
+    </mc:Choice>
+    <mc:Fallback>
+      <p:transition xmlns:p14="http://schemas.microsoft.com/office/powerpoint/2010/main" spd="slow"/>
+    </mc:Fallback>
+  </mc:AlternateContent>
+  <p:timing>
+    <p:tnLst>
+      <p:par>
+        <p:cTn xmlns:p14="http://schemas.microsoft.com/office/powerpoint/2010/main" id="1" dur="indefinite" restart="never" nodeType="tmRoot"/>
+      </p:par>
+    </p:tnLst>
+  </p:timing>
+</p:sld>
+</file>
+
+<file path=ppt/slides/slide2.xml><?xml version="1.0" encoding="utf-8"?>
+<p:sld xmlns:a="http://schemas.openxmlformats.org/drawingml/2006/main" xmlns:r="http://schemas.openxmlformats.org/officeDocument/2006/relationships" xmlns:p="http://schemas.openxmlformats.org/presentationml/2006/main">
+  <p:cSld>
+    <p:spTree>
+      <p:nvGrpSpPr>
+        <p:cNvPr id="1" name=""/>
+        <p:cNvGrpSpPr/>
+        <p:nvPr/>
+      </p:nvGrpSpPr>
+      <p:grpSpPr>
+        <a:xfrm>
+          <a:off x="0" y="0"/>
+          <a:ext cx="0" cy="0"/>
+          <a:chOff x="0" y="0"/>
+          <a:chExt cx="0" cy="0"/>
+        </a:xfrm>
+      </p:grpSpPr>
+      <p:sp>
+        <p:nvSpPr>
+          <p:cNvPr id="2" name="Title 1"/>
+          <p:cNvSpPr>
+            <a:spLocks noGrp="1"/>
+          </p:cNvSpPr>
+          <p:nvPr>
+            <p:ph type="ctrTitle"/>
+          </p:nvPr>
+        </p:nvSpPr>
+        <p:spPr/>
+        <p:txBody>
+          <a:bodyPr/>
+          <a:lstStyle/>
+          <a:p>
+            <a:r>
+              <a:rPr lang="en-US" dirty="0" smtClean="0"/>
+              <a:t>Developer Workshop</a:t>
+            </a:r>
+            <a:endParaRPr lang="en-US" dirty="0"/>
+          </a:p>
+        </p:txBody>
+      </p:sp>
+      <p:sp>
+        <p:nvSpPr>
+          <p:cNvPr id="3" name="Subtitle 2"/>
+          <p:cNvSpPr>
+            <a:spLocks noGrp="1"/>
+          </p:cNvSpPr>
+          <p:nvPr>
+            <p:ph type="subTitle" idx="1"/>
+          </p:nvPr>
+        </p:nvSpPr>
+        <p:spPr/>
+        <p:txBody>
+          <a:bodyPr/>
+          <a:lstStyle/>
+          <a:p>
+            <a:r>
+              <a:rPr lang="en-US" dirty="0" smtClean="0"/>
+              <a:t>SDK 101</a:t>
+            </a:r>
+            <a:endParaRPr lang="en-US" dirty="0"/>
+          </a:p>
+        </p:txBody>
+      </p:sp>
+    </p:spTree>
+    <p:extLst>
+      <p:ext uri="{BB962C8B-B14F-4D97-AF65-F5344CB8AC3E}">
+        <p14:creationId xmlns:p14="http://schemas.microsoft.com/office/powerpoint/2010/main" val="1399823271"/>
+      </p:ext>
+    </p:extLst>
+  </p:cSld>
+  <p:clrMapOvr>
+    <a:masterClrMapping/>
+  </p:clrMapOvr>
+  <p:timing>
+    <p:tnLst>
+      <p:par>
+        <p:cTn xmlns:p14="http://schemas.microsoft.com/office/powerpoint/2010/main" id="1" dur="indefinite" restart="never" nodeType="tmRoot"/>
+      </p:par>
+    </p:tnLst>
+  </p:timing>
+</p:sld>
+</file>
+
+<file path=ppt/slides/slide20.xml><?xml version="1.0" encoding="utf-8"?>
+<p:sld xmlns:a="http://schemas.openxmlformats.org/drawingml/2006/main" xmlns:r="http://schemas.openxmlformats.org/officeDocument/2006/relationships" xmlns:p="http://schemas.openxmlformats.org/presentationml/2006/main" show="0">
+  <p:cSld>
+    <p:spTree>
+      <p:nvGrpSpPr>
+        <p:cNvPr id="1" name=""/>
+        <p:cNvGrpSpPr/>
+        <p:nvPr/>
+      </p:nvGrpSpPr>
+      <p:grpSpPr>
+        <a:xfrm>
+          <a:off x="0" y="0"/>
+          <a:ext cx="0" cy="0"/>
+          <a:chOff x="0" y="0"/>
+          <a:chExt cx="0" cy="0"/>
+        </a:xfrm>
+      </p:grpSpPr>
+      <p:sp>
+        <p:nvSpPr>
+          <p:cNvPr id="2" name="Title 1"/>
+          <p:cNvSpPr>
+            <a:spLocks noGrp="1"/>
+          </p:cNvSpPr>
+          <p:nvPr>
             <p:ph type="ctrTitle"/>
           </p:nvPr>
         </p:nvSpPr>
@@ -5537,7 +6972,7 @@
 </p:sld>
 </file>
 
-<file path=ppt/slides/slide18.xml><?xml version="1.0" encoding="utf-8"?>
+<file path=ppt/slides/slide21.xml><?xml version="1.0" encoding="utf-8"?>
 <p:sld xmlns:a="http://schemas.openxmlformats.org/drawingml/2006/main" xmlns:r="http://schemas.openxmlformats.org/officeDocument/2006/relationships" xmlns:p="http://schemas.openxmlformats.org/presentationml/2006/main" show="0">
   <p:cSld>
     <p:spTree>
@@ -7159,7 +8594,7 @@
 </p:sld>
 </file>
 
-<file path=ppt/slides/slide19.xml><?xml version="1.0" encoding="utf-8"?>
+<file path=ppt/slides/slide22.xml><?xml version="1.0" encoding="utf-8"?>
 <p:sld xmlns:a="http://schemas.openxmlformats.org/drawingml/2006/main" xmlns:r="http://schemas.openxmlformats.org/officeDocument/2006/relationships" xmlns:p="http://schemas.openxmlformats.org/presentationml/2006/main" show="0">
   <p:cSld>
     <p:spTree>
@@ -7911,90 +9346,7 @@
 </p:sld>
 </file>
 
-<file path=ppt/slides/slide2.xml><?xml version="1.0" encoding="utf-8"?>
-<p:sld xmlns:a="http://schemas.openxmlformats.org/drawingml/2006/main" xmlns:r="http://schemas.openxmlformats.org/officeDocument/2006/relationships" xmlns:p="http://schemas.openxmlformats.org/presentationml/2006/main">
-  <p:cSld>
-    <p:spTree>
-      <p:nvGrpSpPr>
-        <p:cNvPr id="1" name=""/>
-        <p:cNvGrpSpPr/>
-        <p:nvPr/>
-      </p:nvGrpSpPr>
-      <p:grpSpPr>
-        <a:xfrm>
-          <a:off x="0" y="0"/>
-          <a:ext cx="0" cy="0"/>
-          <a:chOff x="0" y="0"/>
-          <a:chExt cx="0" cy="0"/>
-        </a:xfrm>
-      </p:grpSpPr>
-      <p:sp>
-        <p:nvSpPr>
-          <p:cNvPr id="2" name="Title 1"/>
-          <p:cNvSpPr>
-            <a:spLocks noGrp="1"/>
-          </p:cNvSpPr>
-          <p:nvPr>
-            <p:ph type="ctrTitle"/>
-          </p:nvPr>
-        </p:nvSpPr>
-        <p:spPr/>
-        <p:txBody>
-          <a:bodyPr/>
-          <a:lstStyle/>
-          <a:p>
-            <a:r>
-              <a:rPr lang="en-US" dirty="0" smtClean="0"/>
-              <a:t>Developer Workshop</a:t>
-            </a:r>
-            <a:endParaRPr lang="en-US" dirty="0"/>
-          </a:p>
-        </p:txBody>
-      </p:sp>
-      <p:sp>
-        <p:nvSpPr>
-          <p:cNvPr id="3" name="Subtitle 2"/>
-          <p:cNvSpPr>
-            <a:spLocks noGrp="1"/>
-          </p:cNvSpPr>
-          <p:nvPr>
-            <p:ph type="subTitle" idx="1"/>
-          </p:nvPr>
-        </p:nvSpPr>
-        <p:spPr/>
-        <p:txBody>
-          <a:bodyPr/>
-          <a:lstStyle/>
-          <a:p>
-            <a:r>
-              <a:rPr lang="en-US" dirty="0" smtClean="0"/>
-              <a:t>SDK 101</a:t>
-            </a:r>
-            <a:endParaRPr lang="en-US" dirty="0"/>
-          </a:p>
-        </p:txBody>
-      </p:sp>
-    </p:spTree>
-    <p:extLst>
-      <p:ext uri="{BB962C8B-B14F-4D97-AF65-F5344CB8AC3E}">
-        <p14:creationId xmlns:p14="http://schemas.microsoft.com/office/powerpoint/2010/main" val="1399823271"/>
-      </p:ext>
-    </p:extLst>
-  </p:cSld>
-  <p:clrMapOvr>
-    <a:masterClrMapping/>
-  </p:clrMapOvr>
-  <p:timing>
-    <p:tnLst>
-      <p:par>
-        <p:cTn xmlns:p14="http://schemas.microsoft.com/office/powerpoint/2010/main" id="1" dur="indefinite" restart="never" nodeType="tmRoot"/>
-      </p:par>
-    </p:tnLst>
-  </p:timing>
-</p:sld>
-</file>
-
-<file path=ppt/slides/slide20.xml><?xml version="1.0" encoding="utf-8"?>
+<file path=ppt/slides/slide23.xml><?xml version="1.0" encoding="utf-8"?>
 <p:sld xmlns:a="http://schemas.openxmlformats.org/drawingml/2006/main" xmlns:r="http://schemas.openxmlformats.org/officeDocument/2006/relationships" xmlns:p="http://schemas.openxmlformats.org/presentationml/2006/main" show="0">
   <p:cSld>
     <p:spTree>
@@ -8746,7 +10098,7 @@
 </p:sld>
 </file>
 
-<file path=ppt/slides/slide21.xml><?xml version="1.0" encoding="utf-8"?>
+<file path=ppt/slides/slide24.xml><?xml version="1.0" encoding="utf-8"?>
 <p:sld xmlns:a="http://schemas.openxmlformats.org/drawingml/2006/main" xmlns:r="http://schemas.openxmlformats.org/officeDocument/2006/relationships" xmlns:p="http://schemas.openxmlformats.org/presentationml/2006/main" show="0">
   <p:cSld>
     <p:spTree>
@@ -8912,7 +10264,7 @@
 </p:sld>
 </file>
 
-<file path=ppt/slides/slide22.xml><?xml version="1.0" encoding="utf-8"?>
+<file path=ppt/slides/slide25.xml><?xml version="1.0" encoding="utf-8"?>
 <p:sld xmlns:a="http://schemas.openxmlformats.org/drawingml/2006/main" xmlns:r="http://schemas.openxmlformats.org/officeDocument/2006/relationships" xmlns:p="http://schemas.openxmlformats.org/presentationml/2006/main" show="0">
   <p:cSld>
     <p:spTree>
@@ -9078,7 +10430,7 @@
 </p:sld>
 </file>
 
-<file path=ppt/slides/slide23.xml><?xml version="1.0" encoding="utf-8"?>
+<file path=ppt/slides/slide26.xml><?xml version="1.0" encoding="utf-8"?>
 <p:sld xmlns:a="http://schemas.openxmlformats.org/drawingml/2006/main" xmlns:r="http://schemas.openxmlformats.org/officeDocument/2006/relationships" xmlns:p="http://schemas.openxmlformats.org/presentationml/2006/main" show="0">
   <p:cSld>
     <p:spTree>
@@ -9244,7 +10596,7 @@
 </p:sld>
 </file>
 
-<file path=ppt/slides/slide24.xml><?xml version="1.0" encoding="utf-8"?>
+<file path=ppt/slides/slide27.xml><?xml version="1.0" encoding="utf-8"?>
 <p:sld xmlns:a="http://schemas.openxmlformats.org/drawingml/2006/main" xmlns:r="http://schemas.openxmlformats.org/officeDocument/2006/relationships" xmlns:p="http://schemas.openxmlformats.org/presentationml/2006/main" show="0">
   <p:cSld>
     <p:spTree>
@@ -9938,7 +11290,7 @@
 </p:sld>
 </file>
 
-<file path=ppt/slides/slide25.xml><?xml version="1.0" encoding="utf-8"?>
+<file path=ppt/slides/slide28.xml><?xml version="1.0" encoding="utf-8"?>
 <p:sld xmlns:a="http://schemas.openxmlformats.org/drawingml/2006/main" xmlns:r="http://schemas.openxmlformats.org/officeDocument/2006/relationships" xmlns:p="http://schemas.openxmlformats.org/presentationml/2006/main" show="0">
   <p:cSld>
     <p:spTree>
@@ -10188,12 +11540,57 @@
       </p:grpSpPr>
       <p:sp>
         <p:nvSpPr>
-          <p:cNvPr id="2" name="Title 1"/>
+          <p:cNvPr id="4" name="Rechteck 3"/>
+          <p:cNvSpPr/>
+          <p:nvPr/>
+        </p:nvSpPr>
+        <p:spPr>
+          <a:xfrm>
+            <a:off x="0" y="555625"/>
+            <a:ext cx="9144000" cy="4587875"/>
+          </a:xfrm>
+          <a:prstGeom prst="rect">
+            <a:avLst/>
+          </a:prstGeom>
+          <a:solidFill>
+            <a:srgbClr val="FFFF00"/>
+          </a:solidFill>
+          <a:ln>
+            <a:noFill/>
+          </a:ln>
+          <a:effectLst/>
+        </p:spPr>
+        <p:style>
+          <a:lnRef idx="1">
+            <a:schemeClr val="accent1"/>
+          </a:lnRef>
+          <a:fillRef idx="3">
+            <a:schemeClr val="accent1"/>
+          </a:fillRef>
+          <a:effectRef idx="2">
+            <a:schemeClr val="accent1"/>
+          </a:effectRef>
+          <a:fontRef idx="minor">
+            <a:schemeClr val="lt1"/>
+          </a:fontRef>
+        </p:style>
+        <p:txBody>
+          <a:bodyPr rtlCol="0" anchor="ctr"/>
+          <a:lstStyle/>
+          <a:p>
+            <a:pPr algn="ctr"/>
+            <a:endParaRPr lang="de-DE"/>
+          </a:p>
+        </p:txBody>
+      </p:sp>
+      <p:sp>
+        <p:nvSpPr>
+          <p:cNvPr id="2" name="Titel 1"/>
           <p:cNvSpPr>
             <a:spLocks noGrp="1"/>
           </p:cNvSpPr>
           <p:nvPr>
-            <p:ph type="ctrTitle"/>
+            <p:ph type="title"/>
           </p:nvPr>
         </p:nvSpPr>
         <p:spPr/>
@@ -10202,25 +11599,21 @@
           <a:lstStyle/>
           <a:p>
             <a:r>
-              <a:rPr lang="en-US" dirty="0" smtClean="0"/>
-              <a:t>High-Level </a:t>
-            </a:r>
-            <a:r>
-              <a:rPr lang="en-US" dirty="0" smtClean="0"/>
-              <a:t>Architecture</a:t>
-            </a:r>
-            <a:endParaRPr lang="en-US" dirty="0"/>
+              <a:rPr lang="de-DE" dirty="0" smtClean="0"/>
+              <a:t>TODO</a:t>
+            </a:r>
+            <a:endParaRPr lang="de-DE" dirty="0"/>
           </a:p>
         </p:txBody>
       </p:sp>
       <p:sp>
         <p:nvSpPr>
-          <p:cNvPr id="3" name="Subtitle 2"/>
+          <p:cNvPr id="3" name="Inhaltsplatzhalter 2"/>
           <p:cNvSpPr>
             <a:spLocks noGrp="1"/>
           </p:cNvSpPr>
           <p:nvPr>
-            <p:ph type="subTitle" idx="1"/>
+            <p:ph idx="1"/>
           </p:nvPr>
         </p:nvSpPr>
         <p:spPr/>
@@ -10228,27 +11621,208 @@
           <a:bodyPr/>
           <a:lstStyle/>
           <a:p>
-            <a:endParaRPr lang="en-US" dirty="0"/>
+            <a:pPr marL="0" indent="0">
+              <a:buNone/>
+            </a:pPr>
+            <a:r>
+              <a:rPr lang="de-DE" dirty="0" err="1" smtClean="0"/>
+              <a:t>Some</a:t>
+            </a:r>
+            <a:r>
+              <a:rPr lang="de-DE" dirty="0" smtClean="0"/>
+              <a:t> </a:t>
+            </a:r>
+            <a:r>
+              <a:rPr lang="de-DE" dirty="0" err="1" smtClean="0"/>
+              <a:t>slides</a:t>
+            </a:r>
+            <a:r>
+              <a:rPr lang="de-DE" dirty="0" smtClean="0"/>
+              <a:t> </a:t>
+            </a:r>
+            <a:r>
+              <a:rPr lang="de-DE" dirty="0" err="1" smtClean="0"/>
+              <a:t>about</a:t>
+            </a:r>
+            <a:endParaRPr lang="de-DE" dirty="0"/>
+          </a:p>
+          <a:p>
+            <a:pPr marL="0" indent="0">
+              <a:buNone/>
+            </a:pPr>
+            <a:r>
+              <a:rPr lang="de-DE" dirty="0" smtClean="0"/>
+              <a:t>	- </a:t>
+            </a:r>
+            <a:r>
+              <a:rPr lang="de-DE" dirty="0" err="1" smtClean="0"/>
+              <a:t>motivation</a:t>
+            </a:r>
+            <a:r>
+              <a:rPr lang="de-DE" dirty="0" smtClean="0"/>
+              <a:t> (</a:t>
+            </a:r>
+            <a:r>
+              <a:rPr lang="de-DE" dirty="0" err="1" smtClean="0"/>
+              <a:t>why</a:t>
+            </a:r>
+            <a:r>
+              <a:rPr lang="de-DE" dirty="0" smtClean="0"/>
+              <a:t> </a:t>
+            </a:r>
+            <a:r>
+              <a:rPr lang="de-DE" dirty="0" err="1" smtClean="0"/>
+              <a:t>sdks</a:t>
+            </a:r>
+            <a:r>
+              <a:rPr lang="de-DE" dirty="0" smtClean="0"/>
+              <a:t>?)</a:t>
+            </a:r>
+          </a:p>
+          <a:p>
+            <a:pPr marL="0" indent="0">
+              <a:buNone/>
+            </a:pPr>
+            <a:r>
+              <a:rPr lang="de-DE" dirty="0"/>
+              <a:t>	</a:t>
+            </a:r>
+            <a:r>
+              <a:rPr lang="de-DE" dirty="0" smtClean="0"/>
+              <a:t>- </a:t>
+            </a:r>
+            <a:r>
+              <a:rPr lang="de-DE" dirty="0" err="1" smtClean="0"/>
+              <a:t>the</a:t>
+            </a:r>
+            <a:r>
+              <a:rPr lang="de-DE" dirty="0" smtClean="0"/>
+              <a:t> 2.x SDK initiative</a:t>
+            </a:r>
+          </a:p>
+          <a:p>
+            <a:pPr marL="0" indent="0">
+              <a:buNone/>
+            </a:pPr>
+            <a:r>
+              <a:rPr lang="de-DE" dirty="0"/>
+              <a:t>	</a:t>
+            </a:r>
+            <a:r>
+              <a:rPr lang="de-DE" dirty="0" smtClean="0"/>
+              <a:t>- </a:t>
+            </a:r>
+            <a:r>
+              <a:rPr lang="de-DE" dirty="0" err="1" smtClean="0"/>
+              <a:t>what</a:t>
+            </a:r>
+            <a:r>
+              <a:rPr lang="de-DE" dirty="0" smtClean="0"/>
+              <a:t> </a:t>
+            </a:r>
+            <a:r>
+              <a:rPr lang="de-DE" dirty="0" err="1" smtClean="0"/>
+              <a:t>sdks</a:t>
+            </a:r>
+            <a:r>
+              <a:rPr lang="de-DE" dirty="0" smtClean="0"/>
+              <a:t> </a:t>
+            </a:r>
+            <a:r>
+              <a:rPr lang="de-DE" dirty="0" err="1" smtClean="0"/>
+              <a:t>we</a:t>
+            </a:r>
+            <a:r>
+              <a:rPr lang="de-DE" dirty="0" smtClean="0"/>
+              <a:t> </a:t>
+            </a:r>
+            <a:r>
+              <a:rPr lang="de-DE" dirty="0" err="1" smtClean="0"/>
+              <a:t>provide</a:t>
+            </a:r>
+            <a:r>
+              <a:rPr lang="de-DE" dirty="0" smtClean="0"/>
+              <a:t>, a quick </a:t>
+            </a:r>
+            <a:r>
+              <a:rPr lang="de-DE" dirty="0" err="1" smtClean="0"/>
+              <a:t>slide</a:t>
+            </a:r>
+            <a:r>
+              <a:rPr lang="de-DE" dirty="0" smtClean="0"/>
+              <a:t> per </a:t>
+            </a:r>
+            <a:r>
+              <a:rPr lang="de-DE" dirty="0" err="1" smtClean="0"/>
+              <a:t>official</a:t>
+            </a:r>
+            <a:r>
+              <a:rPr lang="de-DE" dirty="0" smtClean="0"/>
+              <a:t> SDK</a:t>
+            </a:r>
+          </a:p>
+          <a:p>
+            <a:pPr marL="0" indent="0">
+              <a:buNone/>
+            </a:pPr>
+            <a:r>
+              <a:rPr lang="de-DE" dirty="0"/>
+              <a:t>	</a:t>
+            </a:r>
+            <a:r>
+              <a:rPr lang="de-DE" dirty="0" smtClean="0"/>
+              <a:t>- </a:t>
+            </a:r>
+            <a:r>
+              <a:rPr lang="de-DE" dirty="0" err="1" smtClean="0"/>
+              <a:t>talking</a:t>
+            </a:r>
+            <a:r>
+              <a:rPr lang="de-DE" dirty="0" smtClean="0"/>
+              <a:t> </a:t>
+            </a:r>
+            <a:r>
+              <a:rPr lang="de-DE" dirty="0" err="1" smtClean="0"/>
+              <a:t>about</a:t>
+            </a:r>
+            <a:r>
+              <a:rPr lang="de-DE" dirty="0" smtClean="0"/>
+              <a:t> </a:t>
+            </a:r>
+            <a:r>
+              <a:rPr lang="de-DE" dirty="0" err="1" smtClean="0"/>
+              <a:t>higher</a:t>
+            </a:r>
+            <a:r>
+              <a:rPr lang="de-DE" dirty="0" smtClean="0"/>
+              <a:t> </a:t>
+            </a:r>
+            <a:r>
+              <a:rPr lang="de-DE" dirty="0" err="1" smtClean="0"/>
+              <a:t>level</a:t>
+            </a:r>
+            <a:r>
+              <a:rPr lang="de-DE" dirty="0" smtClean="0"/>
+              <a:t> </a:t>
+            </a:r>
+            <a:r>
+              <a:rPr lang="de-DE" dirty="0" err="1" smtClean="0"/>
+              <a:t>integration</a:t>
+            </a:r>
+            <a:endParaRPr lang="de-DE" dirty="0"/>
           </a:p>
         </p:txBody>
       </p:sp>
     </p:spTree>
     <p:extLst>
       <p:ext uri="{BB962C8B-B14F-4D97-AF65-F5344CB8AC3E}">
-        <p14:creationId xmlns:p14="http://schemas.microsoft.com/office/powerpoint/2010/main" val="2129075235"/>
+        <p14:creationId xmlns:p14="http://schemas.microsoft.com/office/powerpoint/2010/main" val="3756157473"/>
       </p:ext>
     </p:extLst>
   </p:cSld>
   <p:clrMapOvr>
     <a:masterClrMapping/>
   </p:clrMapOvr>
-  <p:timing>
-    <p:tnLst>
-      <p:par>
-        <p:cTn xmlns:p14="http://schemas.microsoft.com/office/powerpoint/2010/main" id="1" dur="indefinite" restart="never" nodeType="tmRoot"/>
-      </p:par>
-    </p:tnLst>
-  </p:timing>
 </p:sld>
 </file>
 
@@ -10286,7 +11860,11 @@
           <a:p>
             <a:r>
               <a:rPr lang="en-US" dirty="0" smtClean="0"/>
-              <a:t>The API</a:t>
+              <a:t>High-Level </a:t>
+            </a:r>
+            <a:r>
+              <a:rPr lang="en-US" dirty="0" smtClean="0"/>
+              <a:t>Architecture</a:t>
             </a:r>
             <a:endParaRPr lang="en-US" dirty="0"/>
           </a:p>
@@ -10307,10 +11885,6 @@
           <a:bodyPr/>
           <a:lstStyle/>
           <a:p>
-            <a:r>
-              <a:rPr lang="en-US" dirty="0" smtClean="0"/>
-              <a:t>From Clusters to Documents</a:t>
-            </a:r>
             <a:endParaRPr lang="en-US" dirty="0"/>
           </a:p>
         </p:txBody>
@@ -10318,7 +11892,7 @@
     </p:spTree>
     <p:extLst>
       <p:ext uri="{BB962C8B-B14F-4D97-AF65-F5344CB8AC3E}">
-        <p14:creationId xmlns:p14="http://schemas.microsoft.com/office/powerpoint/2010/main" val="1978773241"/>
+        <p14:creationId xmlns:p14="http://schemas.microsoft.com/office/powerpoint/2010/main" val="2129075235"/>
       </p:ext>
     </p:extLst>
   </p:cSld>
@@ -10354,145 +11928,20 @@
       </p:grpSpPr>
       <p:sp>
         <p:nvSpPr>
-          <p:cNvPr id="2" name="Content Placeholder 1"/>
-          <p:cNvSpPr>
-            <a:spLocks noGrp="1"/>
-          </p:cNvSpPr>
-          <p:nvPr>
-            <p:ph idx="1"/>
-          </p:nvPr>
-        </p:nvSpPr>
-        <p:spPr>
-          <a:xfrm>
-            <a:off x="466344" y="685800"/>
-            <a:ext cx="7998595" cy="2128520"/>
-          </a:xfrm>
-        </p:spPr>
-        <p:txBody>
-          <a:bodyPr/>
-          <a:lstStyle/>
-          <a:p>
-            <a:pPr marL="285750" indent="-285750">
-              <a:buFont typeface="Wingdings" charset="2"/>
-              <a:buChar char="§"/>
-            </a:pPr>
-            <a:r>
-              <a:rPr lang="en-US" dirty="0" smtClean="0"/>
-              <a:t>Documents are integral to the </a:t>
-            </a:r>
-            <a:r>
-              <a:rPr lang="en-US" dirty="0" smtClean="0"/>
-              <a:t>SDKs</a:t>
-            </a:r>
-            <a:endParaRPr lang="en-US" dirty="0" smtClean="0"/>
-          </a:p>
-          <a:p>
-            <a:pPr marL="285750" indent="-285750">
-              <a:buFont typeface="Wingdings" charset="2"/>
-              <a:buChar char="§"/>
-            </a:pPr>
-            <a:r>
-              <a:rPr lang="en-US" dirty="0" smtClean="0"/>
-              <a:t>There are many implementations, depending on the content type.</a:t>
-            </a:r>
-          </a:p>
-          <a:p>
-            <a:pPr marL="285750" indent="-285750">
-              <a:buFont typeface="Wingdings" charset="2"/>
-              <a:buChar char="§"/>
-            </a:pPr>
-            <a:endParaRPr lang="en-US" dirty="0"/>
-          </a:p>
-          <a:p>
-            <a:pPr marL="285750" indent="-285750">
-              <a:buFont typeface="Wingdings" charset="2"/>
-              <a:buChar char="§"/>
-            </a:pPr>
-            <a:r>
-              <a:rPr lang="en-US" dirty="0" smtClean="0"/>
-              <a:t>A Document contains:</a:t>
-            </a:r>
-          </a:p>
-          <a:p>
-            <a:pPr marL="285750" indent="-285750">
-              <a:buFont typeface="Wingdings" charset="2"/>
-              <a:buChar char="§"/>
-            </a:pPr>
-            <a:endParaRPr lang="en-US" dirty="0"/>
-          </a:p>
-        </p:txBody>
-      </p:sp>
-      <p:sp>
-        <p:nvSpPr>
-          <p:cNvPr id="3" name="Title 2"/>
-          <p:cNvSpPr>
-            <a:spLocks noGrp="1"/>
-          </p:cNvSpPr>
-          <p:nvPr>
-            <p:ph type="title"/>
-          </p:nvPr>
-        </p:nvSpPr>
-        <p:spPr/>
-        <p:txBody>
-          <a:bodyPr/>
-          <a:lstStyle/>
-          <a:p>
-            <a:r>
-              <a:rPr lang="en-US" dirty="0" smtClean="0"/>
-              <a:t>The Document</a:t>
-            </a:r>
-            <a:endParaRPr lang="en-US" dirty="0"/>
-          </a:p>
-        </p:txBody>
-      </p:sp>
-      <p:sp>
-        <p:nvSpPr>
-          <p:cNvPr id="6" name="TextBox 5"/>
-          <p:cNvSpPr txBox="1"/>
-          <p:nvPr/>
-        </p:nvSpPr>
-        <p:spPr>
-          <a:xfrm>
-            <a:off x="1241632" y="-1364650"/>
-            <a:ext cx="184666" cy="369332"/>
-          </a:xfrm>
-          <a:prstGeom prst="rect">
-            <a:avLst/>
-          </a:prstGeom>
-          <a:noFill/>
-        </p:spPr>
-        <p:txBody>
-          <a:bodyPr wrap="none" rtlCol="0">
-            <a:spAutoFit/>
-          </a:bodyPr>
-          <a:lstStyle/>
-          <a:p>
-            <a:endParaRPr lang="en-US" dirty="0" err="1">
-              <a:solidFill>
-                <a:srgbClr val="333333"/>
-              </a:solidFill>
-              <a:latin typeface="Arial"/>
-              <a:cs typeface="Arial"/>
-            </a:endParaRPr>
-          </a:p>
-        </p:txBody>
-      </p:sp>
-      <p:sp>
-        <p:nvSpPr>
-          <p:cNvPr id="7" name="Rectangle 6"/>
+          <p:cNvPr id="4" name="Rechteck 3"/>
           <p:cNvSpPr/>
           <p:nvPr/>
         </p:nvSpPr>
         <p:spPr>
           <a:xfrm>
-            <a:off x="2928734" y="-1895348"/>
-            <a:ext cx="2521175" cy="1222500"/>
+            <a:off x="0" y="555625"/>
+            <a:ext cx="9144000" cy="4587875"/>
           </a:xfrm>
           <a:prstGeom prst="rect">
             <a:avLst/>
           </a:prstGeom>
           <a:solidFill>
-            <a:schemeClr val="accent1"/>
+            <a:srgbClr val="FFFF00"/>
           </a:solidFill>
           <a:ln>
             <a:noFill/>
@@ -10518,723 +11967,298 @@
           <a:lstStyle/>
           <a:p>
             <a:pPr algn="ctr"/>
-            <a:r>
-              <a:rPr lang="en-US" dirty="0" smtClean="0">
-                <a:solidFill>
-                  <a:srgbClr val="333333"/>
-                </a:solidFill>
-                <a:latin typeface="Arial"/>
-                <a:cs typeface="Arial"/>
-              </a:rPr>
-              <a:t>j</a:t>
-            </a:r>
-            <a:endParaRPr lang="en-US" dirty="0">
-              <a:solidFill>
-                <a:srgbClr val="333333"/>
-              </a:solidFill>
-              <a:latin typeface="Arial"/>
-              <a:cs typeface="Arial"/>
-            </a:endParaRPr>
+            <a:endParaRPr lang="de-DE"/>
           </a:p>
         </p:txBody>
       </p:sp>
-      <p:graphicFrame>
-        <p:nvGraphicFramePr>
-          <p:cNvPr id="9" name="Table 4"/>
-          <p:cNvGraphicFramePr>
-            <a:graphicFrameLocks noGrp="1"/>
-          </p:cNvGraphicFramePr>
+      <p:sp>
+        <p:nvSpPr>
+          <p:cNvPr id="2" name="Titel 1"/>
+          <p:cNvSpPr>
+            <a:spLocks noGrp="1"/>
+          </p:cNvSpPr>
           <p:nvPr>
-            <p:extLst>
-              <p:ext uri="{D42A27DB-BD31-4B8C-83A1-F6EECF244321}">
-                <p14:modId xmlns:p14="http://schemas.microsoft.com/office/powerpoint/2010/main" val="873057609"/>
-              </p:ext>
-            </p:extLst>
+            <p:ph type="title"/>
           </p:nvPr>
-        </p:nvGraphicFramePr>
-        <p:xfrm>
-          <a:off x="1680836" y="2902382"/>
-          <a:ext cx="6233804" cy="1523999"/>
-        </p:xfrm>
-        <a:graphic>
-          <a:graphicData uri="http://schemas.openxmlformats.org/drawingml/2006/table">
-            <a:tbl>
-              <a:tblPr>
-                <a:tableStyleId>{5C22544A-7EE6-4342-B048-85BDC9FD1C3A}</a:tableStyleId>
-              </a:tblPr>
-              <a:tblGrid>
-                <a:gridCol w="2271404"/>
-                <a:gridCol w="3962400"/>
-              </a:tblGrid>
-              <a:tr h="205456">
-                <a:tc>
-                  <a:txBody>
-                    <a:bodyPr/>
-                    <a:lstStyle/>
-                    <a:p>
-                      <a:pPr algn="ctr"/>
-                      <a:r>
-                        <a:rPr lang="en-US" sz="1400" b="1" dirty="0" smtClean="0">
-                          <a:solidFill>
-                            <a:schemeClr val="bg1"/>
-                          </a:solidFill>
-                        </a:rPr>
-                        <a:t>Property</a:t>
-                      </a:r>
-                      <a:endParaRPr lang="en-US" sz="1400" b="1" dirty="0">
-                        <a:solidFill>
-                          <a:schemeClr val="bg1"/>
-                        </a:solidFill>
-                      </a:endParaRPr>
-                    </a:p>
-                  </a:txBody>
-                  <a:tcPr anchor="ctr">
-                    <a:lnL w="9525" cap="flat" cmpd="sng" algn="ctr">
-                      <a:solidFill>
-                        <a:srgbClr val="E40121"/>
-                      </a:solidFill>
-                      <a:prstDash val="solid"/>
-                      <a:round/>
-                      <a:headEnd type="none" w="med" len="med"/>
-                      <a:tailEnd type="none" w="med" len="med"/>
-                    </a:lnL>
-                    <a:lnR w="12700" cmpd="sng">
-                      <a:noFill/>
-                    </a:lnR>
-                    <a:lnT w="9525" cap="flat" cmpd="sng" algn="ctr">
-                      <a:solidFill>
-                        <a:srgbClr val="E40121"/>
-                      </a:solidFill>
-                      <a:prstDash val="solid"/>
-                      <a:round/>
-                      <a:headEnd type="none" w="med" len="med"/>
-                      <a:tailEnd type="none" w="med" len="med"/>
-                    </a:lnT>
-                    <a:lnB w="9525" cap="flat" cmpd="sng" algn="ctr">
-                      <a:solidFill>
-                        <a:srgbClr val="E40121"/>
-                      </a:solidFill>
-                      <a:prstDash val="solid"/>
-                      <a:round/>
-                      <a:headEnd type="none" w="med" len="med"/>
-                      <a:tailEnd type="none" w="med" len="med"/>
-                    </a:lnB>
-                    <a:solidFill>
-                      <a:srgbClr val="E40121"/>
-                    </a:solidFill>
-                  </a:tcPr>
-                </a:tc>
-                <a:tc>
-                  <a:txBody>
-                    <a:bodyPr/>
-                    <a:lstStyle/>
-                    <a:p>
-                      <a:pPr algn="ctr"/>
-                      <a:r>
-                        <a:rPr lang="en-US" sz="1400" b="1" dirty="0" smtClean="0">
-                          <a:solidFill>
-                            <a:schemeClr val="bg1"/>
-                          </a:solidFill>
-                        </a:rPr>
-                        <a:t>Desc</a:t>
-                      </a:r>
-                      <a:r>
-                        <a:rPr lang="en-US" sz="1400" b="1" baseline="0" dirty="0" smtClean="0">
-                          <a:solidFill>
-                            <a:schemeClr val="bg1"/>
-                          </a:solidFill>
-                        </a:rPr>
-                        <a:t>ription</a:t>
-                      </a:r>
-                      <a:endParaRPr lang="en-US" sz="1400" b="1" dirty="0">
-                        <a:solidFill>
-                          <a:schemeClr val="bg1"/>
-                        </a:solidFill>
-                      </a:endParaRPr>
-                    </a:p>
-                  </a:txBody>
-                  <a:tcPr anchor="ctr">
-                    <a:lnL w="12700" cmpd="sng">
-                      <a:noFill/>
-                    </a:lnL>
-                    <a:lnR w="12700" cmpd="sng">
-                      <a:noFill/>
-                    </a:lnR>
-                    <a:lnT w="9525" cap="flat" cmpd="sng" algn="ctr">
-                      <a:solidFill>
-                        <a:srgbClr val="E40121"/>
-                      </a:solidFill>
-                      <a:prstDash val="solid"/>
-                      <a:round/>
-                      <a:headEnd type="none" w="med" len="med"/>
-                      <a:tailEnd type="none" w="med" len="med"/>
-                    </a:lnT>
-                    <a:lnB w="9525" cap="flat" cmpd="sng" algn="ctr">
-                      <a:solidFill>
-                        <a:srgbClr val="E40121"/>
-                      </a:solidFill>
-                      <a:prstDash val="solid"/>
-                      <a:round/>
-                      <a:headEnd type="none" w="med" len="med"/>
-                      <a:tailEnd type="none" w="med" len="med"/>
-                    </a:lnB>
-                    <a:solidFill>
-                      <a:srgbClr val="E40121"/>
-                    </a:solidFill>
-                  </a:tcPr>
-                </a:tc>
-              </a:tr>
-              <a:tr h="205456">
-                <a:tc>
-                  <a:txBody>
-                    <a:bodyPr/>
-                    <a:lstStyle/>
-                    <a:p>
-                      <a:r>
-                        <a:rPr lang="en-US" sz="1400" b="1" dirty="0" smtClean="0">
-                          <a:solidFill>
-                            <a:schemeClr val="tx1"/>
-                          </a:solidFill>
-                        </a:rPr>
-                        <a:t>ID</a:t>
-                      </a:r>
-                      <a:endParaRPr lang="en-US" sz="1400" b="1" dirty="0">
-                        <a:solidFill>
-                          <a:schemeClr val="tx1"/>
-                        </a:solidFill>
-                      </a:endParaRPr>
-                    </a:p>
-                  </a:txBody>
-                  <a:tcPr anchor="ctr">
-                    <a:lnL w="9525" cap="flat" cmpd="sng" algn="ctr">
-                      <a:solidFill>
-                        <a:srgbClr val="E40121"/>
-                      </a:solidFill>
-                      <a:prstDash val="solid"/>
-                      <a:round/>
-                      <a:headEnd type="none" w="med" len="med"/>
-                      <a:tailEnd type="none" w="med" len="med"/>
-                    </a:lnL>
-                    <a:lnR w="9525" cap="flat" cmpd="sng" algn="ctr">
-                      <a:solidFill>
-                        <a:srgbClr val="E40121"/>
-                      </a:solidFill>
-                      <a:prstDash val="solid"/>
-                      <a:round/>
-                      <a:headEnd type="none" w="med" len="med"/>
-                      <a:tailEnd type="none" w="med" len="med"/>
-                    </a:lnR>
-                    <a:lnT w="9525" cap="flat" cmpd="sng" algn="ctr">
-                      <a:solidFill>
-                        <a:srgbClr val="E40121"/>
-                      </a:solidFill>
-                      <a:prstDash val="solid"/>
-                      <a:round/>
-                      <a:headEnd type="none" w="med" len="med"/>
-                      <a:tailEnd type="none" w="med" len="med"/>
-                    </a:lnT>
-                    <a:lnB w="9525" cap="flat" cmpd="sng" algn="ctr">
-                      <a:solidFill>
-                        <a:srgbClr val="E40121"/>
-                      </a:solidFill>
-                      <a:prstDash val="solid"/>
-                      <a:round/>
-                      <a:headEnd type="none" w="med" len="med"/>
-                      <a:tailEnd type="none" w="med" len="med"/>
-                    </a:lnB>
-                    <a:noFill/>
-                  </a:tcPr>
-                </a:tc>
-                <a:tc>
-                  <a:txBody>
-                    <a:bodyPr/>
-                    <a:lstStyle/>
-                    <a:p>
-                      <a:pPr marL="0" marR="0" indent="0" algn="l" defTabSz="457200" rtl="0" eaLnBrk="1" fontAlgn="auto" latinLnBrk="0" hangingPunct="1">
-                        <a:lnSpc>
-                          <a:spcPct val="100000"/>
-                        </a:lnSpc>
-                        <a:spcBef>
-                          <a:spcPts val="0"/>
-                        </a:spcBef>
-                        <a:spcAft>
-                          <a:spcPts val="0"/>
-                        </a:spcAft>
-                        <a:buClrTx/>
-                        <a:buSzTx/>
-                        <a:buFontTx/>
-                        <a:buNone/>
-                        <a:tabLst/>
-                        <a:defRPr/>
-                      </a:pPr>
-                      <a:r>
-                        <a:rPr lang="en-US" sz="1400" dirty="0" smtClean="0"/>
-                        <a:t>The bucket-unique identifier</a:t>
-                      </a:r>
-                    </a:p>
-                  </a:txBody>
-                  <a:tcPr>
-                    <a:lnL w="9525" cap="flat" cmpd="sng" algn="ctr">
-                      <a:solidFill>
-                        <a:srgbClr val="E40121"/>
-                      </a:solidFill>
-                      <a:prstDash val="solid"/>
-                      <a:round/>
-                      <a:headEnd type="none" w="med" len="med"/>
-                      <a:tailEnd type="none" w="med" len="med"/>
-                    </a:lnL>
-                    <a:lnR w="9525" cap="flat" cmpd="sng" algn="ctr">
-                      <a:solidFill>
-                        <a:srgbClr val="E40121"/>
-                      </a:solidFill>
-                      <a:prstDash val="solid"/>
-                      <a:round/>
-                      <a:headEnd type="none" w="med" len="med"/>
-                      <a:tailEnd type="none" w="med" len="med"/>
-                    </a:lnR>
-                    <a:lnT w="9525" cap="flat" cmpd="sng" algn="ctr">
-                      <a:solidFill>
-                        <a:srgbClr val="E40121"/>
-                      </a:solidFill>
-                      <a:prstDash val="solid"/>
-                      <a:round/>
-                      <a:headEnd type="none" w="med" len="med"/>
-                      <a:tailEnd type="none" w="med" len="med"/>
-                    </a:lnT>
-                    <a:lnB w="9525" cap="flat" cmpd="sng" algn="ctr">
-                      <a:solidFill>
-                        <a:srgbClr val="E40121"/>
-                      </a:solidFill>
-                      <a:prstDash val="solid"/>
-                      <a:round/>
-                      <a:headEnd type="none" w="med" len="med"/>
-                      <a:tailEnd type="none" w="med" len="med"/>
-                    </a:lnB>
-                    <a:noFill/>
-                  </a:tcPr>
-                </a:tc>
-              </a:tr>
-              <a:tr h="205456">
-                <a:tc>
-                  <a:txBody>
-                    <a:bodyPr/>
-                    <a:lstStyle/>
-                    <a:p>
-                      <a:r>
-                        <a:rPr lang="en-US" sz="1400" b="1" dirty="0" smtClean="0">
-                          <a:solidFill>
-                            <a:schemeClr val="tx1"/>
-                          </a:solidFill>
-                        </a:rPr>
-                        <a:t>Content</a:t>
-                      </a:r>
-                      <a:endParaRPr lang="en-US" sz="1400" b="1" dirty="0">
-                        <a:solidFill>
-                          <a:schemeClr val="tx1"/>
-                        </a:solidFill>
-                      </a:endParaRPr>
-                    </a:p>
-                  </a:txBody>
-                  <a:tcPr>
-                    <a:lnL w="9525" cap="flat" cmpd="sng" algn="ctr">
-                      <a:solidFill>
-                        <a:srgbClr val="E40121"/>
-                      </a:solidFill>
-                      <a:prstDash val="solid"/>
-                      <a:round/>
-                      <a:headEnd type="none" w="med" len="med"/>
-                      <a:tailEnd type="none" w="med" len="med"/>
-                    </a:lnL>
-                    <a:lnR w="9525" cap="flat" cmpd="sng" algn="ctr">
-                      <a:solidFill>
-                        <a:srgbClr val="E40121"/>
-                      </a:solidFill>
-                      <a:prstDash val="solid"/>
-                      <a:round/>
-                      <a:headEnd type="none" w="med" len="med"/>
-                      <a:tailEnd type="none" w="med" len="med"/>
-                    </a:lnR>
-                    <a:lnT w="9525" cap="flat" cmpd="sng" algn="ctr">
-                      <a:solidFill>
-                        <a:srgbClr val="E40121"/>
-                      </a:solidFill>
-                      <a:prstDash val="solid"/>
-                      <a:round/>
-                      <a:headEnd type="none" w="med" len="med"/>
-                      <a:tailEnd type="none" w="med" len="med"/>
-                    </a:lnT>
-                    <a:lnB w="9525" cap="flat" cmpd="sng" algn="ctr">
-                      <a:solidFill>
-                        <a:srgbClr val="E40121"/>
-                      </a:solidFill>
-                      <a:prstDash val="solid"/>
-                      <a:round/>
-                      <a:headEnd type="none" w="med" len="med"/>
-                      <a:tailEnd type="none" w="med" len="med"/>
-                    </a:lnB>
-                    <a:noFill/>
-                  </a:tcPr>
-                </a:tc>
-                <a:tc>
-                  <a:txBody>
-                    <a:bodyPr/>
-                    <a:lstStyle/>
-                    <a:p>
-                      <a:pPr marL="0" marR="0" indent="0" algn="l" defTabSz="457200" rtl="0" eaLnBrk="1" fontAlgn="auto" latinLnBrk="0" hangingPunct="1">
-                        <a:lnSpc>
-                          <a:spcPct val="100000"/>
-                        </a:lnSpc>
-                        <a:spcBef>
-                          <a:spcPts val="0"/>
-                        </a:spcBef>
-                        <a:spcAft>
-                          <a:spcPts val="0"/>
-                        </a:spcAft>
-                        <a:buClrTx/>
-                        <a:buSzTx/>
-                        <a:buFontTx/>
-                        <a:buNone/>
-                        <a:tabLst/>
-                        <a:defRPr/>
-                      </a:pPr>
-                      <a:r>
-                        <a:rPr lang="en-US" sz="1400" dirty="0" smtClean="0"/>
-                        <a:t>The value that is stored</a:t>
-                      </a:r>
-                    </a:p>
-                  </a:txBody>
-                  <a:tcPr>
-                    <a:lnL w="9525" cap="flat" cmpd="sng" algn="ctr">
-                      <a:solidFill>
-                        <a:srgbClr val="E40121"/>
-                      </a:solidFill>
-                      <a:prstDash val="solid"/>
-                      <a:round/>
-                      <a:headEnd type="none" w="med" len="med"/>
-                      <a:tailEnd type="none" w="med" len="med"/>
-                    </a:lnL>
-                    <a:lnR w="9525" cap="flat" cmpd="sng" algn="ctr">
-                      <a:solidFill>
-                        <a:srgbClr val="E40121"/>
-                      </a:solidFill>
-                      <a:prstDash val="solid"/>
-                      <a:round/>
-                      <a:headEnd type="none" w="med" len="med"/>
-                      <a:tailEnd type="none" w="med" len="med"/>
-                    </a:lnR>
-                    <a:lnT w="9525" cap="flat" cmpd="sng" algn="ctr">
-                      <a:solidFill>
-                        <a:srgbClr val="E40121"/>
-                      </a:solidFill>
-                      <a:prstDash val="solid"/>
-                      <a:round/>
-                      <a:headEnd type="none" w="med" len="med"/>
-                      <a:tailEnd type="none" w="med" len="med"/>
-                    </a:lnT>
-                    <a:lnB w="9525" cap="flat" cmpd="sng" algn="ctr">
-                      <a:solidFill>
-                        <a:srgbClr val="E40121"/>
-                      </a:solidFill>
-                      <a:prstDash val="solid"/>
-                      <a:round/>
-                      <a:headEnd type="none" w="med" len="med"/>
-                      <a:tailEnd type="none" w="med" len="med"/>
-                    </a:lnB>
-                    <a:noFill/>
-                  </a:tcPr>
-                </a:tc>
-              </a:tr>
-              <a:tr h="205456">
-                <a:tc>
-                  <a:txBody>
-                    <a:bodyPr/>
-                    <a:lstStyle/>
-                    <a:p>
-                      <a:r>
-                        <a:rPr lang="en-US" sz="1400" b="1" dirty="0" smtClean="0">
-                          <a:solidFill>
-                            <a:schemeClr val="tx1"/>
-                          </a:solidFill>
-                        </a:rPr>
-                        <a:t>Expiry</a:t>
-                      </a:r>
-                      <a:endParaRPr lang="en-US" sz="1400" b="1" dirty="0">
-                        <a:solidFill>
-                          <a:schemeClr val="tx1"/>
-                        </a:solidFill>
-                      </a:endParaRPr>
-                    </a:p>
-                  </a:txBody>
-                  <a:tcPr>
-                    <a:lnL w="9525" cap="flat" cmpd="sng" algn="ctr">
-                      <a:solidFill>
-                        <a:srgbClr val="E40121"/>
-                      </a:solidFill>
-                      <a:prstDash val="solid"/>
-                      <a:round/>
-                      <a:headEnd type="none" w="med" len="med"/>
-                      <a:tailEnd type="none" w="med" len="med"/>
-                    </a:lnL>
-                    <a:lnR w="9525" cap="flat" cmpd="sng" algn="ctr">
-                      <a:solidFill>
-                        <a:srgbClr val="E40121"/>
-                      </a:solidFill>
-                      <a:prstDash val="solid"/>
-                      <a:round/>
-                      <a:headEnd type="none" w="med" len="med"/>
-                      <a:tailEnd type="none" w="med" len="med"/>
-                    </a:lnR>
-                    <a:lnT w="9525" cap="flat" cmpd="sng" algn="ctr">
-                      <a:solidFill>
-                        <a:srgbClr val="E40121"/>
-                      </a:solidFill>
-                      <a:prstDash val="solid"/>
-                      <a:round/>
-                      <a:headEnd type="none" w="med" len="med"/>
-                      <a:tailEnd type="none" w="med" len="med"/>
-                    </a:lnT>
-                    <a:lnB w="9525" cap="flat" cmpd="sng" algn="ctr">
-                      <a:solidFill>
-                        <a:srgbClr val="E40121"/>
-                      </a:solidFill>
-                      <a:prstDash val="solid"/>
-                      <a:round/>
-                      <a:headEnd type="none" w="med" len="med"/>
-                      <a:tailEnd type="none" w="med" len="med"/>
-                    </a:lnB>
-                    <a:noFill/>
-                  </a:tcPr>
-                </a:tc>
-                <a:tc>
-                  <a:txBody>
-                    <a:bodyPr/>
-                    <a:lstStyle/>
-                    <a:p>
-                      <a:pPr marL="0" marR="0" indent="0" algn="l" defTabSz="457200" rtl="0" eaLnBrk="1" fontAlgn="auto" latinLnBrk="0" hangingPunct="1">
-                        <a:lnSpc>
-                          <a:spcPct val="100000"/>
-                        </a:lnSpc>
-                        <a:spcBef>
-                          <a:spcPts val="0"/>
-                        </a:spcBef>
-                        <a:spcAft>
-                          <a:spcPts val="0"/>
-                        </a:spcAft>
-                        <a:buClrTx/>
-                        <a:buSzTx/>
-                        <a:buFontTx/>
-                        <a:buNone/>
-                        <a:tabLst/>
-                        <a:defRPr/>
-                      </a:pPr>
-                      <a:r>
-                        <a:rPr lang="en-US" sz="1400" dirty="0" smtClean="0"/>
-                        <a:t>An expiration</a:t>
-                      </a:r>
-                      <a:r>
-                        <a:rPr lang="en-US" sz="1400" baseline="0" dirty="0" smtClean="0"/>
-                        <a:t> time</a:t>
-                      </a:r>
-                      <a:endParaRPr lang="en-US" sz="1400" dirty="0" smtClean="0"/>
-                    </a:p>
-                  </a:txBody>
-                  <a:tcPr>
-                    <a:lnL w="9525" cap="flat" cmpd="sng" algn="ctr">
-                      <a:solidFill>
-                        <a:srgbClr val="E40121"/>
-                      </a:solidFill>
-                      <a:prstDash val="solid"/>
-                      <a:round/>
-                      <a:headEnd type="none" w="med" len="med"/>
-                      <a:tailEnd type="none" w="med" len="med"/>
-                    </a:lnL>
-                    <a:lnR w="9525" cap="flat" cmpd="sng" algn="ctr">
-                      <a:solidFill>
-                        <a:srgbClr val="E40121"/>
-                      </a:solidFill>
-                      <a:prstDash val="solid"/>
-                      <a:round/>
-                      <a:headEnd type="none" w="med" len="med"/>
-                      <a:tailEnd type="none" w="med" len="med"/>
-                    </a:lnR>
-                    <a:lnT w="9525" cap="flat" cmpd="sng" algn="ctr">
-                      <a:solidFill>
-                        <a:srgbClr val="E40121"/>
-                      </a:solidFill>
-                      <a:prstDash val="solid"/>
-                      <a:round/>
-                      <a:headEnd type="none" w="med" len="med"/>
-                      <a:tailEnd type="none" w="med" len="med"/>
-                    </a:lnT>
-                    <a:lnB w="9525" cap="flat" cmpd="sng" algn="ctr">
-                      <a:solidFill>
-                        <a:srgbClr val="E40121"/>
-                      </a:solidFill>
-                      <a:prstDash val="solid"/>
-                      <a:round/>
-                      <a:headEnd type="none" w="med" len="med"/>
-                      <a:tailEnd type="none" w="med" len="med"/>
-                    </a:lnB>
-                    <a:noFill/>
-                  </a:tcPr>
-                </a:tc>
-              </a:tr>
-              <a:tr h="205456">
-                <a:tc>
-                  <a:txBody>
-                    <a:bodyPr/>
-                    <a:lstStyle/>
-                    <a:p>
-                      <a:r>
-                        <a:rPr lang="en-US" sz="1400" b="1" dirty="0" smtClean="0">
-                          <a:solidFill>
-                            <a:schemeClr val="tx1"/>
-                          </a:solidFill>
-                        </a:rPr>
-                        <a:t>CAS</a:t>
-                      </a:r>
-                      <a:endParaRPr lang="en-US" sz="1400" b="1" dirty="0">
-                        <a:solidFill>
-                          <a:schemeClr val="tx1"/>
-                        </a:solidFill>
-                      </a:endParaRPr>
-                    </a:p>
-                  </a:txBody>
-                  <a:tcPr>
-                    <a:lnL w="9525" cap="flat" cmpd="sng" algn="ctr">
-                      <a:solidFill>
-                        <a:srgbClr val="E40121"/>
-                      </a:solidFill>
-                      <a:prstDash val="solid"/>
-                      <a:round/>
-                      <a:headEnd type="none" w="med" len="med"/>
-                      <a:tailEnd type="none" w="med" len="med"/>
-                    </a:lnL>
-                    <a:lnR w="9525" cap="flat" cmpd="sng" algn="ctr">
-                      <a:solidFill>
-                        <a:srgbClr val="E40121"/>
-                      </a:solidFill>
-                      <a:prstDash val="solid"/>
-                      <a:round/>
-                      <a:headEnd type="none" w="med" len="med"/>
-                      <a:tailEnd type="none" w="med" len="med"/>
-                    </a:lnR>
-                    <a:lnT w="9525" cap="flat" cmpd="sng" algn="ctr">
-                      <a:solidFill>
-                        <a:srgbClr val="E40121"/>
-                      </a:solidFill>
-                      <a:prstDash val="solid"/>
-                      <a:round/>
-                      <a:headEnd type="none" w="med" len="med"/>
-                      <a:tailEnd type="none" w="med" len="med"/>
-                    </a:lnT>
-                    <a:lnB w="9525" cap="flat" cmpd="sng" algn="ctr">
-                      <a:solidFill>
-                        <a:srgbClr val="E40121"/>
-                      </a:solidFill>
-                      <a:prstDash val="solid"/>
-                      <a:round/>
-                      <a:headEnd type="none" w="med" len="med"/>
-                      <a:tailEnd type="none" w="med" len="med"/>
-                    </a:lnB>
-                    <a:noFill/>
-                  </a:tcPr>
-                </a:tc>
-                <a:tc>
-                  <a:txBody>
-                    <a:bodyPr/>
-                    <a:lstStyle/>
-                    <a:p>
-                      <a:pPr marL="0" marR="0" indent="0" algn="l" defTabSz="457200" rtl="0" eaLnBrk="1" fontAlgn="auto" latinLnBrk="0" hangingPunct="1">
-                        <a:lnSpc>
-                          <a:spcPct val="100000"/>
-                        </a:lnSpc>
-                        <a:spcBef>
-                          <a:spcPts val="0"/>
-                        </a:spcBef>
-                        <a:spcAft>
-                          <a:spcPts val="0"/>
-                        </a:spcAft>
-                        <a:buClrTx/>
-                        <a:buSzTx/>
-                        <a:buFontTx/>
-                        <a:buNone/>
-                        <a:tabLst/>
-                        <a:defRPr/>
-                      </a:pPr>
-                      <a:r>
-                        <a:rPr lang="en-US" sz="1400" dirty="0" smtClean="0"/>
-                        <a:t>The Compare-And-Swap</a:t>
-                      </a:r>
-                      <a:r>
-                        <a:rPr lang="en-US" sz="1400" baseline="0" dirty="0" smtClean="0"/>
-                        <a:t> identifier</a:t>
-                      </a:r>
-                      <a:endParaRPr lang="en-US" sz="1400" dirty="0" smtClean="0"/>
-                    </a:p>
-                  </a:txBody>
-                  <a:tcPr>
-                    <a:lnL w="9525" cap="flat" cmpd="sng" algn="ctr">
-                      <a:solidFill>
-                        <a:srgbClr val="E40121"/>
-                      </a:solidFill>
-                      <a:prstDash val="solid"/>
-                      <a:round/>
-                      <a:headEnd type="none" w="med" len="med"/>
-                      <a:tailEnd type="none" w="med" len="med"/>
-                    </a:lnL>
-                    <a:lnR w="9525" cap="flat" cmpd="sng" algn="ctr">
-                      <a:solidFill>
-                        <a:srgbClr val="E40121"/>
-                      </a:solidFill>
-                      <a:prstDash val="solid"/>
-                      <a:round/>
-                      <a:headEnd type="none" w="med" len="med"/>
-                      <a:tailEnd type="none" w="med" len="med"/>
-                    </a:lnR>
-                    <a:lnT w="9525" cap="flat" cmpd="sng" algn="ctr">
-                      <a:solidFill>
-                        <a:srgbClr val="E40121"/>
-                      </a:solidFill>
-                      <a:prstDash val="solid"/>
-                      <a:round/>
-                      <a:headEnd type="none" w="med" len="med"/>
-                      <a:tailEnd type="none" w="med" len="med"/>
-                    </a:lnT>
-                    <a:lnB w="9525" cap="flat" cmpd="sng" algn="ctr">
-                      <a:solidFill>
-                        <a:srgbClr val="E40121"/>
-                      </a:solidFill>
-                      <a:prstDash val="solid"/>
-                      <a:round/>
-                      <a:headEnd type="none" w="med" len="med"/>
-                      <a:tailEnd type="none" w="med" len="med"/>
-                    </a:lnB>
-                    <a:noFill/>
-                  </a:tcPr>
-                </a:tc>
-              </a:tr>
-            </a:tbl>
-          </a:graphicData>
-        </a:graphic>
-      </p:graphicFrame>
+        </p:nvSpPr>
+        <p:spPr/>
+        <p:txBody>
+          <a:bodyPr/>
+          <a:lstStyle/>
+          <a:p>
+            <a:r>
+              <a:rPr lang="de-DE" dirty="0" smtClean="0"/>
+              <a:t>TODO</a:t>
+            </a:r>
+            <a:endParaRPr lang="de-DE" dirty="0"/>
+          </a:p>
+        </p:txBody>
+      </p:sp>
+      <p:sp>
+        <p:nvSpPr>
+          <p:cNvPr id="3" name="Inhaltsplatzhalter 2"/>
+          <p:cNvSpPr>
+            <a:spLocks noGrp="1"/>
+          </p:cNvSpPr>
+          <p:nvPr>
+            <p:ph idx="1"/>
+          </p:nvPr>
+        </p:nvSpPr>
+        <p:spPr/>
+        <p:txBody>
+          <a:bodyPr/>
+          <a:lstStyle/>
+          <a:p>
+            <a:pPr marL="0" indent="0">
+              <a:buNone/>
+            </a:pPr>
+            <a:r>
+              <a:rPr lang="de-DE" dirty="0" err="1" smtClean="0"/>
+              <a:t>Some</a:t>
+            </a:r>
+            <a:r>
+              <a:rPr lang="de-DE" dirty="0" smtClean="0"/>
+              <a:t> </a:t>
+            </a:r>
+            <a:r>
+              <a:rPr lang="de-DE" dirty="0" err="1" smtClean="0"/>
+              <a:t>slides</a:t>
+            </a:r>
+            <a:r>
+              <a:rPr lang="de-DE" dirty="0" smtClean="0"/>
+              <a:t> </a:t>
+            </a:r>
+            <a:r>
+              <a:rPr lang="de-DE" dirty="0" err="1" smtClean="0"/>
+              <a:t>about</a:t>
+            </a:r>
+            <a:endParaRPr lang="de-DE" dirty="0"/>
+          </a:p>
+          <a:p>
+            <a:pPr marL="0" indent="0">
+              <a:buNone/>
+            </a:pPr>
+            <a:r>
+              <a:rPr lang="de-DE" dirty="0" smtClean="0"/>
+              <a:t>	- </a:t>
+            </a:r>
+            <a:r>
+              <a:rPr lang="de-DE" dirty="0" err="1" smtClean="0"/>
+              <a:t>how</a:t>
+            </a:r>
+            <a:r>
+              <a:rPr lang="de-DE" dirty="0" smtClean="0"/>
+              <a:t> </a:t>
+            </a:r>
+            <a:r>
+              <a:rPr lang="de-DE" dirty="0" err="1" smtClean="0"/>
+              <a:t>the</a:t>
+            </a:r>
+            <a:r>
+              <a:rPr lang="de-DE" dirty="0" smtClean="0"/>
+              <a:t> </a:t>
+            </a:r>
+            <a:r>
+              <a:rPr lang="de-DE" dirty="0" err="1" smtClean="0"/>
+              <a:t>sdk</a:t>
+            </a:r>
+            <a:r>
+              <a:rPr lang="de-DE" dirty="0" smtClean="0"/>
+              <a:t> </a:t>
+            </a:r>
+            <a:r>
+              <a:rPr lang="de-DE" dirty="0" err="1" smtClean="0"/>
+              <a:t>connects</a:t>
+            </a:r>
+            <a:r>
+              <a:rPr lang="de-DE" dirty="0" smtClean="0"/>
+              <a:t> </a:t>
+            </a:r>
+            <a:r>
+              <a:rPr lang="de-DE" dirty="0" err="1" smtClean="0"/>
+              <a:t>and</a:t>
+            </a:r>
+            <a:r>
+              <a:rPr lang="de-DE" dirty="0" smtClean="0"/>
+              <a:t> </a:t>
+            </a:r>
+            <a:r>
+              <a:rPr lang="de-DE" dirty="0" err="1" smtClean="0"/>
+              <a:t>grabs</a:t>
+            </a:r>
+            <a:r>
+              <a:rPr lang="de-DE" dirty="0" smtClean="0"/>
+              <a:t> </a:t>
+            </a:r>
+            <a:r>
+              <a:rPr lang="de-DE" dirty="0" err="1" smtClean="0"/>
+              <a:t>the</a:t>
+            </a:r>
+            <a:r>
+              <a:rPr lang="de-DE" dirty="0" smtClean="0"/>
+              <a:t> </a:t>
+            </a:r>
+            <a:r>
+              <a:rPr lang="de-DE" dirty="0" err="1" smtClean="0"/>
+              <a:t>config</a:t>
+            </a:r>
+            <a:endParaRPr lang="de-DE" dirty="0" smtClean="0"/>
+          </a:p>
+          <a:p>
+            <a:pPr marL="0" indent="0">
+              <a:buNone/>
+            </a:pPr>
+            <a:r>
+              <a:rPr lang="de-DE" dirty="0"/>
+              <a:t>	</a:t>
+            </a:r>
+            <a:r>
+              <a:rPr lang="de-DE" dirty="0" smtClean="0"/>
+              <a:t>- </a:t>
+            </a:r>
+            <a:r>
+              <a:rPr lang="de-DE" dirty="0" err="1" smtClean="0"/>
+              <a:t>supported</a:t>
+            </a:r>
+            <a:r>
+              <a:rPr lang="de-DE" dirty="0" smtClean="0"/>
+              <a:t> </a:t>
+            </a:r>
+            <a:r>
+              <a:rPr lang="de-DE" dirty="0" err="1" smtClean="0"/>
+              <a:t>setups</a:t>
+            </a:r>
+            <a:r>
+              <a:rPr lang="de-DE" dirty="0" smtClean="0"/>
+              <a:t>/</a:t>
+            </a:r>
+            <a:r>
+              <a:rPr lang="de-DE" dirty="0" err="1" smtClean="0"/>
+              <a:t>constraints</a:t>
+            </a:r>
+            <a:endParaRPr lang="de-DE" dirty="0" smtClean="0"/>
+          </a:p>
+          <a:p>
+            <a:pPr marL="0" indent="0">
+              <a:buNone/>
+            </a:pPr>
+            <a:r>
+              <a:rPr lang="de-DE" dirty="0"/>
+              <a:t>	</a:t>
+            </a:r>
+            <a:r>
+              <a:rPr lang="de-DE" dirty="0" smtClean="0"/>
+              <a:t>- </a:t>
+            </a:r>
+            <a:r>
+              <a:rPr lang="de-DE" dirty="0" err="1" smtClean="0"/>
+              <a:t>things</a:t>
+            </a:r>
+            <a:r>
+              <a:rPr lang="de-DE" dirty="0" smtClean="0"/>
+              <a:t> </a:t>
+            </a:r>
+            <a:r>
+              <a:rPr lang="de-DE" dirty="0" err="1" smtClean="0"/>
+              <a:t>to</a:t>
+            </a:r>
+            <a:r>
+              <a:rPr lang="de-DE" dirty="0" smtClean="0"/>
+              <a:t> </a:t>
+            </a:r>
+            <a:r>
+              <a:rPr lang="de-DE" dirty="0" err="1" smtClean="0"/>
+              <a:t>watch</a:t>
+            </a:r>
+            <a:r>
+              <a:rPr lang="de-DE" dirty="0" smtClean="0"/>
+              <a:t> out</a:t>
+            </a:r>
+          </a:p>
+          <a:p>
+            <a:pPr marL="0" indent="0">
+              <a:buNone/>
+            </a:pPr>
+            <a:endParaRPr lang="de-DE" dirty="0"/>
+          </a:p>
+          <a:p>
+            <a:pPr marL="0" indent="0">
+              <a:buNone/>
+            </a:pPr>
+            <a:r>
+              <a:rPr lang="de-DE" dirty="0" err="1" smtClean="0"/>
+              <a:t>Maybe</a:t>
+            </a:r>
+            <a:r>
+              <a:rPr lang="de-DE" dirty="0" smtClean="0"/>
+              <a:t> </a:t>
+            </a:r>
+            <a:r>
+              <a:rPr lang="de-DE" dirty="0" err="1" smtClean="0"/>
+              <a:t>some</a:t>
+            </a:r>
+            <a:r>
+              <a:rPr lang="de-DE" dirty="0" smtClean="0"/>
+              <a:t> </a:t>
+            </a:r>
+            <a:r>
+              <a:rPr lang="de-DE" dirty="0" err="1" smtClean="0"/>
+              <a:t>sdk-specific</a:t>
+            </a:r>
+            <a:r>
+              <a:rPr lang="de-DE" dirty="0" smtClean="0"/>
+              <a:t> </a:t>
+            </a:r>
+            <a:r>
+              <a:rPr lang="de-DE" dirty="0" err="1" smtClean="0"/>
+              <a:t>slides</a:t>
+            </a:r>
+            <a:r>
+              <a:rPr lang="de-DE" dirty="0" smtClean="0"/>
+              <a:t>? </a:t>
+            </a:r>
+            <a:r>
+              <a:rPr lang="de-DE" dirty="0" err="1" smtClean="0"/>
+              <a:t>java</a:t>
+            </a:r>
+            <a:r>
+              <a:rPr lang="de-DE" dirty="0" smtClean="0"/>
+              <a:t>, </a:t>
+            </a:r>
+            <a:r>
+              <a:rPr lang="de-DE" dirty="0" err="1" smtClean="0"/>
+              <a:t>lcb</a:t>
+            </a:r>
+            <a:r>
+              <a:rPr lang="de-DE" dirty="0" smtClean="0"/>
+              <a:t>, .net API </a:t>
+            </a:r>
+            <a:r>
+              <a:rPr lang="de-DE" dirty="0" err="1" smtClean="0"/>
+              <a:t>architecture</a:t>
+            </a:r>
+            <a:r>
+              <a:rPr lang="de-DE" dirty="0" smtClean="0"/>
+              <a:t> </a:t>
+            </a:r>
+            <a:r>
+              <a:rPr lang="de-DE" dirty="0" err="1" smtClean="0"/>
+              <a:t>specifics</a:t>
+            </a:r>
+            <a:endParaRPr lang="de-DE" dirty="0"/>
+          </a:p>
+        </p:txBody>
+      </p:sp>
     </p:spTree>
     <p:extLst>
       <p:ext uri="{BB962C8B-B14F-4D97-AF65-F5344CB8AC3E}">
-        <p14:creationId xmlns:p14="http://schemas.microsoft.com/office/powerpoint/2010/main" val="636974870"/>
+        <p14:creationId xmlns:p14="http://schemas.microsoft.com/office/powerpoint/2010/main" val="580740631"/>
       </p:ext>
     </p:extLst>
   </p:cSld>
   <p:clrMapOvr>
     <a:masterClrMapping/>
   </p:clrMapOvr>
-  <p:timing>
-    <p:tnLst>
-      <p:par>
-        <p:cTn xmlns:p14="http://schemas.microsoft.com/office/powerpoint/2010/main" id="1" dur="indefinite" restart="never" nodeType="tmRoot"/>
-      </p:par>
-    </p:tnLst>
-  </p:timing>
 </p:sld>
 </file>
 
@@ -11257,12 +12281,12 @@
       </p:grpSpPr>
       <p:sp>
         <p:nvSpPr>
-          <p:cNvPr id="3" name="Title 2"/>
+          <p:cNvPr id="2" name="Title 1"/>
           <p:cNvSpPr>
             <a:spLocks noGrp="1"/>
           </p:cNvSpPr>
           <p:nvPr>
-            <p:ph type="title"/>
+            <p:ph type="ctrTitle"/>
           </p:nvPr>
         </p:nvSpPr>
         <p:spPr/>
@@ -11272,7 +12296,7 @@
           <a:p>
             <a:r>
               <a:rPr lang="en-US" dirty="0" smtClean="0"/>
-              <a:t>The Document</a:t>
+              <a:t>The API</a:t>
             </a:r>
             <a:endParaRPr lang="en-US" dirty="0"/>
           </a:p>
@@ -11280,131 +12304,31 @@
       </p:sp>
       <p:sp>
         <p:nvSpPr>
-          <p:cNvPr id="6" name="TextBox 5"/>
-          <p:cNvSpPr txBox="1"/>
-          <p:nvPr/>
+          <p:cNvPr id="3" name="Subtitle 2"/>
+          <p:cNvSpPr>
+            <a:spLocks noGrp="1"/>
+          </p:cNvSpPr>
+          <p:nvPr>
+            <p:ph type="subTitle" idx="1"/>
+          </p:nvPr>
         </p:nvSpPr>
-        <p:spPr>
-          <a:xfrm>
-            <a:off x="1241632" y="-1364650"/>
-            <a:ext cx="184666" cy="369332"/>
-          </a:xfrm>
-          <a:prstGeom prst="rect">
-            <a:avLst/>
-          </a:prstGeom>
-          <a:noFill/>
-        </p:spPr>
+        <p:spPr/>
         <p:txBody>
-          <a:bodyPr wrap="none" rtlCol="0">
-            <a:spAutoFit/>
-          </a:bodyPr>
+          <a:bodyPr/>
           <a:lstStyle/>
           <a:p>
-            <a:endParaRPr lang="en-US" dirty="0" err="1">
-              <a:solidFill>
-                <a:srgbClr val="333333"/>
-              </a:solidFill>
-              <a:latin typeface="Arial"/>
-              <a:cs typeface="Arial"/>
-            </a:endParaRPr>
+            <a:r>
+              <a:rPr lang="en-US" dirty="0" smtClean="0"/>
+              <a:t>From Clusters to Documents</a:t>
+            </a:r>
+            <a:endParaRPr lang="en-US" dirty="0"/>
           </a:p>
         </p:txBody>
       </p:sp>
-      <p:sp>
-        <p:nvSpPr>
-          <p:cNvPr id="7" name="Rectangle 6"/>
-          <p:cNvSpPr/>
-          <p:nvPr/>
-        </p:nvSpPr>
-        <p:spPr>
-          <a:xfrm>
-            <a:off x="2928734" y="-1895348"/>
-            <a:ext cx="2521175" cy="1222500"/>
-          </a:xfrm>
-          <a:prstGeom prst="rect">
-            <a:avLst/>
-          </a:prstGeom>
-          <a:solidFill>
-            <a:schemeClr val="accent1"/>
-          </a:solidFill>
-          <a:ln>
-            <a:noFill/>
-          </a:ln>
-          <a:effectLst/>
-        </p:spPr>
-        <p:style>
-          <a:lnRef idx="1">
-            <a:schemeClr val="accent1"/>
-          </a:lnRef>
-          <a:fillRef idx="3">
-            <a:schemeClr val="accent1"/>
-          </a:fillRef>
-          <a:effectRef idx="2">
-            <a:schemeClr val="accent1"/>
-          </a:effectRef>
-          <a:fontRef idx="minor">
-            <a:schemeClr val="lt1"/>
-          </a:fontRef>
-        </p:style>
-        <p:txBody>
-          <a:bodyPr rtlCol="0" anchor="ctr"/>
-          <a:lstStyle/>
-          <a:p>
-            <a:pPr algn="ctr"/>
-            <a:r>
-              <a:rPr lang="en-US" dirty="0" smtClean="0">
-                <a:solidFill>
-                  <a:srgbClr val="333333"/>
-                </a:solidFill>
-                <a:latin typeface="Arial"/>
-                <a:cs typeface="Arial"/>
-              </a:rPr>
-              <a:t>j</a:t>
-            </a:r>
-            <a:endParaRPr lang="en-US" dirty="0">
-              <a:solidFill>
-                <a:srgbClr val="333333"/>
-              </a:solidFill>
-              <a:latin typeface="Arial"/>
-              <a:cs typeface="Arial"/>
-            </a:endParaRPr>
-          </a:p>
-        </p:txBody>
-      </p:sp>
-      <p:pic>
-        <p:nvPicPr>
-          <p:cNvPr id="10" name="Picture 9" descr="Screen Shot 2014-09-18 at 13.40.07.png"/>
-          <p:cNvPicPr>
-            <a:picLocks noChangeAspect="1"/>
-          </p:cNvPicPr>
-          <p:nvPr/>
-        </p:nvPicPr>
-        <p:blipFill>
-          <a:blip r:embed="rId2">
-            <a:extLst>
-              <a:ext uri="{28A0092B-C50C-407E-A947-70E740481C1C}">
-                <a14:useLocalDpi xmlns:a14="http://schemas.microsoft.com/office/drawing/2010/main" val="0"/>
-              </a:ext>
-            </a:extLst>
-          </a:blip>
-          <a:stretch>
-            <a:fillRect/>
-          </a:stretch>
-        </p:blipFill>
-        <p:spPr>
-          <a:xfrm>
-            <a:off x="2322135" y="823570"/>
-            <a:ext cx="4812793" cy="3773410"/>
-          </a:xfrm>
-          <a:prstGeom prst="rect">
-            <a:avLst/>
-          </a:prstGeom>
-        </p:spPr>
-      </p:pic>
     </p:spTree>
     <p:extLst>
       <p:ext uri="{BB962C8B-B14F-4D97-AF65-F5344CB8AC3E}">
-        <p14:creationId xmlns:p14="http://schemas.microsoft.com/office/powerpoint/2010/main" val="667413171"/>
+        <p14:creationId xmlns:p14="http://schemas.microsoft.com/office/powerpoint/2010/main" val="1978773241"/>
       </p:ext>
     </p:extLst>
   </p:cSld>
@@ -11440,185 +12364,20 @@
       </p:grpSpPr>
       <p:sp>
         <p:nvSpPr>
-          <p:cNvPr id="2" name="Content Placeholder 1"/>
-          <p:cNvSpPr>
-            <a:spLocks noGrp="1"/>
-          </p:cNvSpPr>
-          <p:nvPr>
-            <p:ph idx="1"/>
-          </p:nvPr>
-        </p:nvSpPr>
-        <p:spPr/>
-        <p:txBody>
-          <a:bodyPr/>
-          <a:lstStyle/>
-          <a:p>
-            <a:pPr marL="285750" indent="-285750">
-              <a:buFont typeface="Wingdings" charset="2"/>
-              <a:buChar char="§"/>
-            </a:pPr>
-            <a:r>
-              <a:rPr lang="en-US" dirty="0" smtClean="0"/>
-              <a:t>Document implementations are language specific.</a:t>
-            </a:r>
-          </a:p>
-          <a:p>
-            <a:pPr marL="285750" indent="-285750">
-              <a:buFont typeface="Wingdings" charset="2"/>
-              <a:buChar char="§"/>
-            </a:pPr>
-            <a:r>
-              <a:rPr lang="en-US" dirty="0" smtClean="0"/>
-              <a:t>All support JSON in its different forms.</a:t>
-            </a:r>
-          </a:p>
-          <a:p>
-            <a:pPr marL="285750" indent="-285750">
-              <a:buFont typeface="Wingdings" charset="2"/>
-              <a:buChar char="§"/>
-            </a:pPr>
-            <a:endParaRPr lang="en-US" dirty="0"/>
-          </a:p>
-          <a:p>
-            <a:pPr marL="285750" indent="-285750">
-              <a:buFont typeface="Wingdings" charset="2"/>
-              <a:buChar char="§"/>
-            </a:pPr>
-            <a:r>
-              <a:rPr lang="en-US" dirty="0" smtClean="0"/>
-              <a:t>In addition, some support:</a:t>
-            </a:r>
-          </a:p>
-          <a:p>
-            <a:pPr marL="587375" lvl="1" indent="-285750">
-              <a:buFont typeface="Wingdings" charset="2"/>
-              <a:buChar char="§"/>
-            </a:pPr>
-            <a:r>
-              <a:rPr lang="en-US" dirty="0" smtClean="0"/>
-              <a:t>Serialized objects</a:t>
-            </a:r>
-          </a:p>
-          <a:p>
-            <a:pPr marL="587375" lvl="1" indent="-285750">
-              <a:buFont typeface="Wingdings" charset="2"/>
-              <a:buChar char="§"/>
-            </a:pPr>
-            <a:r>
-              <a:rPr lang="en-US" dirty="0" smtClean="0"/>
-              <a:t>Unquoted Strings</a:t>
-            </a:r>
-          </a:p>
-          <a:p>
-            <a:pPr marL="587375" lvl="1" indent="-285750">
-              <a:buFont typeface="Wingdings" charset="2"/>
-              <a:buChar char="§"/>
-            </a:pPr>
-            <a:r>
-              <a:rPr lang="en-US" dirty="0" smtClean="0"/>
-              <a:t>Binary pass-through</a:t>
-            </a:r>
-          </a:p>
-          <a:p>
-            <a:pPr marL="587375" lvl="1" indent="-285750">
-              <a:buFont typeface="Wingdings" charset="2"/>
-              <a:buChar char="§"/>
-            </a:pPr>
-            <a:r>
-              <a:rPr lang="en-US" dirty="0" smtClean="0"/>
-              <a:t>Legacy</a:t>
-            </a:r>
-          </a:p>
-          <a:p>
-            <a:pPr marL="587375" lvl="1" indent="-285750">
-              <a:buFont typeface="Wingdings" charset="2"/>
-              <a:buChar char="§"/>
-            </a:pPr>
-            <a:r>
-              <a:rPr lang="en-US" dirty="0" smtClean="0"/>
-              <a:t>…</a:t>
-            </a:r>
-          </a:p>
-          <a:p>
-            <a:pPr marL="587375" lvl="1" indent="-285750">
-              <a:buFont typeface="Wingdings" charset="2"/>
-              <a:buChar char="§"/>
-            </a:pPr>
-            <a:endParaRPr lang="en-US" dirty="0"/>
-          </a:p>
-        </p:txBody>
-      </p:sp>
-      <p:sp>
-        <p:nvSpPr>
-          <p:cNvPr id="3" name="Title 2"/>
-          <p:cNvSpPr>
-            <a:spLocks noGrp="1"/>
-          </p:cNvSpPr>
-          <p:nvPr>
-            <p:ph type="title"/>
-          </p:nvPr>
-        </p:nvSpPr>
-        <p:spPr/>
-        <p:txBody>
-          <a:bodyPr/>
-          <a:lstStyle/>
-          <a:p>
-            <a:r>
-              <a:rPr lang="en-US" dirty="0" smtClean="0"/>
-              <a:t>Document Implementations</a:t>
-            </a:r>
-            <a:endParaRPr lang="en-US" dirty="0"/>
-          </a:p>
-        </p:txBody>
-      </p:sp>
-      <p:sp>
-        <p:nvSpPr>
-          <p:cNvPr id="6" name="TextBox 5"/>
-          <p:cNvSpPr txBox="1"/>
-          <p:nvPr/>
-        </p:nvSpPr>
-        <p:spPr>
-          <a:xfrm>
-            <a:off x="1241632" y="-1364650"/>
-            <a:ext cx="184666" cy="369332"/>
-          </a:xfrm>
-          <a:prstGeom prst="rect">
-            <a:avLst/>
-          </a:prstGeom>
-          <a:noFill/>
-        </p:spPr>
-        <p:txBody>
-          <a:bodyPr wrap="none" rtlCol="0">
-            <a:spAutoFit/>
-          </a:bodyPr>
-          <a:lstStyle/>
-          <a:p>
-            <a:endParaRPr lang="en-US" dirty="0" err="1">
-              <a:solidFill>
-                <a:srgbClr val="333333"/>
-              </a:solidFill>
-              <a:latin typeface="Arial"/>
-              <a:cs typeface="Arial"/>
-            </a:endParaRPr>
-          </a:p>
-        </p:txBody>
-      </p:sp>
-      <p:sp>
-        <p:nvSpPr>
-          <p:cNvPr id="7" name="Rectangle 6"/>
+          <p:cNvPr id="4" name="Rechteck 3"/>
           <p:cNvSpPr/>
           <p:nvPr/>
         </p:nvSpPr>
         <p:spPr>
           <a:xfrm>
-            <a:off x="2928734" y="-1895348"/>
-            <a:ext cx="2521175" cy="1222500"/>
+            <a:off x="0" y="555625"/>
+            <a:ext cx="9144000" cy="4587875"/>
           </a:xfrm>
           <a:prstGeom prst="rect">
             <a:avLst/>
           </a:prstGeom>
           <a:solidFill>
-            <a:schemeClr val="accent1"/>
+            <a:srgbClr val="FFFF00"/>
           </a:solidFill>
           <a:ln>
             <a:noFill/>
@@ -11644,43 +12403,244 @@
           <a:lstStyle/>
           <a:p>
             <a:pPr algn="ctr"/>
-            <a:r>
-              <a:rPr lang="en-US" dirty="0" smtClean="0">
-                <a:solidFill>
-                  <a:srgbClr val="333333"/>
-                </a:solidFill>
-                <a:latin typeface="Arial"/>
-                <a:cs typeface="Arial"/>
-              </a:rPr>
-              <a:t>j</a:t>
-            </a:r>
-            <a:endParaRPr lang="en-US" dirty="0">
-              <a:solidFill>
-                <a:srgbClr val="333333"/>
-              </a:solidFill>
-              <a:latin typeface="Arial"/>
-              <a:cs typeface="Arial"/>
-            </a:endParaRPr>
+            <a:endParaRPr lang="de-DE"/>
+          </a:p>
+        </p:txBody>
+      </p:sp>
+      <p:sp>
+        <p:nvSpPr>
+          <p:cNvPr id="2" name="Titel 1"/>
+          <p:cNvSpPr>
+            <a:spLocks noGrp="1"/>
+          </p:cNvSpPr>
+          <p:nvPr>
+            <p:ph type="title"/>
+          </p:nvPr>
+        </p:nvSpPr>
+        <p:spPr/>
+        <p:txBody>
+          <a:bodyPr/>
+          <a:lstStyle/>
+          <a:p>
+            <a:r>
+              <a:rPr lang="de-DE" dirty="0" smtClean="0"/>
+              <a:t>TODO</a:t>
+            </a:r>
+            <a:endParaRPr lang="de-DE" dirty="0"/>
+          </a:p>
+        </p:txBody>
+      </p:sp>
+      <p:sp>
+        <p:nvSpPr>
+          <p:cNvPr id="3" name="Inhaltsplatzhalter 2"/>
+          <p:cNvSpPr>
+            <a:spLocks noGrp="1"/>
+          </p:cNvSpPr>
+          <p:nvPr>
+            <p:ph idx="1"/>
+          </p:nvPr>
+        </p:nvSpPr>
+        <p:spPr/>
+        <p:txBody>
+          <a:bodyPr/>
+          <a:lstStyle/>
+          <a:p>
+            <a:pPr marL="0" indent="0">
+              <a:buNone/>
+            </a:pPr>
+            <a:r>
+              <a:rPr lang="de-DE" dirty="0" err="1" smtClean="0"/>
+              <a:t>Some</a:t>
+            </a:r>
+            <a:r>
+              <a:rPr lang="de-DE" dirty="0" smtClean="0"/>
+              <a:t> </a:t>
+            </a:r>
+            <a:r>
+              <a:rPr lang="de-DE" dirty="0" err="1" smtClean="0"/>
+              <a:t>slides</a:t>
+            </a:r>
+            <a:r>
+              <a:rPr lang="de-DE" dirty="0" smtClean="0"/>
+              <a:t> </a:t>
+            </a:r>
+            <a:r>
+              <a:rPr lang="de-DE" dirty="0" err="1" smtClean="0"/>
+              <a:t>about</a:t>
+            </a:r>
+            <a:endParaRPr lang="de-DE" dirty="0"/>
+          </a:p>
+          <a:p>
+            <a:pPr marL="0" indent="0">
+              <a:buNone/>
+            </a:pPr>
+            <a:r>
+              <a:rPr lang="de-DE" dirty="0" smtClean="0"/>
+              <a:t>	Cluster</a:t>
+            </a:r>
+          </a:p>
+          <a:p>
+            <a:pPr marL="0" indent="0">
+              <a:buNone/>
+            </a:pPr>
+            <a:r>
+              <a:rPr lang="de-DE" dirty="0"/>
+              <a:t>	</a:t>
+            </a:r>
+            <a:r>
+              <a:rPr lang="de-DE" dirty="0" err="1" smtClean="0"/>
+              <a:t>Bucket</a:t>
+            </a:r>
+            <a:r>
+              <a:rPr lang="de-DE" dirty="0" smtClean="0"/>
+              <a:t> (</a:t>
+            </a:r>
+            <a:r>
+              <a:rPr lang="de-DE" dirty="0" err="1" smtClean="0"/>
+              <a:t>incl</a:t>
+            </a:r>
+            <a:r>
+              <a:rPr lang="de-DE" dirty="0" smtClean="0"/>
+              <a:t> </a:t>
+            </a:r>
+            <a:r>
+              <a:rPr lang="de-DE" dirty="0" err="1" smtClean="0"/>
+              <a:t>overview</a:t>
+            </a:r>
+            <a:r>
+              <a:rPr lang="de-DE" dirty="0" smtClean="0"/>
+              <a:t> </a:t>
+            </a:r>
+            <a:r>
+              <a:rPr lang="de-DE" dirty="0" err="1" smtClean="0"/>
+              <a:t>of</a:t>
+            </a:r>
+            <a:r>
+              <a:rPr lang="de-DE" dirty="0" smtClean="0"/>
+              <a:t> </a:t>
+            </a:r>
+            <a:r>
+              <a:rPr lang="de-DE" dirty="0" err="1" smtClean="0"/>
+              <a:t>methods</a:t>
+            </a:r>
+            <a:r>
+              <a:rPr lang="de-DE" dirty="0" smtClean="0"/>
+              <a:t>)</a:t>
+            </a:r>
+          </a:p>
+          <a:p>
+            <a:pPr marL="0" indent="0">
+              <a:buNone/>
+            </a:pPr>
+            <a:r>
+              <a:rPr lang="de-DE" dirty="0" smtClean="0"/>
+              <a:t>	</a:t>
+            </a:r>
+          </a:p>
+          <a:p>
+            <a:pPr marL="0" indent="0">
+              <a:buNone/>
+            </a:pPr>
+            <a:r>
+              <a:rPr lang="de-DE" dirty="0"/>
+              <a:t>	</a:t>
+            </a:r>
+            <a:r>
+              <a:rPr lang="de-DE" dirty="0" err="1" smtClean="0"/>
+              <a:t>ClusterManager</a:t>
+            </a:r>
+            <a:endParaRPr lang="de-DE" dirty="0" smtClean="0"/>
+          </a:p>
+          <a:p>
+            <a:pPr marL="0" indent="0">
+              <a:buNone/>
+            </a:pPr>
+            <a:r>
+              <a:rPr lang="de-DE" dirty="0"/>
+              <a:t>	</a:t>
+            </a:r>
+            <a:r>
+              <a:rPr lang="de-DE" dirty="0" err="1" smtClean="0"/>
+              <a:t>BucketManager</a:t>
+            </a:r>
+            <a:endParaRPr lang="de-DE" dirty="0" smtClean="0"/>
+          </a:p>
+          <a:p>
+            <a:pPr marL="0" indent="0">
+              <a:buNone/>
+            </a:pPr>
+            <a:endParaRPr lang="de-DE" dirty="0"/>
+          </a:p>
+          <a:p>
+            <a:pPr marL="0" indent="0">
+              <a:buNone/>
+            </a:pPr>
+            <a:r>
+              <a:rPr lang="de-DE" dirty="0" err="1" smtClean="0"/>
+              <a:t>Maybe</a:t>
+            </a:r>
+            <a:r>
+              <a:rPr lang="de-DE" dirty="0" smtClean="0"/>
+              <a:t> </a:t>
+            </a:r>
+            <a:r>
+              <a:rPr lang="de-DE" dirty="0" err="1" smtClean="0"/>
+              <a:t>some</a:t>
+            </a:r>
+            <a:r>
+              <a:rPr lang="de-DE" dirty="0" smtClean="0"/>
+              <a:t> </a:t>
+            </a:r>
+            <a:r>
+              <a:rPr lang="de-DE" dirty="0" err="1" smtClean="0"/>
+              <a:t>sdk-specific</a:t>
+            </a:r>
+            <a:r>
+              <a:rPr lang="de-DE" dirty="0" smtClean="0"/>
+              <a:t> </a:t>
+            </a:r>
+            <a:r>
+              <a:rPr lang="de-DE" dirty="0" err="1" smtClean="0"/>
+              <a:t>slides</a:t>
+            </a:r>
+            <a:r>
+              <a:rPr lang="de-DE" dirty="0" smtClean="0"/>
+              <a:t>? </a:t>
+            </a:r>
+            <a:r>
+              <a:rPr lang="de-DE" dirty="0" err="1" smtClean="0"/>
+              <a:t>java</a:t>
+            </a:r>
+            <a:r>
+              <a:rPr lang="de-DE" dirty="0" smtClean="0"/>
+              <a:t>, </a:t>
+            </a:r>
+            <a:r>
+              <a:rPr lang="de-DE" dirty="0" err="1" smtClean="0"/>
+              <a:t>lcb</a:t>
+            </a:r>
+            <a:r>
+              <a:rPr lang="de-DE" dirty="0" smtClean="0"/>
+              <a:t>, .net API </a:t>
+            </a:r>
+            <a:r>
+              <a:rPr lang="de-DE" dirty="0" err="1" smtClean="0"/>
+              <a:t>samples</a:t>
+            </a:r>
+            <a:endParaRPr lang="de-DE" dirty="0"/>
           </a:p>
         </p:txBody>
       </p:sp>
     </p:spTree>
     <p:extLst>
       <p:ext uri="{BB962C8B-B14F-4D97-AF65-F5344CB8AC3E}">
-        <p14:creationId xmlns:p14="http://schemas.microsoft.com/office/powerpoint/2010/main" val="1499859300"/>
+        <p14:creationId xmlns:p14="http://schemas.microsoft.com/office/powerpoint/2010/main" val="1185238011"/>
       </p:ext>
     </p:extLst>
   </p:cSld>
   <p:clrMapOvr>
     <a:masterClrMapping/>
   </p:clrMapOvr>
-  <p:timing>
-    <p:tnLst>
-      <p:par>
-        <p:cTn xmlns:p14="http://schemas.microsoft.com/office/powerpoint/2010/main" id="1" dur="indefinite" restart="never" nodeType="tmRoot"/>
-      </p:par>
-    </p:tnLst>
-  </p:timing>
 </p:sld>
 </file>
 

</xml_diff>

<commit_message>
more content on sdk bucket api
</commit_message>
<xml_diff>
--- a/server/presentations/02_SDKs.pptx
+++ b/server/presentations/02_SDKs.pptx
@@ -5,40 +5,48 @@
     <p:sldMasterId id="2147483648" r:id="rId1"/>
   </p:sldMasterIdLst>
   <p:notesMasterIdLst>
-    <p:notesMasterId r:id="rId30"/>
+    <p:notesMasterId r:id="rId38"/>
   </p:notesMasterIdLst>
   <p:handoutMasterIdLst>
-    <p:handoutMasterId r:id="rId31"/>
+    <p:handoutMasterId r:id="rId39"/>
   </p:handoutMasterIdLst>
   <p:sldIdLst>
-    <p:sldId id="282" r:id="rId2"/>
-    <p:sldId id="256" r:id="rId3"/>
-    <p:sldId id="286" r:id="rId4"/>
-    <p:sldId id="283" r:id="rId5"/>
-    <p:sldId id="296" r:id="rId6"/>
-    <p:sldId id="285" r:id="rId7"/>
-    <p:sldId id="295" r:id="rId8"/>
-    <p:sldId id="284" r:id="rId9"/>
-    <p:sldId id="294" r:id="rId10"/>
-    <p:sldId id="287" r:id="rId11"/>
-    <p:sldId id="288" r:id="rId12"/>
-    <p:sldId id="289" r:id="rId13"/>
-    <p:sldId id="290" r:id="rId14"/>
-    <p:sldId id="291" r:id="rId15"/>
-    <p:sldId id="292" r:id="rId16"/>
-    <p:sldId id="267" r:id="rId17"/>
-    <p:sldId id="279" r:id="rId18"/>
-    <p:sldId id="280" r:id="rId19"/>
-    <p:sldId id="281" r:id="rId20"/>
-    <p:sldId id="264" r:id="rId21"/>
-    <p:sldId id="270" r:id="rId22"/>
-    <p:sldId id="276" r:id="rId23"/>
-    <p:sldId id="277" r:id="rId24"/>
-    <p:sldId id="272" r:id="rId25"/>
-    <p:sldId id="275" r:id="rId26"/>
-    <p:sldId id="273" r:id="rId27"/>
-    <p:sldId id="274" r:id="rId28"/>
-    <p:sldId id="269" r:id="rId29"/>
+    <p:sldId id="256" r:id="rId2"/>
+    <p:sldId id="286" r:id="rId3"/>
+    <p:sldId id="283" r:id="rId4"/>
+    <p:sldId id="296" r:id="rId5"/>
+    <p:sldId id="285" r:id="rId6"/>
+    <p:sldId id="295" r:id="rId7"/>
+    <p:sldId id="284" r:id="rId8"/>
+    <p:sldId id="294" r:id="rId9"/>
+    <p:sldId id="287" r:id="rId10"/>
+    <p:sldId id="288" r:id="rId11"/>
+    <p:sldId id="289" r:id="rId12"/>
+    <p:sldId id="290" r:id="rId13"/>
+    <p:sldId id="291" r:id="rId14"/>
+    <p:sldId id="297" r:id="rId15"/>
+    <p:sldId id="298" r:id="rId16"/>
+    <p:sldId id="299" r:id="rId17"/>
+    <p:sldId id="300" r:id="rId18"/>
+    <p:sldId id="301" r:id="rId19"/>
+    <p:sldId id="302" r:id="rId20"/>
+    <p:sldId id="303" r:id="rId21"/>
+    <p:sldId id="304" r:id="rId22"/>
+    <p:sldId id="305" r:id="rId23"/>
+    <p:sldId id="292" r:id="rId24"/>
+    <p:sldId id="267" r:id="rId25"/>
+    <p:sldId id="279" r:id="rId26"/>
+    <p:sldId id="280" r:id="rId27"/>
+    <p:sldId id="281" r:id="rId28"/>
+    <p:sldId id="264" r:id="rId29"/>
+    <p:sldId id="270" r:id="rId30"/>
+    <p:sldId id="276" r:id="rId31"/>
+    <p:sldId id="277" r:id="rId32"/>
+    <p:sldId id="272" r:id="rId33"/>
+    <p:sldId id="275" r:id="rId34"/>
+    <p:sldId id="273" r:id="rId35"/>
+    <p:sldId id="274" r:id="rId36"/>
+    <p:sldId id="269" r:id="rId37"/>
   </p:sldIdLst>
   <p:sldSz cx="9144000" cy="5143500" type="screen16x9"/>
   <p:notesSz cx="6858000" cy="9144000"/>
@@ -596,11 +604,11 @@
           <c:showBubbleSize val="0"/>
         </c:dLbls>
         <c:gapWidth val="150"/>
-        <c:axId val="-2102126024"/>
-        <c:axId val="-2102125672"/>
+        <c:axId val="-2099838520"/>
+        <c:axId val="2069106664"/>
       </c:barChart>
       <c:catAx>
-        <c:axId val="-2102126024"/>
+        <c:axId val="-2099838520"/>
         <c:scaling>
           <c:orientation val="minMax"/>
         </c:scaling>
@@ -626,7 +634,7 @@
             <a:endParaRPr lang="de-DE"/>
           </a:p>
         </c:txPr>
-        <c:crossAx val="-2102125672"/>
+        <c:crossAx val="2069106664"/>
         <c:crosses val="autoZero"/>
         <c:auto val="1"/>
         <c:lblAlgn val="ctr"/>
@@ -634,7 +642,7 @@
         <c:noMultiLvlLbl val="0"/>
       </c:catAx>
       <c:valAx>
-        <c:axId val="-2102125672"/>
+        <c:axId val="2069106664"/>
         <c:scaling>
           <c:orientation val="minMax"/>
         </c:scaling>
@@ -676,7 +684,7 @@
             <a:endParaRPr lang="de-DE"/>
           </a:p>
         </c:txPr>
-        <c:crossAx val="-2102126024"/>
+        <c:crossAx val="-2099838520"/>
         <c:crosses val="autoZero"/>
         <c:crossBetween val="between"/>
       </c:valAx>
@@ -918,11 +926,11 @@
           <c:showBubbleSize val="0"/>
         </c:dLbls>
         <c:gapWidth val="150"/>
-        <c:axId val="-2103002312"/>
-        <c:axId val="-2102998984"/>
+        <c:axId val="-2067255672"/>
+        <c:axId val="-2067156776"/>
       </c:barChart>
       <c:catAx>
-        <c:axId val="-2103002312"/>
+        <c:axId val="-2067255672"/>
         <c:scaling>
           <c:orientation val="minMax"/>
         </c:scaling>
@@ -948,7 +956,7 @@
             <a:endParaRPr lang="de-DE"/>
           </a:p>
         </c:txPr>
-        <c:crossAx val="-2102998984"/>
+        <c:crossAx val="-2067156776"/>
         <c:crosses val="autoZero"/>
         <c:auto val="1"/>
         <c:lblAlgn val="ctr"/>
@@ -956,7 +964,7 @@
         <c:noMultiLvlLbl val="0"/>
       </c:catAx>
       <c:valAx>
-        <c:axId val="-2102998984"/>
+        <c:axId val="-2067156776"/>
         <c:scaling>
           <c:orientation val="minMax"/>
         </c:scaling>
@@ -998,7 +1006,7 @@
             <a:endParaRPr lang="de-DE"/>
           </a:p>
         </c:txPr>
-        <c:crossAx val="-2103002312"/>
+        <c:crossAx val="-2067255672"/>
         <c:crosses val="autoZero"/>
         <c:crossBetween val="between"/>
       </c:valAx>
@@ -1248,11 +1256,11 @@
         </c:dLbls>
         <c:marker val="1"/>
         <c:smooth val="0"/>
-        <c:axId val="2067968952"/>
-        <c:axId val="2067972280"/>
+        <c:axId val="-2067716360"/>
+        <c:axId val="-2067664104"/>
       </c:lineChart>
       <c:catAx>
-        <c:axId val="2067968952"/>
+        <c:axId val="-2067716360"/>
         <c:scaling>
           <c:orientation val="minMax"/>
         </c:scaling>
@@ -1278,7 +1286,7 @@
             <a:endParaRPr lang="de-DE"/>
           </a:p>
         </c:txPr>
-        <c:crossAx val="2067972280"/>
+        <c:crossAx val="-2067664104"/>
         <c:crosses val="autoZero"/>
         <c:auto val="1"/>
         <c:lblAlgn val="ctr"/>
@@ -1286,7 +1294,7 @@
         <c:noMultiLvlLbl val="0"/>
       </c:catAx>
       <c:valAx>
-        <c:axId val="2067972280"/>
+        <c:axId val="-2067664104"/>
         <c:scaling>
           <c:orientation val="minMax"/>
         </c:scaling>
@@ -1326,7 +1334,7 @@
             <a:endParaRPr lang="de-DE"/>
           </a:p>
         </c:txPr>
-        <c:crossAx val="2067968952"/>
+        <c:crossAx val="-2067716360"/>
         <c:crosses val="autoZero"/>
         <c:crossBetween val="between"/>
       </c:valAx>
@@ -4615,7 +4623,7 @@
 </file>
 
 <file path=ppt/slides/slide1.xml><?xml version="1.0" encoding="utf-8"?>
-<p:sld xmlns:a="http://schemas.openxmlformats.org/drawingml/2006/main" xmlns:r="http://schemas.openxmlformats.org/officeDocument/2006/relationships" xmlns:p="http://schemas.openxmlformats.org/presentationml/2006/main" show="0">
+<p:sld xmlns:a="http://schemas.openxmlformats.org/drawingml/2006/main" xmlns:r="http://schemas.openxmlformats.org/officeDocument/2006/relationships" xmlns:p="http://schemas.openxmlformats.org/presentationml/2006/main">
   <p:cSld>
     <p:spTree>
       <p:nvGrpSpPr>
@@ -4638,7 +4646,7 @@
             <a:spLocks noGrp="1"/>
           </p:cNvSpPr>
           <p:nvPr>
-            <p:ph type="title"/>
+            <p:ph type="ctrTitle"/>
           </p:nvPr>
         </p:nvSpPr>
         <p:spPr/>
@@ -4646,18 +4654,22 @@
           <a:bodyPr/>
           <a:lstStyle/>
           <a:p>
-            <a:endParaRPr lang="en-US"/>
+            <a:r>
+              <a:rPr lang="en-US" dirty="0" smtClean="0"/>
+              <a:t>Developer Workshop</a:t>
+            </a:r>
+            <a:endParaRPr lang="en-US" dirty="0"/>
           </a:p>
         </p:txBody>
       </p:sp>
       <p:sp>
         <p:nvSpPr>
-          <p:cNvPr id="3" name="Content Placeholder 2"/>
+          <p:cNvPr id="3" name="Subtitle 2"/>
           <p:cNvSpPr>
             <a:spLocks noGrp="1"/>
           </p:cNvSpPr>
           <p:nvPr>
-            <p:ph idx="1"/>
+            <p:ph type="subTitle" idx="1"/>
           </p:nvPr>
         </p:nvSpPr>
         <p:spPr/>
@@ -4666,23 +4678,9 @@
           <a:lstStyle/>
           <a:p>
             <a:r>
-              <a:rPr lang="en-US" dirty="0"/>
-              <a:t>Lecture: SDKs [30min]</a:t>
-            </a:r>
-          </a:p>
-          <a:p>
-            <a:r>
-              <a:rPr lang="en-US" dirty="0"/>
-              <a:t>How it works, what SDKs we provide, etc.  </a:t>
-            </a:r>
-          </a:p>
-          <a:p>
-            <a:r>
-              <a:rPr lang="en-US"/>
-              <a:t>What are the big pieces of the programming model</a:t>
-            </a:r>
-          </a:p>
-          <a:p>
+              <a:rPr lang="en-US" dirty="0" smtClean="0"/>
+              <a:t>SDK 101</a:t>
+            </a:r>
             <a:endParaRPr lang="en-US" dirty="0"/>
           </a:p>
         </p:txBody>
@@ -4690,911 +4688,7 @@
     </p:spTree>
     <p:extLst>
       <p:ext uri="{BB962C8B-B14F-4D97-AF65-F5344CB8AC3E}">
-        <p14:creationId xmlns:p14="http://schemas.microsoft.com/office/powerpoint/2010/main" val="2596137047"/>
-      </p:ext>
-    </p:extLst>
-  </p:cSld>
-  <p:clrMapOvr>
-    <a:masterClrMapping/>
-  </p:clrMapOvr>
-  <mc:AlternateContent xmlns:mc="http://schemas.openxmlformats.org/markup-compatibility/2006">
-    <mc:Choice xmlns:p14="http://schemas.microsoft.com/office/powerpoint/2010/main" Requires="p14">
-      <p:transition spd="slow" p14:dur="2000"/>
-    </mc:Choice>
-    <mc:Fallback>
-      <p:transition xmlns:p14="http://schemas.microsoft.com/office/powerpoint/2010/main" spd="slow"/>
-    </mc:Fallback>
-  </mc:AlternateContent>
-</p:sld>
-</file>
-
-<file path=ppt/slides/slide10.xml><?xml version="1.0" encoding="utf-8"?>
-<p:sld xmlns:a="http://schemas.openxmlformats.org/drawingml/2006/main" xmlns:r="http://schemas.openxmlformats.org/officeDocument/2006/relationships" xmlns:p="http://schemas.openxmlformats.org/presentationml/2006/main">
-  <p:cSld>
-    <p:spTree>
-      <p:nvGrpSpPr>
-        <p:cNvPr id="1" name=""/>
-        <p:cNvGrpSpPr/>
-        <p:nvPr/>
-      </p:nvGrpSpPr>
-      <p:grpSpPr>
-        <a:xfrm>
-          <a:off x="0" y="0"/>
-          <a:ext cx="0" cy="0"/>
-          <a:chOff x="0" y="0"/>
-          <a:chExt cx="0" cy="0"/>
-        </a:xfrm>
-      </p:grpSpPr>
-      <p:sp>
-        <p:nvSpPr>
-          <p:cNvPr id="2" name="Content Placeholder 1"/>
-          <p:cNvSpPr>
-            <a:spLocks noGrp="1"/>
-          </p:cNvSpPr>
-          <p:nvPr>
-            <p:ph idx="1"/>
-          </p:nvPr>
-        </p:nvSpPr>
-        <p:spPr>
-          <a:xfrm>
-            <a:off x="466344" y="685800"/>
-            <a:ext cx="7998595" cy="2128520"/>
-          </a:xfrm>
-        </p:spPr>
-        <p:txBody>
-          <a:bodyPr/>
-          <a:lstStyle/>
-          <a:p>
-            <a:pPr marL="285750" indent="-285750">
-              <a:buFont typeface="Wingdings" charset="2"/>
-              <a:buChar char="§"/>
-            </a:pPr>
-            <a:r>
-              <a:rPr lang="en-US" dirty="0" smtClean="0"/>
-              <a:t>Documents are integral to the </a:t>
-            </a:r>
-            <a:r>
-              <a:rPr lang="en-US" dirty="0" smtClean="0"/>
-              <a:t>SDKs</a:t>
-            </a:r>
-            <a:endParaRPr lang="en-US" dirty="0" smtClean="0"/>
-          </a:p>
-          <a:p>
-            <a:pPr marL="285750" indent="-285750">
-              <a:buFont typeface="Wingdings" charset="2"/>
-              <a:buChar char="§"/>
-            </a:pPr>
-            <a:r>
-              <a:rPr lang="en-US" dirty="0" smtClean="0"/>
-              <a:t>There are many implementations, depending on the content type.</a:t>
-            </a:r>
-          </a:p>
-          <a:p>
-            <a:pPr marL="285750" indent="-285750">
-              <a:buFont typeface="Wingdings" charset="2"/>
-              <a:buChar char="§"/>
-            </a:pPr>
-            <a:endParaRPr lang="en-US" dirty="0"/>
-          </a:p>
-          <a:p>
-            <a:pPr marL="285750" indent="-285750">
-              <a:buFont typeface="Wingdings" charset="2"/>
-              <a:buChar char="§"/>
-            </a:pPr>
-            <a:r>
-              <a:rPr lang="en-US" dirty="0" smtClean="0"/>
-              <a:t>A Document contains:</a:t>
-            </a:r>
-          </a:p>
-          <a:p>
-            <a:pPr marL="285750" indent="-285750">
-              <a:buFont typeface="Wingdings" charset="2"/>
-              <a:buChar char="§"/>
-            </a:pPr>
-            <a:endParaRPr lang="en-US" dirty="0"/>
-          </a:p>
-        </p:txBody>
-      </p:sp>
-      <p:sp>
-        <p:nvSpPr>
-          <p:cNvPr id="3" name="Title 2"/>
-          <p:cNvSpPr>
-            <a:spLocks noGrp="1"/>
-          </p:cNvSpPr>
-          <p:nvPr>
-            <p:ph type="title"/>
-          </p:nvPr>
-        </p:nvSpPr>
-        <p:spPr/>
-        <p:txBody>
-          <a:bodyPr/>
-          <a:lstStyle/>
-          <a:p>
-            <a:r>
-              <a:rPr lang="en-US" dirty="0" smtClean="0"/>
-              <a:t>The Document</a:t>
-            </a:r>
-            <a:endParaRPr lang="en-US" dirty="0"/>
-          </a:p>
-        </p:txBody>
-      </p:sp>
-      <p:sp>
-        <p:nvSpPr>
-          <p:cNvPr id="6" name="TextBox 5"/>
-          <p:cNvSpPr txBox="1"/>
-          <p:nvPr/>
-        </p:nvSpPr>
-        <p:spPr>
-          <a:xfrm>
-            <a:off x="1241632" y="-1364650"/>
-            <a:ext cx="184666" cy="369332"/>
-          </a:xfrm>
-          <a:prstGeom prst="rect">
-            <a:avLst/>
-          </a:prstGeom>
-          <a:noFill/>
-        </p:spPr>
-        <p:txBody>
-          <a:bodyPr wrap="none" rtlCol="0">
-            <a:spAutoFit/>
-          </a:bodyPr>
-          <a:lstStyle/>
-          <a:p>
-            <a:endParaRPr lang="en-US" dirty="0" err="1">
-              <a:solidFill>
-                <a:srgbClr val="333333"/>
-              </a:solidFill>
-              <a:latin typeface="Arial"/>
-              <a:cs typeface="Arial"/>
-            </a:endParaRPr>
-          </a:p>
-        </p:txBody>
-      </p:sp>
-      <p:sp>
-        <p:nvSpPr>
-          <p:cNvPr id="7" name="Rectangle 6"/>
-          <p:cNvSpPr/>
-          <p:nvPr/>
-        </p:nvSpPr>
-        <p:spPr>
-          <a:xfrm>
-            <a:off x="2928734" y="-1895348"/>
-            <a:ext cx="2521175" cy="1222500"/>
-          </a:xfrm>
-          <a:prstGeom prst="rect">
-            <a:avLst/>
-          </a:prstGeom>
-          <a:solidFill>
-            <a:schemeClr val="accent1"/>
-          </a:solidFill>
-          <a:ln>
-            <a:noFill/>
-          </a:ln>
-          <a:effectLst/>
-        </p:spPr>
-        <p:style>
-          <a:lnRef idx="1">
-            <a:schemeClr val="accent1"/>
-          </a:lnRef>
-          <a:fillRef idx="3">
-            <a:schemeClr val="accent1"/>
-          </a:fillRef>
-          <a:effectRef idx="2">
-            <a:schemeClr val="accent1"/>
-          </a:effectRef>
-          <a:fontRef idx="minor">
-            <a:schemeClr val="lt1"/>
-          </a:fontRef>
-        </p:style>
-        <p:txBody>
-          <a:bodyPr rtlCol="0" anchor="ctr"/>
-          <a:lstStyle/>
-          <a:p>
-            <a:pPr algn="ctr"/>
-            <a:r>
-              <a:rPr lang="en-US" dirty="0" smtClean="0">
-                <a:solidFill>
-                  <a:srgbClr val="333333"/>
-                </a:solidFill>
-                <a:latin typeface="Arial"/>
-                <a:cs typeface="Arial"/>
-              </a:rPr>
-              <a:t>j</a:t>
-            </a:r>
-            <a:endParaRPr lang="en-US" dirty="0">
-              <a:solidFill>
-                <a:srgbClr val="333333"/>
-              </a:solidFill>
-              <a:latin typeface="Arial"/>
-              <a:cs typeface="Arial"/>
-            </a:endParaRPr>
-          </a:p>
-        </p:txBody>
-      </p:sp>
-      <p:graphicFrame>
-        <p:nvGraphicFramePr>
-          <p:cNvPr id="9" name="Table 4"/>
-          <p:cNvGraphicFramePr>
-            <a:graphicFrameLocks noGrp="1"/>
-          </p:cNvGraphicFramePr>
-          <p:nvPr>
-            <p:extLst>
-              <p:ext uri="{D42A27DB-BD31-4B8C-83A1-F6EECF244321}">
-                <p14:modId xmlns:p14="http://schemas.microsoft.com/office/powerpoint/2010/main" val="873057609"/>
-              </p:ext>
-            </p:extLst>
-          </p:nvPr>
-        </p:nvGraphicFramePr>
-        <p:xfrm>
-          <a:off x="1680836" y="2902382"/>
-          <a:ext cx="6233804" cy="1523999"/>
-        </p:xfrm>
-        <a:graphic>
-          <a:graphicData uri="http://schemas.openxmlformats.org/drawingml/2006/table">
-            <a:tbl>
-              <a:tblPr>
-                <a:tableStyleId>{5C22544A-7EE6-4342-B048-85BDC9FD1C3A}</a:tableStyleId>
-              </a:tblPr>
-              <a:tblGrid>
-                <a:gridCol w="2271404"/>
-                <a:gridCol w="3962400"/>
-              </a:tblGrid>
-              <a:tr h="205456">
-                <a:tc>
-                  <a:txBody>
-                    <a:bodyPr/>
-                    <a:lstStyle/>
-                    <a:p>
-                      <a:pPr algn="ctr"/>
-                      <a:r>
-                        <a:rPr lang="en-US" sz="1400" b="1" dirty="0" smtClean="0">
-                          <a:solidFill>
-                            <a:schemeClr val="bg1"/>
-                          </a:solidFill>
-                        </a:rPr>
-                        <a:t>Property</a:t>
-                      </a:r>
-                      <a:endParaRPr lang="en-US" sz="1400" b="1" dirty="0">
-                        <a:solidFill>
-                          <a:schemeClr val="bg1"/>
-                        </a:solidFill>
-                      </a:endParaRPr>
-                    </a:p>
-                  </a:txBody>
-                  <a:tcPr anchor="ctr">
-                    <a:lnL w="9525" cap="flat" cmpd="sng" algn="ctr">
-                      <a:solidFill>
-                        <a:srgbClr val="E40121"/>
-                      </a:solidFill>
-                      <a:prstDash val="solid"/>
-                      <a:round/>
-                      <a:headEnd type="none" w="med" len="med"/>
-                      <a:tailEnd type="none" w="med" len="med"/>
-                    </a:lnL>
-                    <a:lnR w="12700" cmpd="sng">
-                      <a:noFill/>
-                    </a:lnR>
-                    <a:lnT w="9525" cap="flat" cmpd="sng" algn="ctr">
-                      <a:solidFill>
-                        <a:srgbClr val="E40121"/>
-                      </a:solidFill>
-                      <a:prstDash val="solid"/>
-                      <a:round/>
-                      <a:headEnd type="none" w="med" len="med"/>
-                      <a:tailEnd type="none" w="med" len="med"/>
-                    </a:lnT>
-                    <a:lnB w="9525" cap="flat" cmpd="sng" algn="ctr">
-                      <a:solidFill>
-                        <a:srgbClr val="E40121"/>
-                      </a:solidFill>
-                      <a:prstDash val="solid"/>
-                      <a:round/>
-                      <a:headEnd type="none" w="med" len="med"/>
-                      <a:tailEnd type="none" w="med" len="med"/>
-                    </a:lnB>
-                    <a:solidFill>
-                      <a:srgbClr val="E40121"/>
-                    </a:solidFill>
-                  </a:tcPr>
-                </a:tc>
-                <a:tc>
-                  <a:txBody>
-                    <a:bodyPr/>
-                    <a:lstStyle/>
-                    <a:p>
-                      <a:pPr algn="ctr"/>
-                      <a:r>
-                        <a:rPr lang="en-US" sz="1400" b="1" dirty="0" smtClean="0">
-                          <a:solidFill>
-                            <a:schemeClr val="bg1"/>
-                          </a:solidFill>
-                        </a:rPr>
-                        <a:t>Desc</a:t>
-                      </a:r>
-                      <a:r>
-                        <a:rPr lang="en-US" sz="1400" b="1" baseline="0" dirty="0" smtClean="0">
-                          <a:solidFill>
-                            <a:schemeClr val="bg1"/>
-                          </a:solidFill>
-                        </a:rPr>
-                        <a:t>ription</a:t>
-                      </a:r>
-                      <a:endParaRPr lang="en-US" sz="1400" b="1" dirty="0">
-                        <a:solidFill>
-                          <a:schemeClr val="bg1"/>
-                        </a:solidFill>
-                      </a:endParaRPr>
-                    </a:p>
-                  </a:txBody>
-                  <a:tcPr anchor="ctr">
-                    <a:lnL w="12700" cmpd="sng">
-                      <a:noFill/>
-                    </a:lnL>
-                    <a:lnR w="12700" cmpd="sng">
-                      <a:noFill/>
-                    </a:lnR>
-                    <a:lnT w="9525" cap="flat" cmpd="sng" algn="ctr">
-                      <a:solidFill>
-                        <a:srgbClr val="E40121"/>
-                      </a:solidFill>
-                      <a:prstDash val="solid"/>
-                      <a:round/>
-                      <a:headEnd type="none" w="med" len="med"/>
-                      <a:tailEnd type="none" w="med" len="med"/>
-                    </a:lnT>
-                    <a:lnB w="9525" cap="flat" cmpd="sng" algn="ctr">
-                      <a:solidFill>
-                        <a:srgbClr val="E40121"/>
-                      </a:solidFill>
-                      <a:prstDash val="solid"/>
-                      <a:round/>
-                      <a:headEnd type="none" w="med" len="med"/>
-                      <a:tailEnd type="none" w="med" len="med"/>
-                    </a:lnB>
-                    <a:solidFill>
-                      <a:srgbClr val="E40121"/>
-                    </a:solidFill>
-                  </a:tcPr>
-                </a:tc>
-              </a:tr>
-              <a:tr h="205456">
-                <a:tc>
-                  <a:txBody>
-                    <a:bodyPr/>
-                    <a:lstStyle/>
-                    <a:p>
-                      <a:r>
-                        <a:rPr lang="en-US" sz="1400" b="1" dirty="0" smtClean="0">
-                          <a:solidFill>
-                            <a:schemeClr val="tx1"/>
-                          </a:solidFill>
-                        </a:rPr>
-                        <a:t>ID</a:t>
-                      </a:r>
-                      <a:endParaRPr lang="en-US" sz="1400" b="1" dirty="0">
-                        <a:solidFill>
-                          <a:schemeClr val="tx1"/>
-                        </a:solidFill>
-                      </a:endParaRPr>
-                    </a:p>
-                  </a:txBody>
-                  <a:tcPr anchor="ctr">
-                    <a:lnL w="9525" cap="flat" cmpd="sng" algn="ctr">
-                      <a:solidFill>
-                        <a:srgbClr val="E40121"/>
-                      </a:solidFill>
-                      <a:prstDash val="solid"/>
-                      <a:round/>
-                      <a:headEnd type="none" w="med" len="med"/>
-                      <a:tailEnd type="none" w="med" len="med"/>
-                    </a:lnL>
-                    <a:lnR w="9525" cap="flat" cmpd="sng" algn="ctr">
-                      <a:solidFill>
-                        <a:srgbClr val="E40121"/>
-                      </a:solidFill>
-                      <a:prstDash val="solid"/>
-                      <a:round/>
-                      <a:headEnd type="none" w="med" len="med"/>
-                      <a:tailEnd type="none" w="med" len="med"/>
-                    </a:lnR>
-                    <a:lnT w="9525" cap="flat" cmpd="sng" algn="ctr">
-                      <a:solidFill>
-                        <a:srgbClr val="E40121"/>
-                      </a:solidFill>
-                      <a:prstDash val="solid"/>
-                      <a:round/>
-                      <a:headEnd type="none" w="med" len="med"/>
-                      <a:tailEnd type="none" w="med" len="med"/>
-                    </a:lnT>
-                    <a:lnB w="9525" cap="flat" cmpd="sng" algn="ctr">
-                      <a:solidFill>
-                        <a:srgbClr val="E40121"/>
-                      </a:solidFill>
-                      <a:prstDash val="solid"/>
-                      <a:round/>
-                      <a:headEnd type="none" w="med" len="med"/>
-                      <a:tailEnd type="none" w="med" len="med"/>
-                    </a:lnB>
-                    <a:noFill/>
-                  </a:tcPr>
-                </a:tc>
-                <a:tc>
-                  <a:txBody>
-                    <a:bodyPr/>
-                    <a:lstStyle/>
-                    <a:p>
-                      <a:pPr marL="0" marR="0" indent="0" algn="l" defTabSz="457200" rtl="0" eaLnBrk="1" fontAlgn="auto" latinLnBrk="0" hangingPunct="1">
-                        <a:lnSpc>
-                          <a:spcPct val="100000"/>
-                        </a:lnSpc>
-                        <a:spcBef>
-                          <a:spcPts val="0"/>
-                        </a:spcBef>
-                        <a:spcAft>
-                          <a:spcPts val="0"/>
-                        </a:spcAft>
-                        <a:buClrTx/>
-                        <a:buSzTx/>
-                        <a:buFontTx/>
-                        <a:buNone/>
-                        <a:tabLst/>
-                        <a:defRPr/>
-                      </a:pPr>
-                      <a:r>
-                        <a:rPr lang="en-US" sz="1400" dirty="0" smtClean="0"/>
-                        <a:t>The bucket-unique identifier</a:t>
-                      </a:r>
-                    </a:p>
-                  </a:txBody>
-                  <a:tcPr>
-                    <a:lnL w="9525" cap="flat" cmpd="sng" algn="ctr">
-                      <a:solidFill>
-                        <a:srgbClr val="E40121"/>
-                      </a:solidFill>
-                      <a:prstDash val="solid"/>
-                      <a:round/>
-                      <a:headEnd type="none" w="med" len="med"/>
-                      <a:tailEnd type="none" w="med" len="med"/>
-                    </a:lnL>
-                    <a:lnR w="9525" cap="flat" cmpd="sng" algn="ctr">
-                      <a:solidFill>
-                        <a:srgbClr val="E40121"/>
-                      </a:solidFill>
-                      <a:prstDash val="solid"/>
-                      <a:round/>
-                      <a:headEnd type="none" w="med" len="med"/>
-                      <a:tailEnd type="none" w="med" len="med"/>
-                    </a:lnR>
-                    <a:lnT w="9525" cap="flat" cmpd="sng" algn="ctr">
-                      <a:solidFill>
-                        <a:srgbClr val="E40121"/>
-                      </a:solidFill>
-                      <a:prstDash val="solid"/>
-                      <a:round/>
-                      <a:headEnd type="none" w="med" len="med"/>
-                      <a:tailEnd type="none" w="med" len="med"/>
-                    </a:lnT>
-                    <a:lnB w="9525" cap="flat" cmpd="sng" algn="ctr">
-                      <a:solidFill>
-                        <a:srgbClr val="E40121"/>
-                      </a:solidFill>
-                      <a:prstDash val="solid"/>
-                      <a:round/>
-                      <a:headEnd type="none" w="med" len="med"/>
-                      <a:tailEnd type="none" w="med" len="med"/>
-                    </a:lnB>
-                    <a:noFill/>
-                  </a:tcPr>
-                </a:tc>
-              </a:tr>
-              <a:tr h="205456">
-                <a:tc>
-                  <a:txBody>
-                    <a:bodyPr/>
-                    <a:lstStyle/>
-                    <a:p>
-                      <a:r>
-                        <a:rPr lang="en-US" sz="1400" b="1" dirty="0" smtClean="0">
-                          <a:solidFill>
-                            <a:schemeClr val="tx1"/>
-                          </a:solidFill>
-                        </a:rPr>
-                        <a:t>Content</a:t>
-                      </a:r>
-                      <a:endParaRPr lang="en-US" sz="1400" b="1" dirty="0">
-                        <a:solidFill>
-                          <a:schemeClr val="tx1"/>
-                        </a:solidFill>
-                      </a:endParaRPr>
-                    </a:p>
-                  </a:txBody>
-                  <a:tcPr>
-                    <a:lnL w="9525" cap="flat" cmpd="sng" algn="ctr">
-                      <a:solidFill>
-                        <a:srgbClr val="E40121"/>
-                      </a:solidFill>
-                      <a:prstDash val="solid"/>
-                      <a:round/>
-                      <a:headEnd type="none" w="med" len="med"/>
-                      <a:tailEnd type="none" w="med" len="med"/>
-                    </a:lnL>
-                    <a:lnR w="9525" cap="flat" cmpd="sng" algn="ctr">
-                      <a:solidFill>
-                        <a:srgbClr val="E40121"/>
-                      </a:solidFill>
-                      <a:prstDash val="solid"/>
-                      <a:round/>
-                      <a:headEnd type="none" w="med" len="med"/>
-                      <a:tailEnd type="none" w="med" len="med"/>
-                    </a:lnR>
-                    <a:lnT w="9525" cap="flat" cmpd="sng" algn="ctr">
-                      <a:solidFill>
-                        <a:srgbClr val="E40121"/>
-                      </a:solidFill>
-                      <a:prstDash val="solid"/>
-                      <a:round/>
-                      <a:headEnd type="none" w="med" len="med"/>
-                      <a:tailEnd type="none" w="med" len="med"/>
-                    </a:lnT>
-                    <a:lnB w="9525" cap="flat" cmpd="sng" algn="ctr">
-                      <a:solidFill>
-                        <a:srgbClr val="E40121"/>
-                      </a:solidFill>
-                      <a:prstDash val="solid"/>
-                      <a:round/>
-                      <a:headEnd type="none" w="med" len="med"/>
-                      <a:tailEnd type="none" w="med" len="med"/>
-                    </a:lnB>
-                    <a:noFill/>
-                  </a:tcPr>
-                </a:tc>
-                <a:tc>
-                  <a:txBody>
-                    <a:bodyPr/>
-                    <a:lstStyle/>
-                    <a:p>
-                      <a:pPr marL="0" marR="0" indent="0" algn="l" defTabSz="457200" rtl="0" eaLnBrk="1" fontAlgn="auto" latinLnBrk="0" hangingPunct="1">
-                        <a:lnSpc>
-                          <a:spcPct val="100000"/>
-                        </a:lnSpc>
-                        <a:spcBef>
-                          <a:spcPts val="0"/>
-                        </a:spcBef>
-                        <a:spcAft>
-                          <a:spcPts val="0"/>
-                        </a:spcAft>
-                        <a:buClrTx/>
-                        <a:buSzTx/>
-                        <a:buFontTx/>
-                        <a:buNone/>
-                        <a:tabLst/>
-                        <a:defRPr/>
-                      </a:pPr>
-                      <a:r>
-                        <a:rPr lang="en-US" sz="1400" dirty="0" smtClean="0"/>
-                        <a:t>The value that is stored</a:t>
-                      </a:r>
-                    </a:p>
-                  </a:txBody>
-                  <a:tcPr>
-                    <a:lnL w="9525" cap="flat" cmpd="sng" algn="ctr">
-                      <a:solidFill>
-                        <a:srgbClr val="E40121"/>
-                      </a:solidFill>
-                      <a:prstDash val="solid"/>
-                      <a:round/>
-                      <a:headEnd type="none" w="med" len="med"/>
-                      <a:tailEnd type="none" w="med" len="med"/>
-                    </a:lnL>
-                    <a:lnR w="9525" cap="flat" cmpd="sng" algn="ctr">
-                      <a:solidFill>
-                        <a:srgbClr val="E40121"/>
-                      </a:solidFill>
-                      <a:prstDash val="solid"/>
-                      <a:round/>
-                      <a:headEnd type="none" w="med" len="med"/>
-                      <a:tailEnd type="none" w="med" len="med"/>
-                    </a:lnR>
-                    <a:lnT w="9525" cap="flat" cmpd="sng" algn="ctr">
-                      <a:solidFill>
-                        <a:srgbClr val="E40121"/>
-                      </a:solidFill>
-                      <a:prstDash val="solid"/>
-                      <a:round/>
-                      <a:headEnd type="none" w="med" len="med"/>
-                      <a:tailEnd type="none" w="med" len="med"/>
-                    </a:lnT>
-                    <a:lnB w="9525" cap="flat" cmpd="sng" algn="ctr">
-                      <a:solidFill>
-                        <a:srgbClr val="E40121"/>
-                      </a:solidFill>
-                      <a:prstDash val="solid"/>
-                      <a:round/>
-                      <a:headEnd type="none" w="med" len="med"/>
-                      <a:tailEnd type="none" w="med" len="med"/>
-                    </a:lnB>
-                    <a:noFill/>
-                  </a:tcPr>
-                </a:tc>
-              </a:tr>
-              <a:tr h="205456">
-                <a:tc>
-                  <a:txBody>
-                    <a:bodyPr/>
-                    <a:lstStyle/>
-                    <a:p>
-                      <a:r>
-                        <a:rPr lang="en-US" sz="1400" b="1" dirty="0" smtClean="0">
-                          <a:solidFill>
-                            <a:schemeClr val="tx1"/>
-                          </a:solidFill>
-                        </a:rPr>
-                        <a:t>Expiry</a:t>
-                      </a:r>
-                      <a:endParaRPr lang="en-US" sz="1400" b="1" dirty="0">
-                        <a:solidFill>
-                          <a:schemeClr val="tx1"/>
-                        </a:solidFill>
-                      </a:endParaRPr>
-                    </a:p>
-                  </a:txBody>
-                  <a:tcPr>
-                    <a:lnL w="9525" cap="flat" cmpd="sng" algn="ctr">
-                      <a:solidFill>
-                        <a:srgbClr val="E40121"/>
-                      </a:solidFill>
-                      <a:prstDash val="solid"/>
-                      <a:round/>
-                      <a:headEnd type="none" w="med" len="med"/>
-                      <a:tailEnd type="none" w="med" len="med"/>
-                    </a:lnL>
-                    <a:lnR w="9525" cap="flat" cmpd="sng" algn="ctr">
-                      <a:solidFill>
-                        <a:srgbClr val="E40121"/>
-                      </a:solidFill>
-                      <a:prstDash val="solid"/>
-                      <a:round/>
-                      <a:headEnd type="none" w="med" len="med"/>
-                      <a:tailEnd type="none" w="med" len="med"/>
-                    </a:lnR>
-                    <a:lnT w="9525" cap="flat" cmpd="sng" algn="ctr">
-                      <a:solidFill>
-                        <a:srgbClr val="E40121"/>
-                      </a:solidFill>
-                      <a:prstDash val="solid"/>
-                      <a:round/>
-                      <a:headEnd type="none" w="med" len="med"/>
-                      <a:tailEnd type="none" w="med" len="med"/>
-                    </a:lnT>
-                    <a:lnB w="9525" cap="flat" cmpd="sng" algn="ctr">
-                      <a:solidFill>
-                        <a:srgbClr val="E40121"/>
-                      </a:solidFill>
-                      <a:prstDash val="solid"/>
-                      <a:round/>
-                      <a:headEnd type="none" w="med" len="med"/>
-                      <a:tailEnd type="none" w="med" len="med"/>
-                    </a:lnB>
-                    <a:noFill/>
-                  </a:tcPr>
-                </a:tc>
-                <a:tc>
-                  <a:txBody>
-                    <a:bodyPr/>
-                    <a:lstStyle/>
-                    <a:p>
-                      <a:pPr marL="0" marR="0" indent="0" algn="l" defTabSz="457200" rtl="0" eaLnBrk="1" fontAlgn="auto" latinLnBrk="0" hangingPunct="1">
-                        <a:lnSpc>
-                          <a:spcPct val="100000"/>
-                        </a:lnSpc>
-                        <a:spcBef>
-                          <a:spcPts val="0"/>
-                        </a:spcBef>
-                        <a:spcAft>
-                          <a:spcPts val="0"/>
-                        </a:spcAft>
-                        <a:buClrTx/>
-                        <a:buSzTx/>
-                        <a:buFontTx/>
-                        <a:buNone/>
-                        <a:tabLst/>
-                        <a:defRPr/>
-                      </a:pPr>
-                      <a:r>
-                        <a:rPr lang="en-US" sz="1400" dirty="0" smtClean="0"/>
-                        <a:t>An expiration</a:t>
-                      </a:r>
-                      <a:r>
-                        <a:rPr lang="en-US" sz="1400" baseline="0" dirty="0" smtClean="0"/>
-                        <a:t> time</a:t>
-                      </a:r>
-                      <a:endParaRPr lang="en-US" sz="1400" dirty="0" smtClean="0"/>
-                    </a:p>
-                  </a:txBody>
-                  <a:tcPr>
-                    <a:lnL w="9525" cap="flat" cmpd="sng" algn="ctr">
-                      <a:solidFill>
-                        <a:srgbClr val="E40121"/>
-                      </a:solidFill>
-                      <a:prstDash val="solid"/>
-                      <a:round/>
-                      <a:headEnd type="none" w="med" len="med"/>
-                      <a:tailEnd type="none" w="med" len="med"/>
-                    </a:lnL>
-                    <a:lnR w="9525" cap="flat" cmpd="sng" algn="ctr">
-                      <a:solidFill>
-                        <a:srgbClr val="E40121"/>
-                      </a:solidFill>
-                      <a:prstDash val="solid"/>
-                      <a:round/>
-                      <a:headEnd type="none" w="med" len="med"/>
-                      <a:tailEnd type="none" w="med" len="med"/>
-                    </a:lnR>
-                    <a:lnT w="9525" cap="flat" cmpd="sng" algn="ctr">
-                      <a:solidFill>
-                        <a:srgbClr val="E40121"/>
-                      </a:solidFill>
-                      <a:prstDash val="solid"/>
-                      <a:round/>
-                      <a:headEnd type="none" w="med" len="med"/>
-                      <a:tailEnd type="none" w="med" len="med"/>
-                    </a:lnT>
-                    <a:lnB w="9525" cap="flat" cmpd="sng" algn="ctr">
-                      <a:solidFill>
-                        <a:srgbClr val="E40121"/>
-                      </a:solidFill>
-                      <a:prstDash val="solid"/>
-                      <a:round/>
-                      <a:headEnd type="none" w="med" len="med"/>
-                      <a:tailEnd type="none" w="med" len="med"/>
-                    </a:lnB>
-                    <a:noFill/>
-                  </a:tcPr>
-                </a:tc>
-              </a:tr>
-              <a:tr h="205456">
-                <a:tc>
-                  <a:txBody>
-                    <a:bodyPr/>
-                    <a:lstStyle/>
-                    <a:p>
-                      <a:r>
-                        <a:rPr lang="en-US" sz="1400" b="1" dirty="0" smtClean="0">
-                          <a:solidFill>
-                            <a:schemeClr val="tx1"/>
-                          </a:solidFill>
-                        </a:rPr>
-                        <a:t>CAS</a:t>
-                      </a:r>
-                      <a:endParaRPr lang="en-US" sz="1400" b="1" dirty="0">
-                        <a:solidFill>
-                          <a:schemeClr val="tx1"/>
-                        </a:solidFill>
-                      </a:endParaRPr>
-                    </a:p>
-                  </a:txBody>
-                  <a:tcPr>
-                    <a:lnL w="9525" cap="flat" cmpd="sng" algn="ctr">
-                      <a:solidFill>
-                        <a:srgbClr val="E40121"/>
-                      </a:solidFill>
-                      <a:prstDash val="solid"/>
-                      <a:round/>
-                      <a:headEnd type="none" w="med" len="med"/>
-                      <a:tailEnd type="none" w="med" len="med"/>
-                    </a:lnL>
-                    <a:lnR w="9525" cap="flat" cmpd="sng" algn="ctr">
-                      <a:solidFill>
-                        <a:srgbClr val="E40121"/>
-                      </a:solidFill>
-                      <a:prstDash val="solid"/>
-                      <a:round/>
-                      <a:headEnd type="none" w="med" len="med"/>
-                      <a:tailEnd type="none" w="med" len="med"/>
-                    </a:lnR>
-                    <a:lnT w="9525" cap="flat" cmpd="sng" algn="ctr">
-                      <a:solidFill>
-                        <a:srgbClr val="E40121"/>
-                      </a:solidFill>
-                      <a:prstDash val="solid"/>
-                      <a:round/>
-                      <a:headEnd type="none" w="med" len="med"/>
-                      <a:tailEnd type="none" w="med" len="med"/>
-                    </a:lnT>
-                    <a:lnB w="9525" cap="flat" cmpd="sng" algn="ctr">
-                      <a:solidFill>
-                        <a:srgbClr val="E40121"/>
-                      </a:solidFill>
-                      <a:prstDash val="solid"/>
-                      <a:round/>
-                      <a:headEnd type="none" w="med" len="med"/>
-                      <a:tailEnd type="none" w="med" len="med"/>
-                    </a:lnB>
-                    <a:noFill/>
-                  </a:tcPr>
-                </a:tc>
-                <a:tc>
-                  <a:txBody>
-                    <a:bodyPr/>
-                    <a:lstStyle/>
-                    <a:p>
-                      <a:pPr marL="0" marR="0" indent="0" algn="l" defTabSz="457200" rtl="0" eaLnBrk="1" fontAlgn="auto" latinLnBrk="0" hangingPunct="1">
-                        <a:lnSpc>
-                          <a:spcPct val="100000"/>
-                        </a:lnSpc>
-                        <a:spcBef>
-                          <a:spcPts val="0"/>
-                        </a:spcBef>
-                        <a:spcAft>
-                          <a:spcPts val="0"/>
-                        </a:spcAft>
-                        <a:buClrTx/>
-                        <a:buSzTx/>
-                        <a:buFontTx/>
-                        <a:buNone/>
-                        <a:tabLst/>
-                        <a:defRPr/>
-                      </a:pPr>
-                      <a:r>
-                        <a:rPr lang="en-US" sz="1400" dirty="0" smtClean="0"/>
-                        <a:t>The Compare-And-Swap</a:t>
-                      </a:r>
-                      <a:r>
-                        <a:rPr lang="en-US" sz="1400" baseline="0" dirty="0" smtClean="0"/>
-                        <a:t> identifier</a:t>
-                      </a:r>
-                      <a:endParaRPr lang="en-US" sz="1400" dirty="0" smtClean="0"/>
-                    </a:p>
-                  </a:txBody>
-                  <a:tcPr>
-                    <a:lnL w="9525" cap="flat" cmpd="sng" algn="ctr">
-                      <a:solidFill>
-                        <a:srgbClr val="E40121"/>
-                      </a:solidFill>
-                      <a:prstDash val="solid"/>
-                      <a:round/>
-                      <a:headEnd type="none" w="med" len="med"/>
-                      <a:tailEnd type="none" w="med" len="med"/>
-                    </a:lnL>
-                    <a:lnR w="9525" cap="flat" cmpd="sng" algn="ctr">
-                      <a:solidFill>
-                        <a:srgbClr val="E40121"/>
-                      </a:solidFill>
-                      <a:prstDash val="solid"/>
-                      <a:round/>
-                      <a:headEnd type="none" w="med" len="med"/>
-                      <a:tailEnd type="none" w="med" len="med"/>
-                    </a:lnR>
-                    <a:lnT w="9525" cap="flat" cmpd="sng" algn="ctr">
-                      <a:solidFill>
-                        <a:srgbClr val="E40121"/>
-                      </a:solidFill>
-                      <a:prstDash val="solid"/>
-                      <a:round/>
-                      <a:headEnd type="none" w="med" len="med"/>
-                      <a:tailEnd type="none" w="med" len="med"/>
-                    </a:lnT>
-                    <a:lnB w="9525" cap="flat" cmpd="sng" algn="ctr">
-                      <a:solidFill>
-                        <a:srgbClr val="E40121"/>
-                      </a:solidFill>
-                      <a:prstDash val="solid"/>
-                      <a:round/>
-                      <a:headEnd type="none" w="med" len="med"/>
-                      <a:tailEnd type="none" w="med" len="med"/>
-                    </a:lnB>
-                    <a:noFill/>
-                  </a:tcPr>
-                </a:tc>
-              </a:tr>
-            </a:tbl>
-          </a:graphicData>
-        </a:graphic>
-      </p:graphicFrame>
-    </p:spTree>
-    <p:extLst>
-      <p:ext uri="{BB962C8B-B14F-4D97-AF65-F5344CB8AC3E}">
-        <p14:creationId xmlns:p14="http://schemas.microsoft.com/office/powerpoint/2010/main" val="636974870"/>
+        <p14:creationId xmlns:p14="http://schemas.microsoft.com/office/powerpoint/2010/main" val="1399823271"/>
       </p:ext>
     </p:extLst>
   </p:cSld>
@@ -5611,7 +4705,7 @@
 </p:sld>
 </file>
 
-<file path=ppt/slides/slide11.xml><?xml version="1.0" encoding="utf-8"?>
+<file path=ppt/slides/slide10.xml><?xml version="1.0" encoding="utf-8"?>
 <p:sld xmlns:a="http://schemas.openxmlformats.org/drawingml/2006/main" xmlns:r="http://schemas.openxmlformats.org/officeDocument/2006/relationships" xmlns:p="http://schemas.openxmlformats.org/presentationml/2006/main">
   <p:cSld>
     <p:spTree>
@@ -5794,7 +4888,7 @@
 </p:sld>
 </file>
 
-<file path=ppt/slides/slide12.xml><?xml version="1.0" encoding="utf-8"?>
+<file path=ppt/slides/slide11.xml><?xml version="1.0" encoding="utf-8"?>
 <p:sld xmlns:a="http://schemas.openxmlformats.org/drawingml/2006/main" xmlns:r="http://schemas.openxmlformats.org/officeDocument/2006/relationships" xmlns:p="http://schemas.openxmlformats.org/presentationml/2006/main">
   <p:cSld>
     <p:spTree>
@@ -6057,7 +5151,7 @@
 </p:sld>
 </file>
 
-<file path=ppt/slides/slide13.xml><?xml version="1.0" encoding="utf-8"?>
+<file path=ppt/slides/slide12.xml><?xml version="1.0" encoding="utf-8"?>
 <p:sld xmlns:a="http://schemas.openxmlformats.org/drawingml/2006/main" xmlns:r="http://schemas.openxmlformats.org/officeDocument/2006/relationships" xmlns:p="http://schemas.openxmlformats.org/presentationml/2006/main">
   <p:cSld>
     <p:spTree>
@@ -6140,7 +5234,7 @@
 </p:sld>
 </file>
 
-<file path=ppt/slides/slide14.xml><?xml version="1.0" encoding="utf-8"?>
+<file path=ppt/slides/slide13.xml><?xml version="1.0" encoding="utf-8"?>
 <p:sld xmlns:a="http://schemas.openxmlformats.org/drawingml/2006/main" xmlns:r="http://schemas.openxmlformats.org/officeDocument/2006/relationships" xmlns:p="http://schemas.openxmlformats.org/presentationml/2006/main">
   <p:cSld>
     <p:spTree>
@@ -6223,7 +5317,1207 @@
 </p:sld>
 </file>
 
+<file path=ppt/slides/slide14.xml><?xml version="1.0" encoding="utf-8"?>
+<p:sld xmlns:a="http://schemas.openxmlformats.org/drawingml/2006/main" xmlns:r="http://schemas.openxmlformats.org/officeDocument/2006/relationships" xmlns:p="http://schemas.openxmlformats.org/presentationml/2006/main">
+  <p:cSld>
+    <p:spTree>
+      <p:nvGrpSpPr>
+        <p:cNvPr id="1" name=""/>
+        <p:cNvGrpSpPr/>
+        <p:nvPr/>
+      </p:nvGrpSpPr>
+      <p:grpSpPr>
+        <a:xfrm>
+          <a:off x="0" y="0"/>
+          <a:ext cx="0" cy="0"/>
+          <a:chOff x="0" y="0"/>
+          <a:chExt cx="0" cy="0"/>
+        </a:xfrm>
+      </p:grpSpPr>
+      <p:sp>
+        <p:nvSpPr>
+          <p:cNvPr id="2" name="Content Placeholder 1"/>
+          <p:cNvSpPr>
+            <a:spLocks noGrp="1"/>
+          </p:cNvSpPr>
+          <p:nvPr>
+            <p:ph idx="1"/>
+          </p:nvPr>
+        </p:nvSpPr>
+        <p:spPr/>
+        <p:txBody>
+          <a:bodyPr/>
+          <a:lstStyle/>
+          <a:p>
+            <a:pPr marL="285750" indent="-285750">
+              <a:buFont typeface="Wingdings" charset="2"/>
+              <a:buChar char="§"/>
+            </a:pPr>
+            <a:r>
+              <a:rPr lang="en-US" b="1" dirty="0"/>
+              <a:t>i</a:t>
+            </a:r>
+            <a:r>
+              <a:rPr lang="en-US" b="1" dirty="0" smtClean="0"/>
+              <a:t>nsert()</a:t>
+            </a:r>
+            <a:r>
+              <a:rPr lang="en-US" dirty="0" smtClean="0"/>
+              <a:t> the document if it does not exist</a:t>
+            </a:r>
+          </a:p>
+          <a:p>
+            <a:pPr marL="285750" indent="-285750">
+              <a:buFont typeface="Wingdings" charset="2"/>
+              <a:buChar char="§"/>
+            </a:pPr>
+            <a:r>
+              <a:rPr lang="en-US" b="1" dirty="0"/>
+              <a:t>r</a:t>
+            </a:r>
+            <a:r>
+              <a:rPr lang="en-US" b="1" dirty="0" smtClean="0"/>
+              <a:t>eplace()</a:t>
+            </a:r>
+            <a:r>
+              <a:rPr lang="en-US" dirty="0" smtClean="0"/>
+              <a:t> the document if it does exist</a:t>
+            </a:r>
+          </a:p>
+          <a:p>
+            <a:pPr marL="285750" indent="-285750">
+              <a:buFont typeface="Wingdings" charset="2"/>
+              <a:buChar char="§"/>
+            </a:pPr>
+            <a:r>
+              <a:rPr lang="en-US" b="1" dirty="0" err="1"/>
+              <a:t>u</a:t>
+            </a:r>
+            <a:r>
+              <a:rPr lang="en-US" b="1" dirty="0" err="1" smtClean="0"/>
+              <a:t>psert</a:t>
+            </a:r>
+            <a:r>
+              <a:rPr lang="en-US" b="1" dirty="0" smtClean="0"/>
+              <a:t>()</a:t>
+            </a:r>
+            <a:r>
+              <a:rPr lang="en-US" dirty="0" smtClean="0"/>
+              <a:t> the document (insert or replace)</a:t>
+            </a:r>
+          </a:p>
+          <a:p>
+            <a:pPr marL="285750" indent="-285750">
+              <a:buFont typeface="Wingdings" charset="2"/>
+              <a:buChar char="§"/>
+            </a:pPr>
+            <a:r>
+              <a:rPr lang="en-US" b="1" dirty="0"/>
+              <a:t>r</a:t>
+            </a:r>
+            <a:r>
+              <a:rPr lang="en-US" b="1" dirty="0" smtClean="0"/>
+              <a:t>emove()</a:t>
+            </a:r>
+            <a:r>
+              <a:rPr lang="en-US" dirty="0" smtClean="0"/>
+              <a:t> the document</a:t>
+            </a:r>
+          </a:p>
+          <a:p>
+            <a:pPr marL="285750" indent="-285750">
+              <a:buFont typeface="Wingdings" charset="2"/>
+              <a:buChar char="§"/>
+            </a:pPr>
+            <a:endParaRPr lang="en-US" dirty="0"/>
+          </a:p>
+          <a:p>
+            <a:pPr marL="285750" indent="-285750">
+              <a:buFont typeface="Wingdings" charset="2"/>
+              <a:buChar char="§"/>
+            </a:pPr>
+            <a:r>
+              <a:rPr lang="en-US" b="1" dirty="0"/>
+              <a:t>a</a:t>
+            </a:r>
+            <a:r>
+              <a:rPr lang="en-US" b="1" dirty="0" smtClean="0"/>
+              <a:t>ppend()</a:t>
+            </a:r>
+            <a:r>
+              <a:rPr lang="en-US" dirty="0" smtClean="0"/>
+              <a:t> data to the document</a:t>
+            </a:r>
+          </a:p>
+          <a:p>
+            <a:pPr marL="285750" indent="-285750">
+              <a:buFont typeface="Wingdings" charset="2"/>
+              <a:buChar char="§"/>
+            </a:pPr>
+            <a:r>
+              <a:rPr lang="en-US" b="1" dirty="0"/>
+              <a:t>p</a:t>
+            </a:r>
+            <a:r>
+              <a:rPr lang="en-US" b="1" dirty="0" smtClean="0"/>
+              <a:t>repend()</a:t>
+            </a:r>
+            <a:r>
+              <a:rPr lang="en-US" dirty="0" smtClean="0"/>
+              <a:t> data to the document</a:t>
+            </a:r>
+          </a:p>
+          <a:p>
+            <a:pPr marL="285750" indent="-285750">
+              <a:buFont typeface="Wingdings" charset="2"/>
+              <a:buChar char="§"/>
+            </a:pPr>
+            <a:endParaRPr lang="en-US" dirty="0"/>
+          </a:p>
+          <a:p>
+            <a:pPr marL="285750" indent="-285750">
+              <a:buFont typeface="Wingdings" charset="2"/>
+              <a:buChar char="§"/>
+            </a:pPr>
+            <a:r>
+              <a:rPr lang="en-US" b="1" dirty="0"/>
+              <a:t>c</a:t>
+            </a:r>
+            <a:r>
+              <a:rPr lang="en-US" b="1" dirty="0" smtClean="0"/>
+              <a:t>ounter()</a:t>
+            </a:r>
+            <a:r>
+              <a:rPr lang="en-US" dirty="0" smtClean="0"/>
+              <a:t> for increment/decrement type operations</a:t>
+            </a:r>
+          </a:p>
+          <a:p>
+            <a:pPr marL="285750" indent="-285750">
+              <a:buFont typeface="Wingdings" charset="2"/>
+              <a:buChar char="§"/>
+            </a:pPr>
+            <a:endParaRPr lang="en-US" dirty="0"/>
+          </a:p>
+          <a:p>
+            <a:pPr marL="285750" indent="-285750">
+              <a:buFont typeface="Wingdings" charset="2"/>
+              <a:buChar char="§"/>
+            </a:pPr>
+            <a:endParaRPr lang="en-US" dirty="0"/>
+          </a:p>
+        </p:txBody>
+      </p:sp>
+      <p:sp>
+        <p:nvSpPr>
+          <p:cNvPr id="3" name="Title 2"/>
+          <p:cNvSpPr>
+            <a:spLocks noGrp="1"/>
+          </p:cNvSpPr>
+          <p:nvPr>
+            <p:ph type="title"/>
+          </p:nvPr>
+        </p:nvSpPr>
+        <p:spPr/>
+        <p:txBody>
+          <a:bodyPr/>
+          <a:lstStyle/>
+          <a:p>
+            <a:r>
+              <a:rPr lang="en-US" dirty="0" smtClean="0"/>
+              <a:t>Bucket API – Modifying Documents</a:t>
+            </a:r>
+            <a:endParaRPr lang="en-US" dirty="0"/>
+          </a:p>
+        </p:txBody>
+      </p:sp>
+    </p:spTree>
+    <p:extLst>
+      <p:ext uri="{BB962C8B-B14F-4D97-AF65-F5344CB8AC3E}">
+        <p14:creationId xmlns:p14="http://schemas.microsoft.com/office/powerpoint/2010/main" val="2788152039"/>
+      </p:ext>
+    </p:extLst>
+  </p:cSld>
+  <p:clrMapOvr>
+    <a:masterClrMapping/>
+  </p:clrMapOvr>
+</p:sld>
+</file>
+
 <file path=ppt/slides/slide15.xml><?xml version="1.0" encoding="utf-8"?>
+<p:sld xmlns:a="http://schemas.openxmlformats.org/drawingml/2006/main" xmlns:r="http://schemas.openxmlformats.org/officeDocument/2006/relationships" xmlns:p="http://schemas.openxmlformats.org/presentationml/2006/main">
+  <p:cSld>
+    <p:spTree>
+      <p:nvGrpSpPr>
+        <p:cNvPr id="1" name=""/>
+        <p:cNvGrpSpPr/>
+        <p:nvPr/>
+      </p:nvGrpSpPr>
+      <p:grpSpPr>
+        <a:xfrm>
+          <a:off x="0" y="0"/>
+          <a:ext cx="0" cy="0"/>
+          <a:chOff x="0" y="0"/>
+          <a:chExt cx="0" cy="0"/>
+        </a:xfrm>
+      </p:grpSpPr>
+      <p:sp>
+        <p:nvSpPr>
+          <p:cNvPr id="3" name="Title 2"/>
+          <p:cNvSpPr>
+            <a:spLocks noGrp="1"/>
+          </p:cNvSpPr>
+          <p:nvPr>
+            <p:ph type="title"/>
+          </p:nvPr>
+        </p:nvSpPr>
+        <p:spPr/>
+        <p:txBody>
+          <a:bodyPr/>
+          <a:lstStyle/>
+          <a:p>
+            <a:r>
+              <a:rPr lang="en-US" dirty="0" smtClean="0"/>
+              <a:t>Insert .NET</a:t>
+            </a:r>
+            <a:endParaRPr lang="en-US" dirty="0"/>
+          </a:p>
+        </p:txBody>
+      </p:sp>
+      <p:sp>
+        <p:nvSpPr>
+          <p:cNvPr id="4" name="Footer Placeholder 3"/>
+          <p:cNvSpPr>
+            <a:spLocks noGrp="1"/>
+          </p:cNvSpPr>
+          <p:nvPr>
+            <p:ph type="ftr" sz="quarter" idx="11"/>
+          </p:nvPr>
+        </p:nvSpPr>
+        <p:spPr/>
+        <p:txBody>
+          <a:bodyPr/>
+          <a:lstStyle/>
+          <a:p>
+            <a:r>
+              <a:rPr lang="en-US" smtClean="0"/>
+              <a:t>©2014 Couchbase, Inc. — Proprietary and Confidential</a:t>
+            </a:r>
+            <a:endParaRPr lang="en-US" dirty="0"/>
+          </a:p>
+        </p:txBody>
+      </p:sp>
+      <p:pic>
+        <p:nvPicPr>
+          <p:cNvPr id="6" name="Picture 5" descr="Screen Shot 2014-09-18 at 14.05.36.png"/>
+          <p:cNvPicPr>
+            <a:picLocks noChangeAspect="1"/>
+          </p:cNvPicPr>
+          <p:nvPr/>
+        </p:nvPicPr>
+        <p:blipFill>
+          <a:blip r:embed="rId2">
+            <a:extLst>
+              <a:ext uri="{28A0092B-C50C-407E-A947-70E740481C1C}">
+                <a14:useLocalDpi xmlns:a14="http://schemas.microsoft.com/office/drawing/2010/main" val="0"/>
+              </a:ext>
+            </a:extLst>
+          </a:blip>
+          <a:stretch>
+            <a:fillRect/>
+          </a:stretch>
+        </p:blipFill>
+        <p:spPr>
+          <a:xfrm>
+            <a:off x="966767" y="567443"/>
+            <a:ext cx="7587726" cy="4458960"/>
+          </a:xfrm>
+          <a:prstGeom prst="rect">
+            <a:avLst/>
+          </a:prstGeom>
+        </p:spPr>
+      </p:pic>
+    </p:spTree>
+    <p:extLst>
+      <p:ext uri="{BB962C8B-B14F-4D97-AF65-F5344CB8AC3E}">
+        <p14:creationId xmlns:p14="http://schemas.microsoft.com/office/powerpoint/2010/main" val="1800071887"/>
+      </p:ext>
+    </p:extLst>
+  </p:cSld>
+  <p:clrMapOvr>
+    <a:masterClrMapping/>
+  </p:clrMapOvr>
+</p:sld>
+</file>
+
+<file path=ppt/slides/slide16.xml><?xml version="1.0" encoding="utf-8"?>
+<p:sld xmlns:a="http://schemas.openxmlformats.org/drawingml/2006/main" xmlns:r="http://schemas.openxmlformats.org/officeDocument/2006/relationships" xmlns:p="http://schemas.openxmlformats.org/presentationml/2006/main">
+  <p:cSld>
+    <p:spTree>
+      <p:nvGrpSpPr>
+        <p:cNvPr id="1" name=""/>
+        <p:cNvGrpSpPr/>
+        <p:nvPr/>
+      </p:nvGrpSpPr>
+      <p:grpSpPr>
+        <a:xfrm>
+          <a:off x="0" y="0"/>
+          <a:ext cx="0" cy="0"/>
+          <a:chOff x="0" y="0"/>
+          <a:chExt cx="0" cy="0"/>
+        </a:xfrm>
+      </p:grpSpPr>
+      <p:sp>
+        <p:nvSpPr>
+          <p:cNvPr id="3" name="Title 2"/>
+          <p:cNvSpPr>
+            <a:spLocks noGrp="1"/>
+          </p:cNvSpPr>
+          <p:nvPr>
+            <p:ph type="title"/>
+          </p:nvPr>
+        </p:nvSpPr>
+        <p:spPr/>
+        <p:txBody>
+          <a:bodyPr/>
+          <a:lstStyle/>
+          <a:p>
+            <a:r>
+              <a:rPr lang="en-US" dirty="0" smtClean="0"/>
+              <a:t>Replace Java</a:t>
+            </a:r>
+            <a:endParaRPr lang="en-US" dirty="0"/>
+          </a:p>
+        </p:txBody>
+      </p:sp>
+      <p:pic>
+        <p:nvPicPr>
+          <p:cNvPr id="2" name="Picture 1" descr="Screen Shot 2014-09-18 at 14.08.45.png"/>
+          <p:cNvPicPr>
+            <a:picLocks noChangeAspect="1"/>
+          </p:cNvPicPr>
+          <p:nvPr/>
+        </p:nvPicPr>
+        <p:blipFill>
+          <a:blip r:embed="rId2">
+            <a:extLst>
+              <a:ext uri="{28A0092B-C50C-407E-A947-70E740481C1C}">
+                <a14:useLocalDpi xmlns:a14="http://schemas.microsoft.com/office/drawing/2010/main" val="0"/>
+              </a:ext>
+            </a:extLst>
+          </a:blip>
+          <a:stretch>
+            <a:fillRect/>
+          </a:stretch>
+        </p:blipFill>
+        <p:spPr>
+          <a:xfrm>
+            <a:off x="0" y="1562100"/>
+            <a:ext cx="9144000" cy="2007220"/>
+          </a:xfrm>
+          <a:prstGeom prst="rect">
+            <a:avLst/>
+          </a:prstGeom>
+        </p:spPr>
+      </p:pic>
+    </p:spTree>
+    <p:extLst>
+      <p:ext uri="{BB962C8B-B14F-4D97-AF65-F5344CB8AC3E}">
+        <p14:creationId xmlns:p14="http://schemas.microsoft.com/office/powerpoint/2010/main" val="2912734100"/>
+      </p:ext>
+    </p:extLst>
+  </p:cSld>
+  <p:clrMapOvr>
+    <a:masterClrMapping/>
+  </p:clrMapOvr>
+</p:sld>
+</file>
+
+<file path=ppt/slides/slide17.xml><?xml version="1.0" encoding="utf-8"?>
+<p:sld xmlns:a="http://schemas.openxmlformats.org/drawingml/2006/main" xmlns:r="http://schemas.openxmlformats.org/officeDocument/2006/relationships" xmlns:p="http://schemas.openxmlformats.org/presentationml/2006/main">
+  <p:cSld>
+    <p:spTree>
+      <p:nvGrpSpPr>
+        <p:cNvPr id="1" name=""/>
+        <p:cNvGrpSpPr/>
+        <p:nvPr/>
+      </p:nvGrpSpPr>
+      <p:grpSpPr>
+        <a:xfrm>
+          <a:off x="0" y="0"/>
+          <a:ext cx="0" cy="0"/>
+          <a:chOff x="0" y="0"/>
+          <a:chExt cx="0" cy="0"/>
+        </a:xfrm>
+      </p:grpSpPr>
+      <p:sp>
+        <p:nvSpPr>
+          <p:cNvPr id="3" name="Title 2"/>
+          <p:cNvSpPr>
+            <a:spLocks noGrp="1"/>
+          </p:cNvSpPr>
+          <p:nvPr>
+            <p:ph type="title"/>
+          </p:nvPr>
+        </p:nvSpPr>
+        <p:spPr/>
+        <p:txBody>
+          <a:bodyPr/>
+          <a:lstStyle/>
+          <a:p>
+            <a:r>
+              <a:rPr lang="en-US" dirty="0"/>
+              <a:t>Bucket API – Retrieving </a:t>
+            </a:r>
+            <a:r>
+              <a:rPr lang="en-US" dirty="0" smtClean="0"/>
+              <a:t>Documents</a:t>
+            </a:r>
+            <a:endParaRPr lang="en-US" dirty="0"/>
+          </a:p>
+        </p:txBody>
+      </p:sp>
+      <p:sp>
+        <p:nvSpPr>
+          <p:cNvPr id="6" name="Content Placeholder 1"/>
+          <p:cNvSpPr>
+            <a:spLocks noGrp="1"/>
+          </p:cNvSpPr>
+          <p:nvPr>
+            <p:ph idx="1"/>
+          </p:nvPr>
+        </p:nvSpPr>
+        <p:spPr>
+          <a:xfrm>
+            <a:off x="465555" y="1063432"/>
+            <a:ext cx="8229600" cy="3539546"/>
+          </a:xfrm>
+        </p:spPr>
+        <p:txBody>
+          <a:bodyPr/>
+          <a:lstStyle/>
+          <a:p>
+            <a:pPr marL="285750" indent="-285750">
+              <a:buFont typeface="Wingdings" charset="2"/>
+              <a:buChar char="§"/>
+            </a:pPr>
+            <a:r>
+              <a:rPr lang="en-US" b="1" dirty="0" smtClean="0"/>
+              <a:t>get()</a:t>
+            </a:r>
+            <a:r>
+              <a:rPr lang="en-US" dirty="0" smtClean="0"/>
+              <a:t> the document</a:t>
+            </a:r>
+          </a:p>
+          <a:p>
+            <a:pPr marL="285750" indent="-285750">
+              <a:buFont typeface="Wingdings" charset="2"/>
+              <a:buChar char="§"/>
+            </a:pPr>
+            <a:r>
+              <a:rPr lang="en-US" b="1" dirty="0" err="1" smtClean="0"/>
+              <a:t>getFromReplica</a:t>
+            </a:r>
+            <a:r>
+              <a:rPr lang="en-US" b="1" dirty="0" smtClean="0"/>
+              <a:t>()</a:t>
+            </a:r>
+            <a:r>
+              <a:rPr lang="en-US" dirty="0" smtClean="0"/>
+              <a:t> if the master is not available</a:t>
+            </a:r>
+          </a:p>
+          <a:p>
+            <a:pPr marL="285750" indent="-285750">
+              <a:buFont typeface="Wingdings" charset="2"/>
+              <a:buChar char="§"/>
+            </a:pPr>
+            <a:endParaRPr lang="en-US" dirty="0"/>
+          </a:p>
+          <a:p>
+            <a:pPr marL="285750" indent="-285750">
+              <a:buFont typeface="Wingdings" charset="2"/>
+              <a:buChar char="§"/>
+            </a:pPr>
+            <a:r>
+              <a:rPr lang="en-US" b="1" dirty="0" err="1" smtClean="0"/>
+              <a:t>getAndLock</a:t>
+            </a:r>
+            <a:r>
+              <a:rPr lang="en-US" b="1" dirty="0" smtClean="0"/>
+              <a:t>()</a:t>
+            </a:r>
+            <a:r>
+              <a:rPr lang="en-US" dirty="0" smtClean="0"/>
+              <a:t> to load the document and write-lock it</a:t>
+            </a:r>
+          </a:p>
+          <a:p>
+            <a:pPr marL="285750" indent="-285750">
+              <a:buFont typeface="Wingdings" charset="2"/>
+              <a:buChar char="§"/>
+            </a:pPr>
+            <a:r>
+              <a:rPr lang="en-US" b="1" dirty="0" err="1" smtClean="0"/>
+              <a:t>getAndTouch</a:t>
+            </a:r>
+            <a:r>
+              <a:rPr lang="en-US" b="1" dirty="0" smtClean="0"/>
+              <a:t>()</a:t>
+            </a:r>
+            <a:r>
+              <a:rPr lang="en-US" dirty="0" smtClean="0"/>
+              <a:t> to load the document and reset the expiry</a:t>
+            </a:r>
+            <a:endParaRPr lang="en-US" dirty="0"/>
+          </a:p>
+        </p:txBody>
+      </p:sp>
+    </p:spTree>
+    <p:extLst>
+      <p:ext uri="{BB962C8B-B14F-4D97-AF65-F5344CB8AC3E}">
+        <p14:creationId xmlns:p14="http://schemas.microsoft.com/office/powerpoint/2010/main" val="3238342245"/>
+      </p:ext>
+    </p:extLst>
+  </p:cSld>
+  <p:clrMapOvr>
+    <a:masterClrMapping/>
+  </p:clrMapOvr>
+</p:sld>
+</file>
+
+<file path=ppt/slides/slide18.xml><?xml version="1.0" encoding="utf-8"?>
+<p:sld xmlns:a="http://schemas.openxmlformats.org/drawingml/2006/main" xmlns:r="http://schemas.openxmlformats.org/officeDocument/2006/relationships" xmlns:p="http://schemas.openxmlformats.org/presentationml/2006/main">
+  <p:cSld>
+    <p:spTree>
+      <p:nvGrpSpPr>
+        <p:cNvPr id="1" name=""/>
+        <p:cNvGrpSpPr/>
+        <p:nvPr/>
+      </p:nvGrpSpPr>
+      <p:grpSpPr>
+        <a:xfrm>
+          <a:off x="0" y="0"/>
+          <a:ext cx="0" cy="0"/>
+          <a:chOff x="0" y="0"/>
+          <a:chExt cx="0" cy="0"/>
+        </a:xfrm>
+      </p:grpSpPr>
+      <p:sp>
+        <p:nvSpPr>
+          <p:cNvPr id="3" name="Title 2"/>
+          <p:cNvSpPr>
+            <a:spLocks noGrp="1"/>
+          </p:cNvSpPr>
+          <p:nvPr>
+            <p:ph type="title"/>
+          </p:nvPr>
+        </p:nvSpPr>
+        <p:spPr/>
+        <p:txBody>
+          <a:bodyPr/>
+          <a:lstStyle/>
+          <a:p>
+            <a:r>
+              <a:rPr lang="en-US" dirty="0" smtClean="0"/>
+              <a:t>Get PHP</a:t>
+            </a:r>
+            <a:endParaRPr lang="en-US" dirty="0"/>
+          </a:p>
+        </p:txBody>
+      </p:sp>
+      <p:pic>
+        <p:nvPicPr>
+          <p:cNvPr id="6" name="Picture 5" descr="Screen Shot 2014-09-18 at 14.10.40.png"/>
+          <p:cNvPicPr>
+            <a:picLocks noChangeAspect="1"/>
+          </p:cNvPicPr>
+          <p:nvPr/>
+        </p:nvPicPr>
+        <p:blipFill>
+          <a:blip r:embed="rId2">
+            <a:extLst>
+              <a:ext uri="{28A0092B-C50C-407E-A947-70E740481C1C}">
+                <a14:useLocalDpi xmlns:a14="http://schemas.microsoft.com/office/drawing/2010/main" val="0"/>
+              </a:ext>
+            </a:extLst>
+          </a:blip>
+          <a:stretch>
+            <a:fillRect/>
+          </a:stretch>
+        </p:blipFill>
+        <p:spPr>
+          <a:xfrm>
+            <a:off x="168070" y="794678"/>
+            <a:ext cx="5445155" cy="1571903"/>
+          </a:xfrm>
+          <a:prstGeom prst="rect">
+            <a:avLst/>
+          </a:prstGeom>
+        </p:spPr>
+      </p:pic>
+      <p:pic>
+        <p:nvPicPr>
+          <p:cNvPr id="7" name="Picture 6" descr="Screen Shot 2014-09-18 at 14.11.37.png"/>
+          <p:cNvPicPr>
+            <a:picLocks noChangeAspect="1"/>
+          </p:cNvPicPr>
+          <p:nvPr/>
+        </p:nvPicPr>
+        <p:blipFill>
+          <a:blip r:embed="rId3">
+            <a:extLst>
+              <a:ext uri="{28A0092B-C50C-407E-A947-70E740481C1C}">
+                <a14:useLocalDpi xmlns:a14="http://schemas.microsoft.com/office/drawing/2010/main" val="0"/>
+              </a:ext>
+            </a:extLst>
+          </a:blip>
+          <a:stretch>
+            <a:fillRect/>
+          </a:stretch>
+        </p:blipFill>
+        <p:spPr>
+          <a:xfrm>
+            <a:off x="4120951" y="1939644"/>
+            <a:ext cx="3971076" cy="2827619"/>
+          </a:xfrm>
+          <a:prstGeom prst="rect">
+            <a:avLst/>
+          </a:prstGeom>
+        </p:spPr>
+      </p:pic>
+    </p:spTree>
+    <p:extLst>
+      <p:ext uri="{BB962C8B-B14F-4D97-AF65-F5344CB8AC3E}">
+        <p14:creationId xmlns:p14="http://schemas.microsoft.com/office/powerpoint/2010/main" val="1425358000"/>
+      </p:ext>
+    </p:extLst>
+  </p:cSld>
+  <p:clrMapOvr>
+    <a:masterClrMapping/>
+  </p:clrMapOvr>
+</p:sld>
+</file>
+
+<file path=ppt/slides/slide19.xml><?xml version="1.0" encoding="utf-8"?>
+<p:sld xmlns:a="http://schemas.openxmlformats.org/drawingml/2006/main" xmlns:r="http://schemas.openxmlformats.org/officeDocument/2006/relationships" xmlns:p="http://schemas.openxmlformats.org/presentationml/2006/main">
+  <p:cSld>
+    <p:spTree>
+      <p:nvGrpSpPr>
+        <p:cNvPr id="1" name=""/>
+        <p:cNvGrpSpPr/>
+        <p:nvPr/>
+      </p:nvGrpSpPr>
+      <p:grpSpPr>
+        <a:xfrm>
+          <a:off x="0" y="0"/>
+          <a:ext cx="0" cy="0"/>
+          <a:chOff x="0" y="0"/>
+          <a:chExt cx="0" cy="0"/>
+        </a:xfrm>
+      </p:grpSpPr>
+      <p:sp>
+        <p:nvSpPr>
+          <p:cNvPr id="3" name="Title 2"/>
+          <p:cNvSpPr>
+            <a:spLocks noGrp="1"/>
+          </p:cNvSpPr>
+          <p:nvPr>
+            <p:ph type="title"/>
+          </p:nvPr>
+        </p:nvSpPr>
+        <p:spPr/>
+        <p:txBody>
+          <a:bodyPr/>
+          <a:lstStyle/>
+          <a:p>
+            <a:r>
+              <a:rPr lang="en-US" dirty="0" smtClean="0"/>
+              <a:t>Get </a:t>
+            </a:r>
+            <a:r>
+              <a:rPr lang="en-US" dirty="0" err="1" smtClean="0"/>
+              <a:t>NodeJS</a:t>
+            </a:r>
+            <a:endParaRPr lang="en-US" dirty="0"/>
+          </a:p>
+        </p:txBody>
+      </p:sp>
+      <p:pic>
+        <p:nvPicPr>
+          <p:cNvPr id="2" name="Picture 1" descr="Screen Shot 2014-09-18 at 14.13.48.png"/>
+          <p:cNvPicPr>
+            <a:picLocks noChangeAspect="1"/>
+          </p:cNvPicPr>
+          <p:nvPr/>
+        </p:nvPicPr>
+        <p:blipFill>
+          <a:blip r:embed="rId2">
+            <a:extLst>
+              <a:ext uri="{28A0092B-C50C-407E-A947-70E740481C1C}">
+                <a14:useLocalDpi xmlns:a14="http://schemas.microsoft.com/office/drawing/2010/main" val="0"/>
+              </a:ext>
+            </a:extLst>
+          </a:blip>
+          <a:stretch>
+            <a:fillRect/>
+          </a:stretch>
+        </p:blipFill>
+        <p:spPr>
+          <a:xfrm>
+            <a:off x="0" y="1028700"/>
+            <a:ext cx="9144000" cy="3081428"/>
+          </a:xfrm>
+          <a:prstGeom prst="rect">
+            <a:avLst/>
+          </a:prstGeom>
+        </p:spPr>
+      </p:pic>
+    </p:spTree>
+    <p:extLst>
+      <p:ext uri="{BB962C8B-B14F-4D97-AF65-F5344CB8AC3E}">
+        <p14:creationId xmlns:p14="http://schemas.microsoft.com/office/powerpoint/2010/main" val="3094920282"/>
+      </p:ext>
+    </p:extLst>
+  </p:cSld>
+  <p:clrMapOvr>
+    <a:masterClrMapping/>
+  </p:clrMapOvr>
+</p:sld>
+</file>
+
+<file path=ppt/slides/slide2.xml><?xml version="1.0" encoding="utf-8"?>
+<p:sld xmlns:a="http://schemas.openxmlformats.org/drawingml/2006/main" xmlns:r="http://schemas.openxmlformats.org/officeDocument/2006/relationships" xmlns:p="http://schemas.openxmlformats.org/presentationml/2006/main">
+  <p:cSld>
+    <p:spTree>
+      <p:nvGrpSpPr>
+        <p:cNvPr id="1" name=""/>
+        <p:cNvGrpSpPr/>
+        <p:nvPr/>
+      </p:nvGrpSpPr>
+      <p:grpSpPr>
+        <a:xfrm>
+          <a:off x="0" y="0"/>
+          <a:ext cx="0" cy="0"/>
+          <a:chOff x="0" y="0"/>
+          <a:chExt cx="0" cy="0"/>
+        </a:xfrm>
+      </p:grpSpPr>
+      <p:sp>
+        <p:nvSpPr>
+          <p:cNvPr id="2" name="Title 1"/>
+          <p:cNvSpPr>
+            <a:spLocks noGrp="1"/>
+          </p:cNvSpPr>
+          <p:nvPr>
+            <p:ph type="title"/>
+          </p:nvPr>
+        </p:nvSpPr>
+        <p:spPr/>
+        <p:txBody>
+          <a:bodyPr/>
+          <a:lstStyle/>
+          <a:p>
+            <a:r>
+              <a:rPr lang="en-US" dirty="0" smtClean="0"/>
+              <a:t>Agenda</a:t>
+            </a:r>
+            <a:endParaRPr lang="en-US" dirty="0"/>
+          </a:p>
+        </p:txBody>
+      </p:sp>
+      <p:sp>
+        <p:nvSpPr>
+          <p:cNvPr id="3" name="Content Placeholder 2"/>
+          <p:cNvSpPr>
+            <a:spLocks noGrp="1"/>
+          </p:cNvSpPr>
+          <p:nvPr>
+            <p:ph idx="1"/>
+          </p:nvPr>
+        </p:nvSpPr>
+        <p:spPr/>
+        <p:txBody>
+          <a:bodyPr/>
+          <a:lstStyle/>
+          <a:p>
+            <a:r>
+              <a:rPr lang="en-US" dirty="0" smtClean="0"/>
+              <a:t>SDK Overview</a:t>
+            </a:r>
+          </a:p>
+          <a:p>
+            <a:r>
+              <a:rPr lang="en-US" dirty="0" smtClean="0"/>
+              <a:t>High-Level Architecture</a:t>
+            </a:r>
+          </a:p>
+          <a:p>
+            <a:endParaRPr lang="en-US" dirty="0" smtClean="0"/>
+          </a:p>
+          <a:p>
+            <a:r>
+              <a:rPr lang="en-US" dirty="0" smtClean="0"/>
+              <a:t>APIs</a:t>
+            </a:r>
+          </a:p>
+          <a:p>
+            <a:pPr lvl="1"/>
+            <a:r>
+              <a:rPr lang="en-US" dirty="0" smtClean="0"/>
+              <a:t>Cluster, Bucket, Documents,…</a:t>
+            </a:r>
+          </a:p>
+          <a:p>
+            <a:endParaRPr lang="en-US" dirty="0"/>
+          </a:p>
+        </p:txBody>
+      </p:sp>
+    </p:spTree>
+    <p:extLst>
+      <p:ext uri="{BB962C8B-B14F-4D97-AF65-F5344CB8AC3E}">
+        <p14:creationId xmlns:p14="http://schemas.microsoft.com/office/powerpoint/2010/main" val="701019740"/>
+      </p:ext>
+    </p:extLst>
+  </p:cSld>
+  <p:clrMapOvr>
+    <a:masterClrMapping/>
+  </p:clrMapOvr>
+  <p:timing>
+    <p:tnLst>
+      <p:par>
+        <p:cTn xmlns:p14="http://schemas.microsoft.com/office/powerpoint/2010/main" id="1" dur="indefinite" restart="never" nodeType="tmRoot"/>
+      </p:par>
+    </p:tnLst>
+  </p:timing>
+</p:sld>
+</file>
+
+<file path=ppt/slides/slide20.xml><?xml version="1.0" encoding="utf-8"?>
+<p:sld xmlns:a="http://schemas.openxmlformats.org/drawingml/2006/main" xmlns:r="http://schemas.openxmlformats.org/officeDocument/2006/relationships" xmlns:p="http://schemas.openxmlformats.org/presentationml/2006/main">
+  <p:cSld>
+    <p:spTree>
+      <p:nvGrpSpPr>
+        <p:cNvPr id="1" name=""/>
+        <p:cNvGrpSpPr/>
+        <p:nvPr/>
+      </p:nvGrpSpPr>
+      <p:grpSpPr>
+        <a:xfrm>
+          <a:off x="0" y="0"/>
+          <a:ext cx="0" cy="0"/>
+          <a:chOff x="0" y="0"/>
+          <a:chExt cx="0" cy="0"/>
+        </a:xfrm>
+      </p:grpSpPr>
+      <p:sp>
+        <p:nvSpPr>
+          <p:cNvPr id="2" name="Content Placeholder 1"/>
+          <p:cNvSpPr>
+            <a:spLocks noGrp="1"/>
+          </p:cNvSpPr>
+          <p:nvPr>
+            <p:ph idx="1"/>
+          </p:nvPr>
+        </p:nvSpPr>
+        <p:spPr/>
+        <p:txBody>
+          <a:bodyPr/>
+          <a:lstStyle/>
+          <a:p>
+            <a:pPr marL="285750" indent="-285750">
+              <a:buFont typeface="Wingdings" charset="2"/>
+              <a:buChar char="§"/>
+            </a:pPr>
+            <a:r>
+              <a:rPr lang="en-US" b="1" dirty="0"/>
+              <a:t>q</a:t>
+            </a:r>
+            <a:r>
+              <a:rPr lang="en-US" b="1" dirty="0" smtClean="0"/>
+              <a:t>uery()</a:t>
+            </a:r>
+            <a:r>
+              <a:rPr lang="en-US" dirty="0" smtClean="0"/>
+              <a:t> is possible for</a:t>
+            </a:r>
+          </a:p>
+          <a:p>
+            <a:pPr marL="587375" lvl="1" indent="-285750">
+              <a:buFont typeface="Wingdings" charset="2"/>
+              <a:buChar char="§"/>
+            </a:pPr>
+            <a:r>
+              <a:rPr lang="en-US" dirty="0" smtClean="0"/>
+              <a:t>Views</a:t>
+            </a:r>
+          </a:p>
+          <a:p>
+            <a:pPr marL="587375" lvl="1" indent="-285750">
+              <a:buFont typeface="Wingdings" charset="2"/>
+              <a:buChar char="§"/>
+            </a:pPr>
+            <a:r>
+              <a:rPr lang="en-US" dirty="0" smtClean="0"/>
+              <a:t>N1QL </a:t>
+            </a:r>
+            <a:r>
+              <a:rPr lang="en-US" dirty="0" smtClean="0"/>
+              <a:t>(experimental until 4.0 GA)</a:t>
+            </a:r>
+            <a:endParaRPr lang="en-US" dirty="0" smtClean="0"/>
+          </a:p>
+          <a:p>
+            <a:pPr marL="587375" lvl="1" indent="-285750">
+              <a:buFont typeface="Wingdings" charset="2"/>
+              <a:buChar char="§"/>
+            </a:pPr>
+            <a:endParaRPr lang="en-US" dirty="0"/>
+          </a:p>
+          <a:p>
+            <a:pPr marL="285750" indent="-285750">
+              <a:buFont typeface="Wingdings" charset="2"/>
+              <a:buChar char="§"/>
+            </a:pPr>
+            <a:endParaRPr lang="en-US" dirty="0" smtClean="0"/>
+          </a:p>
+          <a:p>
+            <a:pPr marL="285750" indent="-285750">
+              <a:buFont typeface="Wingdings" charset="2"/>
+              <a:buChar char="§"/>
+            </a:pPr>
+            <a:r>
+              <a:rPr lang="en-US" dirty="0" smtClean="0"/>
+              <a:t>Streams N response rows as they arrive from the server</a:t>
+            </a:r>
+          </a:p>
+          <a:p>
+            <a:pPr marL="285750" indent="-285750">
+              <a:buFont typeface="Wingdings" charset="2"/>
+              <a:buChar char="§"/>
+            </a:pPr>
+            <a:r>
+              <a:rPr lang="en-US" dirty="0" smtClean="0"/>
+              <a:t>Loads more than one Document based on Criteria</a:t>
+            </a:r>
+          </a:p>
+          <a:p>
+            <a:pPr marL="285750" indent="-285750">
+              <a:buFont typeface="Wingdings" charset="2"/>
+              <a:buChar char="§"/>
+            </a:pPr>
+            <a:r>
+              <a:rPr lang="en-US" dirty="0" smtClean="0"/>
+              <a:t>Typically used to satisfy secondary and advanced querying use cases</a:t>
+            </a:r>
+            <a:endParaRPr lang="en-US" dirty="0"/>
+          </a:p>
+        </p:txBody>
+      </p:sp>
+      <p:sp>
+        <p:nvSpPr>
+          <p:cNvPr id="3" name="Title 2"/>
+          <p:cNvSpPr>
+            <a:spLocks noGrp="1"/>
+          </p:cNvSpPr>
+          <p:nvPr>
+            <p:ph type="title"/>
+          </p:nvPr>
+        </p:nvSpPr>
+        <p:spPr/>
+        <p:txBody>
+          <a:bodyPr/>
+          <a:lstStyle/>
+          <a:p>
+            <a:r>
+              <a:rPr lang="en-US" dirty="0"/>
+              <a:t>Bucket API – Querying</a:t>
+            </a:r>
+            <a:endParaRPr lang="en-US" dirty="0"/>
+          </a:p>
+        </p:txBody>
+      </p:sp>
+    </p:spTree>
+    <p:extLst>
+      <p:ext uri="{BB962C8B-B14F-4D97-AF65-F5344CB8AC3E}">
+        <p14:creationId xmlns:p14="http://schemas.microsoft.com/office/powerpoint/2010/main" val="4153864821"/>
+      </p:ext>
+    </p:extLst>
+  </p:cSld>
+  <p:clrMapOvr>
+    <a:masterClrMapping/>
+  </p:clrMapOvr>
+</p:sld>
+</file>
+
+<file path=ppt/slides/slide21.xml><?xml version="1.0" encoding="utf-8"?>
+<p:sld xmlns:a="http://schemas.openxmlformats.org/drawingml/2006/main" xmlns:r="http://schemas.openxmlformats.org/officeDocument/2006/relationships" xmlns:p="http://schemas.openxmlformats.org/presentationml/2006/main">
+  <p:cSld>
+    <p:spTree>
+      <p:nvGrpSpPr>
+        <p:cNvPr id="1" name=""/>
+        <p:cNvGrpSpPr/>
+        <p:nvPr/>
+      </p:nvGrpSpPr>
+      <p:grpSpPr>
+        <a:xfrm>
+          <a:off x="0" y="0"/>
+          <a:ext cx="0" cy="0"/>
+          <a:chOff x="0" y="0"/>
+          <a:chExt cx="0" cy="0"/>
+        </a:xfrm>
+      </p:grpSpPr>
+      <p:sp>
+        <p:nvSpPr>
+          <p:cNvPr id="3" name="Title 2"/>
+          <p:cNvSpPr>
+            <a:spLocks noGrp="1"/>
+          </p:cNvSpPr>
+          <p:nvPr>
+            <p:ph type="title"/>
+          </p:nvPr>
+        </p:nvSpPr>
+        <p:spPr/>
+        <p:txBody>
+          <a:bodyPr/>
+          <a:lstStyle/>
+          <a:p>
+            <a:r>
+              <a:rPr lang="en-US" dirty="0" smtClean="0"/>
+              <a:t>Sync Querying Java</a:t>
+            </a:r>
+            <a:endParaRPr lang="en-US" dirty="0"/>
+          </a:p>
+        </p:txBody>
+      </p:sp>
+      <p:pic>
+        <p:nvPicPr>
+          <p:cNvPr id="6" name="Picture 5" descr="Screen Shot 2014-09-18 at 11.51.24.png"/>
+          <p:cNvPicPr>
+            <a:picLocks noChangeAspect="1"/>
+          </p:cNvPicPr>
+          <p:nvPr/>
+        </p:nvPicPr>
+        <p:blipFill>
+          <a:blip r:embed="rId2">
+            <a:extLst>
+              <a:ext uri="{28A0092B-C50C-407E-A947-70E740481C1C}">
+                <a14:useLocalDpi xmlns:a14="http://schemas.microsoft.com/office/drawing/2010/main" val="0"/>
+              </a:ext>
+            </a:extLst>
+          </a:blip>
+          <a:stretch>
+            <a:fillRect/>
+          </a:stretch>
+        </p:blipFill>
+        <p:spPr>
+          <a:xfrm>
+            <a:off x="0" y="1079500"/>
+            <a:ext cx="9144000" cy="2960358"/>
+          </a:xfrm>
+          <a:prstGeom prst="rect">
+            <a:avLst/>
+          </a:prstGeom>
+        </p:spPr>
+      </p:pic>
+    </p:spTree>
+    <p:extLst>
+      <p:ext uri="{BB962C8B-B14F-4D97-AF65-F5344CB8AC3E}">
+        <p14:creationId xmlns:p14="http://schemas.microsoft.com/office/powerpoint/2010/main" val="4087734815"/>
+      </p:ext>
+    </p:extLst>
+  </p:cSld>
+  <p:clrMapOvr>
+    <a:masterClrMapping/>
+  </p:clrMapOvr>
+</p:sld>
+</file>
+
+<file path=ppt/slides/slide22.xml><?xml version="1.0" encoding="utf-8"?>
+<p:sld xmlns:a="http://schemas.openxmlformats.org/drawingml/2006/main" xmlns:r="http://schemas.openxmlformats.org/officeDocument/2006/relationships" xmlns:p="http://schemas.openxmlformats.org/presentationml/2006/main">
+  <p:cSld>
+    <p:spTree>
+      <p:nvGrpSpPr>
+        <p:cNvPr id="1" name=""/>
+        <p:cNvGrpSpPr/>
+        <p:nvPr/>
+      </p:nvGrpSpPr>
+      <p:grpSpPr>
+        <a:xfrm>
+          <a:off x="0" y="0"/>
+          <a:ext cx="0" cy="0"/>
+          <a:chOff x="0" y="0"/>
+          <a:chExt cx="0" cy="0"/>
+        </a:xfrm>
+      </p:grpSpPr>
+      <p:sp>
+        <p:nvSpPr>
+          <p:cNvPr id="3" name="Title 2"/>
+          <p:cNvSpPr>
+            <a:spLocks noGrp="1"/>
+          </p:cNvSpPr>
+          <p:nvPr>
+            <p:ph type="title"/>
+          </p:nvPr>
+        </p:nvSpPr>
+        <p:spPr/>
+        <p:txBody>
+          <a:bodyPr/>
+          <a:lstStyle/>
+          <a:p>
+            <a:r>
+              <a:rPr lang="en-US" dirty="0" smtClean="0"/>
+              <a:t>Querying .NET</a:t>
+            </a:r>
+            <a:endParaRPr lang="en-US" dirty="0"/>
+          </a:p>
+        </p:txBody>
+      </p:sp>
+      <p:pic>
+        <p:nvPicPr>
+          <p:cNvPr id="2" name="Picture 1" descr="Screen Shot 2014-09-18 at 14.15.40.png"/>
+          <p:cNvPicPr>
+            <a:picLocks noChangeAspect="1"/>
+          </p:cNvPicPr>
+          <p:nvPr/>
+        </p:nvPicPr>
+        <p:blipFill>
+          <a:blip r:embed="rId2">
+            <a:extLst>
+              <a:ext uri="{28A0092B-C50C-407E-A947-70E740481C1C}">
+                <a14:useLocalDpi xmlns:a14="http://schemas.microsoft.com/office/drawing/2010/main" val="0"/>
+              </a:ext>
+            </a:extLst>
+          </a:blip>
+          <a:stretch>
+            <a:fillRect/>
+          </a:stretch>
+        </p:blipFill>
+        <p:spPr>
+          <a:xfrm>
+            <a:off x="939800" y="720291"/>
+            <a:ext cx="7251700" cy="3873500"/>
+          </a:xfrm>
+          <a:prstGeom prst="rect">
+            <a:avLst/>
+          </a:prstGeom>
+        </p:spPr>
+      </p:pic>
+    </p:spTree>
+    <p:extLst>
+      <p:ext uri="{BB962C8B-B14F-4D97-AF65-F5344CB8AC3E}">
+        <p14:creationId xmlns:p14="http://schemas.microsoft.com/office/powerpoint/2010/main" val="1768273509"/>
+      </p:ext>
+    </p:extLst>
+  </p:cSld>
+  <p:clrMapOvr>
+    <a:masterClrMapping/>
+  </p:clrMapOvr>
+</p:sld>
+</file>
+
+<file path=ppt/slides/slide23.xml><?xml version="1.0" encoding="utf-8"?>
 <p:sld xmlns:a="http://schemas.openxmlformats.org/drawingml/2006/main" xmlns:r="http://schemas.openxmlformats.org/officeDocument/2006/relationships" xmlns:p="http://schemas.openxmlformats.org/presentationml/2006/main">
   <p:cSld>
     <p:spTree>
@@ -6302,7 +6596,7 @@
 </p:sld>
 </file>
 
-<file path=ppt/slides/slide16.xml><?xml version="1.0" encoding="utf-8"?>
+<file path=ppt/slides/slide24.xml><?xml version="1.0" encoding="utf-8"?>
 <p:sld xmlns:a="http://schemas.openxmlformats.org/drawingml/2006/main" xmlns:r="http://schemas.openxmlformats.org/officeDocument/2006/relationships" xmlns:p="http://schemas.openxmlformats.org/presentationml/2006/main">
   <p:cSld>
     <p:spTree>
@@ -6362,7 +6656,7 @@
 </p:sld>
 </file>
 
-<file path=ppt/slides/slide17.xml><?xml version="1.0" encoding="utf-8"?>
+<file path=ppt/slides/slide25.xml><?xml version="1.0" encoding="utf-8"?>
 <p:sld xmlns:a="http://schemas.openxmlformats.org/drawingml/2006/main" xmlns:r="http://schemas.openxmlformats.org/officeDocument/2006/relationships" xmlns:p="http://schemas.openxmlformats.org/presentationml/2006/main" show="0">
   <p:cSld>
     <p:spTree>
@@ -6481,7 +6775,7 @@
 </p:sld>
 </file>
 
-<file path=ppt/slides/slide18.xml><?xml version="1.0" encoding="utf-8"?>
+<file path=ppt/slides/slide26.xml><?xml version="1.0" encoding="utf-8"?>
 <p:sld xmlns:a="http://schemas.openxmlformats.org/drawingml/2006/main" xmlns:r="http://schemas.openxmlformats.org/officeDocument/2006/relationships" xmlns:p="http://schemas.openxmlformats.org/presentationml/2006/main" show="0">
   <p:cSld>
     <p:spTree>
@@ -6730,7 +7024,7 @@
 </p:sld>
 </file>
 
-<file path=ppt/slides/slide19.xml><?xml version="1.0" encoding="utf-8"?>
+<file path=ppt/slides/slide27.xml><?xml version="1.0" encoding="utf-8"?>
 <p:sld xmlns:a="http://schemas.openxmlformats.org/drawingml/2006/main" xmlns:r="http://schemas.openxmlformats.org/officeDocument/2006/relationships" xmlns:p="http://schemas.openxmlformats.org/presentationml/2006/main" show="0">
   <p:cSld>
     <p:spTree>
@@ -6798,90 +7092,7 @@
 </p:sld>
 </file>
 
-<file path=ppt/slides/slide2.xml><?xml version="1.0" encoding="utf-8"?>
-<p:sld xmlns:a="http://schemas.openxmlformats.org/drawingml/2006/main" xmlns:r="http://schemas.openxmlformats.org/officeDocument/2006/relationships" xmlns:p="http://schemas.openxmlformats.org/presentationml/2006/main">
-  <p:cSld>
-    <p:spTree>
-      <p:nvGrpSpPr>
-        <p:cNvPr id="1" name=""/>
-        <p:cNvGrpSpPr/>
-        <p:nvPr/>
-      </p:nvGrpSpPr>
-      <p:grpSpPr>
-        <a:xfrm>
-          <a:off x="0" y="0"/>
-          <a:ext cx="0" cy="0"/>
-          <a:chOff x="0" y="0"/>
-          <a:chExt cx="0" cy="0"/>
-        </a:xfrm>
-      </p:grpSpPr>
-      <p:sp>
-        <p:nvSpPr>
-          <p:cNvPr id="2" name="Title 1"/>
-          <p:cNvSpPr>
-            <a:spLocks noGrp="1"/>
-          </p:cNvSpPr>
-          <p:nvPr>
-            <p:ph type="ctrTitle"/>
-          </p:nvPr>
-        </p:nvSpPr>
-        <p:spPr/>
-        <p:txBody>
-          <a:bodyPr/>
-          <a:lstStyle/>
-          <a:p>
-            <a:r>
-              <a:rPr lang="en-US" dirty="0" smtClean="0"/>
-              <a:t>Developer Workshop</a:t>
-            </a:r>
-            <a:endParaRPr lang="en-US" dirty="0"/>
-          </a:p>
-        </p:txBody>
-      </p:sp>
-      <p:sp>
-        <p:nvSpPr>
-          <p:cNvPr id="3" name="Subtitle 2"/>
-          <p:cNvSpPr>
-            <a:spLocks noGrp="1"/>
-          </p:cNvSpPr>
-          <p:nvPr>
-            <p:ph type="subTitle" idx="1"/>
-          </p:nvPr>
-        </p:nvSpPr>
-        <p:spPr/>
-        <p:txBody>
-          <a:bodyPr/>
-          <a:lstStyle/>
-          <a:p>
-            <a:r>
-              <a:rPr lang="en-US" dirty="0" smtClean="0"/>
-              <a:t>SDK 101</a:t>
-            </a:r>
-            <a:endParaRPr lang="en-US" dirty="0"/>
-          </a:p>
-        </p:txBody>
-      </p:sp>
-    </p:spTree>
-    <p:extLst>
-      <p:ext uri="{BB962C8B-B14F-4D97-AF65-F5344CB8AC3E}">
-        <p14:creationId xmlns:p14="http://schemas.microsoft.com/office/powerpoint/2010/main" val="1399823271"/>
-      </p:ext>
-    </p:extLst>
-  </p:cSld>
-  <p:clrMapOvr>
-    <a:masterClrMapping/>
-  </p:clrMapOvr>
-  <p:timing>
-    <p:tnLst>
-      <p:par>
-        <p:cTn xmlns:p14="http://schemas.microsoft.com/office/powerpoint/2010/main" id="1" dur="indefinite" restart="never" nodeType="tmRoot"/>
-      </p:par>
-    </p:tnLst>
-  </p:timing>
-</p:sld>
-</file>
-
-<file path=ppt/slides/slide20.xml><?xml version="1.0" encoding="utf-8"?>
+<file path=ppt/slides/slide28.xml><?xml version="1.0" encoding="utf-8"?>
 <p:sld xmlns:a="http://schemas.openxmlformats.org/drawingml/2006/main" xmlns:r="http://schemas.openxmlformats.org/officeDocument/2006/relationships" xmlns:p="http://schemas.openxmlformats.org/presentationml/2006/main" show="0">
   <p:cSld>
     <p:spTree>
@@ -6972,7 +7183,7 @@
 </p:sld>
 </file>
 
-<file path=ppt/slides/slide21.xml><?xml version="1.0" encoding="utf-8"?>
+<file path=ppt/slides/slide29.xml><?xml version="1.0" encoding="utf-8"?>
 <p:sld xmlns:a="http://schemas.openxmlformats.org/drawingml/2006/main" xmlns:r="http://schemas.openxmlformats.org/officeDocument/2006/relationships" xmlns:p="http://schemas.openxmlformats.org/presentationml/2006/main" show="0">
   <p:cSld>
     <p:spTree>
@@ -8594,7 +8805,86 @@
 </p:sld>
 </file>
 
-<file path=ppt/slides/slide22.xml><?xml version="1.0" encoding="utf-8"?>
+<file path=ppt/slides/slide3.xml><?xml version="1.0" encoding="utf-8"?>
+<p:sld xmlns:a="http://schemas.openxmlformats.org/drawingml/2006/main" xmlns:r="http://schemas.openxmlformats.org/officeDocument/2006/relationships" xmlns:p="http://schemas.openxmlformats.org/presentationml/2006/main">
+  <p:cSld>
+    <p:spTree>
+      <p:nvGrpSpPr>
+        <p:cNvPr id="1" name=""/>
+        <p:cNvGrpSpPr/>
+        <p:nvPr/>
+      </p:nvGrpSpPr>
+      <p:grpSpPr>
+        <a:xfrm>
+          <a:off x="0" y="0"/>
+          <a:ext cx="0" cy="0"/>
+          <a:chOff x="0" y="0"/>
+          <a:chExt cx="0" cy="0"/>
+        </a:xfrm>
+      </p:grpSpPr>
+      <p:sp>
+        <p:nvSpPr>
+          <p:cNvPr id="2" name="Title 1"/>
+          <p:cNvSpPr>
+            <a:spLocks noGrp="1"/>
+          </p:cNvSpPr>
+          <p:nvPr>
+            <p:ph type="ctrTitle"/>
+          </p:nvPr>
+        </p:nvSpPr>
+        <p:spPr/>
+        <p:txBody>
+          <a:bodyPr/>
+          <a:lstStyle/>
+          <a:p>
+            <a:r>
+              <a:rPr lang="en-US" dirty="0" smtClean="0"/>
+              <a:t>Overview</a:t>
+            </a:r>
+            <a:endParaRPr lang="en-US" dirty="0"/>
+          </a:p>
+        </p:txBody>
+      </p:sp>
+      <p:sp>
+        <p:nvSpPr>
+          <p:cNvPr id="3" name="Subtitle 2"/>
+          <p:cNvSpPr>
+            <a:spLocks noGrp="1"/>
+          </p:cNvSpPr>
+          <p:nvPr>
+            <p:ph type="subTitle" idx="1"/>
+          </p:nvPr>
+        </p:nvSpPr>
+        <p:spPr/>
+        <p:txBody>
+          <a:bodyPr/>
+          <a:lstStyle/>
+          <a:p>
+            <a:endParaRPr lang="en-US" dirty="0"/>
+          </a:p>
+        </p:txBody>
+      </p:sp>
+    </p:spTree>
+    <p:extLst>
+      <p:ext uri="{BB962C8B-B14F-4D97-AF65-F5344CB8AC3E}">
+        <p14:creationId xmlns:p14="http://schemas.microsoft.com/office/powerpoint/2010/main" val="2320546343"/>
+      </p:ext>
+    </p:extLst>
+  </p:cSld>
+  <p:clrMapOvr>
+    <a:masterClrMapping/>
+  </p:clrMapOvr>
+  <p:timing>
+    <p:tnLst>
+      <p:par>
+        <p:cTn xmlns:p14="http://schemas.microsoft.com/office/powerpoint/2010/main" id="1" dur="indefinite" restart="never" nodeType="tmRoot"/>
+      </p:par>
+    </p:tnLst>
+  </p:timing>
+</p:sld>
+</file>
+
+<file path=ppt/slides/slide30.xml><?xml version="1.0" encoding="utf-8"?>
 <p:sld xmlns:a="http://schemas.openxmlformats.org/drawingml/2006/main" xmlns:r="http://schemas.openxmlformats.org/officeDocument/2006/relationships" xmlns:p="http://schemas.openxmlformats.org/presentationml/2006/main" show="0">
   <p:cSld>
     <p:spTree>
@@ -9346,7 +9636,7 @@
 </p:sld>
 </file>
 
-<file path=ppt/slides/slide23.xml><?xml version="1.0" encoding="utf-8"?>
+<file path=ppt/slides/slide31.xml><?xml version="1.0" encoding="utf-8"?>
 <p:sld xmlns:a="http://schemas.openxmlformats.org/drawingml/2006/main" xmlns:r="http://schemas.openxmlformats.org/officeDocument/2006/relationships" xmlns:p="http://schemas.openxmlformats.org/presentationml/2006/main" show="0">
   <p:cSld>
     <p:spTree>
@@ -10098,7 +10388,7 @@
 </p:sld>
 </file>
 
-<file path=ppt/slides/slide24.xml><?xml version="1.0" encoding="utf-8"?>
+<file path=ppt/slides/slide32.xml><?xml version="1.0" encoding="utf-8"?>
 <p:sld xmlns:a="http://schemas.openxmlformats.org/drawingml/2006/main" xmlns:r="http://schemas.openxmlformats.org/officeDocument/2006/relationships" xmlns:p="http://schemas.openxmlformats.org/presentationml/2006/main" show="0">
   <p:cSld>
     <p:spTree>
@@ -10264,7 +10554,7 @@
 </p:sld>
 </file>
 
-<file path=ppt/slides/slide25.xml><?xml version="1.0" encoding="utf-8"?>
+<file path=ppt/slides/slide33.xml><?xml version="1.0" encoding="utf-8"?>
 <p:sld xmlns:a="http://schemas.openxmlformats.org/drawingml/2006/main" xmlns:r="http://schemas.openxmlformats.org/officeDocument/2006/relationships" xmlns:p="http://schemas.openxmlformats.org/presentationml/2006/main" show="0">
   <p:cSld>
     <p:spTree>
@@ -10430,7 +10720,7 @@
 </p:sld>
 </file>
 
-<file path=ppt/slides/slide26.xml><?xml version="1.0" encoding="utf-8"?>
+<file path=ppt/slides/slide34.xml><?xml version="1.0" encoding="utf-8"?>
 <p:sld xmlns:a="http://schemas.openxmlformats.org/drawingml/2006/main" xmlns:r="http://schemas.openxmlformats.org/officeDocument/2006/relationships" xmlns:p="http://schemas.openxmlformats.org/presentationml/2006/main" show="0">
   <p:cSld>
     <p:spTree>
@@ -10596,7 +10886,7 @@
 </p:sld>
 </file>
 
-<file path=ppt/slides/slide27.xml><?xml version="1.0" encoding="utf-8"?>
+<file path=ppt/slides/slide35.xml><?xml version="1.0" encoding="utf-8"?>
 <p:sld xmlns:a="http://schemas.openxmlformats.org/drawingml/2006/main" xmlns:r="http://schemas.openxmlformats.org/officeDocument/2006/relationships" xmlns:p="http://schemas.openxmlformats.org/presentationml/2006/main" show="0">
   <p:cSld>
     <p:spTree>
@@ -11290,7 +11580,7 @@
 </p:sld>
 </file>
 
-<file path=ppt/slides/slide28.xml><?xml version="1.0" encoding="utf-8"?>
+<file path=ppt/slides/slide36.xml><?xml version="1.0" encoding="utf-8"?>
 <p:sld xmlns:a="http://schemas.openxmlformats.org/drawingml/2006/main" xmlns:r="http://schemas.openxmlformats.org/officeDocument/2006/relationships" xmlns:p="http://schemas.openxmlformats.org/presentationml/2006/main" show="0">
   <p:cSld>
     <p:spTree>
@@ -11335,193 +11625,7 @@
 </p:sld>
 </file>
 
-<file path=ppt/slides/slide3.xml><?xml version="1.0" encoding="utf-8"?>
-<p:sld xmlns:a="http://schemas.openxmlformats.org/drawingml/2006/main" xmlns:r="http://schemas.openxmlformats.org/officeDocument/2006/relationships" xmlns:p="http://schemas.openxmlformats.org/presentationml/2006/main">
-  <p:cSld>
-    <p:spTree>
-      <p:nvGrpSpPr>
-        <p:cNvPr id="1" name=""/>
-        <p:cNvGrpSpPr/>
-        <p:nvPr/>
-      </p:nvGrpSpPr>
-      <p:grpSpPr>
-        <a:xfrm>
-          <a:off x="0" y="0"/>
-          <a:ext cx="0" cy="0"/>
-          <a:chOff x="0" y="0"/>
-          <a:chExt cx="0" cy="0"/>
-        </a:xfrm>
-      </p:grpSpPr>
-      <p:sp>
-        <p:nvSpPr>
-          <p:cNvPr id="2" name="Title 1"/>
-          <p:cNvSpPr>
-            <a:spLocks noGrp="1"/>
-          </p:cNvSpPr>
-          <p:nvPr>
-            <p:ph type="title"/>
-          </p:nvPr>
-        </p:nvSpPr>
-        <p:spPr/>
-        <p:txBody>
-          <a:bodyPr/>
-          <a:lstStyle/>
-          <a:p>
-            <a:r>
-              <a:rPr lang="en-US" dirty="0" smtClean="0"/>
-              <a:t>Agenda</a:t>
-            </a:r>
-            <a:endParaRPr lang="en-US" dirty="0"/>
-          </a:p>
-        </p:txBody>
-      </p:sp>
-      <p:sp>
-        <p:nvSpPr>
-          <p:cNvPr id="3" name="Content Placeholder 2"/>
-          <p:cNvSpPr>
-            <a:spLocks noGrp="1"/>
-          </p:cNvSpPr>
-          <p:nvPr>
-            <p:ph idx="1"/>
-          </p:nvPr>
-        </p:nvSpPr>
-        <p:spPr/>
-        <p:txBody>
-          <a:bodyPr/>
-          <a:lstStyle/>
-          <a:p>
-            <a:r>
-              <a:rPr lang="en-US" dirty="0" smtClean="0"/>
-              <a:t>SDK Overview</a:t>
-            </a:r>
-          </a:p>
-          <a:p>
-            <a:r>
-              <a:rPr lang="en-US" dirty="0" smtClean="0"/>
-              <a:t>High-Level Architecture</a:t>
-            </a:r>
-          </a:p>
-          <a:p>
-            <a:endParaRPr lang="en-US" dirty="0" smtClean="0"/>
-          </a:p>
-          <a:p>
-            <a:r>
-              <a:rPr lang="en-US" dirty="0" smtClean="0"/>
-              <a:t>APIs</a:t>
-            </a:r>
-          </a:p>
-          <a:p>
-            <a:pPr lvl="1"/>
-            <a:r>
-              <a:rPr lang="en-US" dirty="0" smtClean="0"/>
-              <a:t>Cluster, Bucket, Documents,…</a:t>
-            </a:r>
-          </a:p>
-          <a:p>
-            <a:endParaRPr lang="en-US" dirty="0"/>
-          </a:p>
-        </p:txBody>
-      </p:sp>
-    </p:spTree>
-    <p:extLst>
-      <p:ext uri="{BB962C8B-B14F-4D97-AF65-F5344CB8AC3E}">
-        <p14:creationId xmlns:p14="http://schemas.microsoft.com/office/powerpoint/2010/main" val="701019740"/>
-      </p:ext>
-    </p:extLst>
-  </p:cSld>
-  <p:clrMapOvr>
-    <a:masterClrMapping/>
-  </p:clrMapOvr>
-  <p:timing>
-    <p:tnLst>
-      <p:par>
-        <p:cTn xmlns:p14="http://schemas.microsoft.com/office/powerpoint/2010/main" id="1" dur="indefinite" restart="never" nodeType="tmRoot"/>
-      </p:par>
-    </p:tnLst>
-  </p:timing>
-</p:sld>
-</file>
-
 <file path=ppt/slides/slide4.xml><?xml version="1.0" encoding="utf-8"?>
-<p:sld xmlns:a="http://schemas.openxmlformats.org/drawingml/2006/main" xmlns:r="http://schemas.openxmlformats.org/officeDocument/2006/relationships" xmlns:p="http://schemas.openxmlformats.org/presentationml/2006/main">
-  <p:cSld>
-    <p:spTree>
-      <p:nvGrpSpPr>
-        <p:cNvPr id="1" name=""/>
-        <p:cNvGrpSpPr/>
-        <p:nvPr/>
-      </p:nvGrpSpPr>
-      <p:grpSpPr>
-        <a:xfrm>
-          <a:off x="0" y="0"/>
-          <a:ext cx="0" cy="0"/>
-          <a:chOff x="0" y="0"/>
-          <a:chExt cx="0" cy="0"/>
-        </a:xfrm>
-      </p:grpSpPr>
-      <p:sp>
-        <p:nvSpPr>
-          <p:cNvPr id="2" name="Title 1"/>
-          <p:cNvSpPr>
-            <a:spLocks noGrp="1"/>
-          </p:cNvSpPr>
-          <p:nvPr>
-            <p:ph type="ctrTitle"/>
-          </p:nvPr>
-        </p:nvSpPr>
-        <p:spPr/>
-        <p:txBody>
-          <a:bodyPr/>
-          <a:lstStyle/>
-          <a:p>
-            <a:r>
-              <a:rPr lang="en-US" dirty="0" smtClean="0"/>
-              <a:t>Overview</a:t>
-            </a:r>
-            <a:endParaRPr lang="en-US" dirty="0"/>
-          </a:p>
-        </p:txBody>
-      </p:sp>
-      <p:sp>
-        <p:nvSpPr>
-          <p:cNvPr id="3" name="Subtitle 2"/>
-          <p:cNvSpPr>
-            <a:spLocks noGrp="1"/>
-          </p:cNvSpPr>
-          <p:nvPr>
-            <p:ph type="subTitle" idx="1"/>
-          </p:nvPr>
-        </p:nvSpPr>
-        <p:spPr/>
-        <p:txBody>
-          <a:bodyPr/>
-          <a:lstStyle/>
-          <a:p>
-            <a:endParaRPr lang="en-US" dirty="0"/>
-          </a:p>
-        </p:txBody>
-      </p:sp>
-    </p:spTree>
-    <p:extLst>
-      <p:ext uri="{BB962C8B-B14F-4D97-AF65-F5344CB8AC3E}">
-        <p14:creationId xmlns:p14="http://schemas.microsoft.com/office/powerpoint/2010/main" val="2320546343"/>
-      </p:ext>
-    </p:extLst>
-  </p:cSld>
-  <p:clrMapOvr>
-    <a:masterClrMapping/>
-  </p:clrMapOvr>
-  <p:timing>
-    <p:tnLst>
-      <p:par>
-        <p:cTn xmlns:p14="http://schemas.microsoft.com/office/powerpoint/2010/main" id="1" dur="indefinite" restart="never" nodeType="tmRoot"/>
-      </p:par>
-    </p:tnLst>
-  </p:timing>
-</p:sld>
-</file>
-
-<file path=ppt/slides/slide5.xml><?xml version="1.0" encoding="utf-8"?>
 <p:sld xmlns:a="http://schemas.openxmlformats.org/drawingml/2006/main" xmlns:r="http://schemas.openxmlformats.org/officeDocument/2006/relationships" xmlns:p="http://schemas.openxmlformats.org/presentationml/2006/main">
   <p:cSld>
     <p:spTree>
@@ -11826,7 +11930,7 @@
 </p:sld>
 </file>
 
-<file path=ppt/slides/slide6.xml><?xml version="1.0" encoding="utf-8"?>
+<file path=ppt/slides/slide5.xml><?xml version="1.0" encoding="utf-8"?>
 <p:sld xmlns:a="http://schemas.openxmlformats.org/drawingml/2006/main" xmlns:r="http://schemas.openxmlformats.org/officeDocument/2006/relationships" xmlns:p="http://schemas.openxmlformats.org/presentationml/2006/main">
   <p:cSld>
     <p:spTree>
@@ -11860,11 +11964,7 @@
           <a:p>
             <a:r>
               <a:rPr lang="en-US" dirty="0" smtClean="0"/>
-              <a:t>High-Level </a:t>
-            </a:r>
-            <a:r>
-              <a:rPr lang="en-US" dirty="0" smtClean="0"/>
-              <a:t>Architecture</a:t>
+              <a:t>High-Level Architecture</a:t>
             </a:r>
             <a:endParaRPr lang="en-US" dirty="0"/>
           </a:p>
@@ -11909,7 +12009,7 @@
 </p:sld>
 </file>
 
-<file path=ppt/slides/slide7.xml><?xml version="1.0" encoding="utf-8"?>
+<file path=ppt/slides/slide6.xml><?xml version="1.0" encoding="utf-8"?>
 <p:sld xmlns:a="http://schemas.openxmlformats.org/drawingml/2006/main" xmlns:r="http://schemas.openxmlformats.org/officeDocument/2006/relationships" xmlns:p="http://schemas.openxmlformats.org/presentationml/2006/main">
   <p:cSld>
     <p:spTree>
@@ -12262,7 +12362,7 @@
 </p:sld>
 </file>
 
-<file path=ppt/slides/slide8.xml><?xml version="1.0" encoding="utf-8"?>
+<file path=ppt/slides/slide7.xml><?xml version="1.0" encoding="utf-8"?>
 <p:sld xmlns:a="http://schemas.openxmlformats.org/drawingml/2006/main" xmlns:r="http://schemas.openxmlformats.org/officeDocument/2006/relationships" xmlns:p="http://schemas.openxmlformats.org/presentationml/2006/main">
   <p:cSld>
     <p:spTree>
@@ -12345,7 +12445,7 @@
 </p:sld>
 </file>
 
-<file path=ppt/slides/slide9.xml><?xml version="1.0" encoding="utf-8"?>
+<file path=ppt/slides/slide8.xml><?xml version="1.0" encoding="utf-8"?>
 <p:sld xmlns:a="http://schemas.openxmlformats.org/drawingml/2006/main" xmlns:r="http://schemas.openxmlformats.org/officeDocument/2006/relationships" xmlns:p="http://schemas.openxmlformats.org/presentationml/2006/main">
   <p:cSld>
     <p:spTree>
@@ -12476,8 +12576,45 @@
             </a:pPr>
             <a:r>
               <a:rPr lang="de-DE" dirty="0" smtClean="0"/>
-              <a:t>	Cluster</a:t>
-            </a:r>
+              <a:t>	</a:t>
+            </a:r>
+            <a:r>
+              <a:rPr lang="de-DE" dirty="0" smtClean="0"/>
+              <a:t>Cluster (</a:t>
+            </a:r>
+            <a:r>
+              <a:rPr lang="de-DE" dirty="0" err="1" smtClean="0"/>
+              <a:t>incl</a:t>
+            </a:r>
+            <a:r>
+              <a:rPr lang="de-DE" dirty="0" smtClean="0"/>
+              <a:t> </a:t>
+            </a:r>
+            <a:r>
+              <a:rPr lang="de-DE" dirty="0" err="1" smtClean="0"/>
+              <a:t>connecting</a:t>
+            </a:r>
+            <a:r>
+              <a:rPr lang="de-DE" dirty="0" smtClean="0"/>
+              <a:t> </a:t>
+            </a:r>
+            <a:r>
+              <a:rPr lang="de-DE" dirty="0" err="1" smtClean="0"/>
+              <a:t>and</a:t>
+            </a:r>
+            <a:r>
+              <a:rPr lang="de-DE" dirty="0" smtClean="0"/>
+              <a:t> </a:t>
+            </a:r>
+            <a:r>
+              <a:rPr lang="de-DE" dirty="0" err="1" smtClean="0"/>
+              <a:t>disconnecting</a:t>
+            </a:r>
+            <a:r>
+              <a:rPr lang="de-DE" dirty="0" smtClean="0"/>
+              <a:t>)</a:t>
+            </a:r>
+            <a:endParaRPr lang="de-DE" dirty="0" smtClean="0"/>
           </a:p>
           <a:p>
             <a:pPr marL="0" indent="0">
@@ -12493,11 +12630,15 @@
             </a:r>
             <a:r>
               <a:rPr lang="de-DE" dirty="0" smtClean="0"/>
-              <a:t> (</a:t>
+              <a:t> </a:t>
+            </a:r>
+            <a:r>
+              <a:rPr lang="de-DE" dirty="0" smtClean="0"/>
+              <a:t>(</a:t>
             </a:r>
             <a:r>
               <a:rPr lang="de-DE" dirty="0" err="1" smtClean="0"/>
-              <a:t>incl</a:t>
+              <a:t>add</a:t>
             </a:r>
             <a:r>
               <a:rPr lang="de-DE" dirty="0" smtClean="0"/>
@@ -12505,7 +12646,7 @@
             </a:r>
             <a:r>
               <a:rPr lang="de-DE" dirty="0" err="1" smtClean="0"/>
-              <a:t>overview</a:t>
+              <a:t>explanation</a:t>
             </a:r>
             <a:r>
               <a:rPr lang="de-DE" dirty="0" smtClean="0"/>
@@ -12517,6 +12658,22 @@
             </a:r>
             <a:r>
               <a:rPr lang="de-DE" dirty="0" smtClean="0"/>
+              <a:t> all </a:t>
+            </a:r>
+            <a:r>
+              <a:rPr lang="de-DE" dirty="0" err="1" smtClean="0"/>
+              <a:t>other</a:t>
+            </a:r>
+            <a:r>
+              <a:rPr lang="de-DE" dirty="0" smtClean="0"/>
+              <a:t> </a:t>
+            </a:r>
+            <a:r>
+              <a:rPr lang="de-DE" dirty="0" err="1" smtClean="0"/>
+              <a:t>possible</a:t>
+            </a:r>
+            <a:r>
+              <a:rPr lang="de-DE" dirty="0" smtClean="0"/>
               <a:t> </a:t>
             </a:r>
             <a:r>
@@ -12525,8 +12682,78 @@
             </a:r>
             <a:r>
               <a:rPr lang="de-DE" dirty="0" smtClean="0"/>
+              <a:t>, </a:t>
+            </a:r>
+            <a:r>
+              <a:rPr lang="de-DE" dirty="0" err="1" smtClean="0"/>
+              <a:t>including</a:t>
+            </a:r>
+            <a:r>
+              <a:rPr lang="de-DE" dirty="0" smtClean="0"/>
+              <a:t> </a:t>
+            </a:r>
+            <a:r>
+              <a:rPr lang="de-DE" dirty="0" err="1" smtClean="0"/>
+              <a:t>persistence</a:t>
+            </a:r>
+            <a:r>
+              <a:rPr lang="de-DE" dirty="0" smtClean="0"/>
+              <a:t> </a:t>
+            </a:r>
+            <a:r>
+              <a:rPr lang="de-DE" dirty="0" err="1" smtClean="0"/>
+              <a:t>constraints</a:t>
+            </a:r>
+            <a:r>
+              <a:rPr lang="de-DE" dirty="0" smtClean="0"/>
               <a:t>)</a:t>
             </a:r>
+          </a:p>
+          <a:p>
+            <a:pPr marL="0" indent="0">
+              <a:buNone/>
+            </a:pPr>
+            <a:r>
+              <a:rPr lang="de-DE" dirty="0"/>
+              <a:t> </a:t>
+            </a:r>
+            <a:r>
+              <a:rPr lang="de-DE" dirty="0" smtClean="0"/>
+              <a:t>      double check all </a:t>
+            </a:r>
+            <a:r>
+              <a:rPr lang="de-DE" dirty="0" err="1" smtClean="0"/>
+              <a:t>examples</a:t>
+            </a:r>
+            <a:r>
+              <a:rPr lang="de-DE" dirty="0" smtClean="0"/>
+              <a:t> (</a:t>
+            </a:r>
+            <a:r>
+              <a:rPr lang="de-DE" dirty="0" err="1" smtClean="0"/>
+              <a:t>may</a:t>
+            </a:r>
+            <a:r>
+              <a:rPr lang="de-DE" dirty="0" smtClean="0"/>
+              <a:t> </a:t>
+            </a:r>
+            <a:r>
+              <a:rPr lang="de-DE" dirty="0" err="1" smtClean="0"/>
+              <a:t>be</a:t>
+            </a:r>
+            <a:r>
+              <a:rPr lang="de-DE" dirty="0" smtClean="0"/>
+              <a:t> </a:t>
+            </a:r>
+            <a:r>
+              <a:rPr lang="de-DE" dirty="0" err="1" smtClean="0"/>
+              <a:t>outdated</a:t>
+            </a:r>
+            <a:r>
+              <a:rPr lang="de-DE" dirty="0" smtClean="0"/>
+              <a:t>!)</a:t>
+            </a:r>
+            <a:endParaRPr lang="de-DE" dirty="0" smtClean="0"/>
           </a:p>
           <a:p>
             <a:pPr marL="0" indent="0">
@@ -12641,6 +12868,904 @@
   <p:clrMapOvr>
     <a:masterClrMapping/>
   </p:clrMapOvr>
+</p:sld>
+</file>
+
+<file path=ppt/slides/slide9.xml><?xml version="1.0" encoding="utf-8"?>
+<p:sld xmlns:a="http://schemas.openxmlformats.org/drawingml/2006/main" xmlns:r="http://schemas.openxmlformats.org/officeDocument/2006/relationships" xmlns:p="http://schemas.openxmlformats.org/presentationml/2006/main">
+  <p:cSld>
+    <p:spTree>
+      <p:nvGrpSpPr>
+        <p:cNvPr id="1" name=""/>
+        <p:cNvGrpSpPr/>
+        <p:nvPr/>
+      </p:nvGrpSpPr>
+      <p:grpSpPr>
+        <a:xfrm>
+          <a:off x="0" y="0"/>
+          <a:ext cx="0" cy="0"/>
+          <a:chOff x="0" y="0"/>
+          <a:chExt cx="0" cy="0"/>
+        </a:xfrm>
+      </p:grpSpPr>
+      <p:sp>
+        <p:nvSpPr>
+          <p:cNvPr id="2" name="Content Placeholder 1"/>
+          <p:cNvSpPr>
+            <a:spLocks noGrp="1"/>
+          </p:cNvSpPr>
+          <p:nvPr>
+            <p:ph idx="1"/>
+          </p:nvPr>
+        </p:nvSpPr>
+        <p:spPr>
+          <a:xfrm>
+            <a:off x="466344" y="685800"/>
+            <a:ext cx="7998595" cy="2128520"/>
+          </a:xfrm>
+        </p:spPr>
+        <p:txBody>
+          <a:bodyPr/>
+          <a:lstStyle/>
+          <a:p>
+            <a:pPr marL="285750" indent="-285750">
+              <a:buFont typeface="Wingdings" charset="2"/>
+              <a:buChar char="§"/>
+            </a:pPr>
+            <a:r>
+              <a:rPr lang="en-US" dirty="0" smtClean="0"/>
+              <a:t>Documents are integral to the SDKs</a:t>
+            </a:r>
+          </a:p>
+          <a:p>
+            <a:pPr marL="285750" indent="-285750">
+              <a:buFont typeface="Wingdings" charset="2"/>
+              <a:buChar char="§"/>
+            </a:pPr>
+            <a:r>
+              <a:rPr lang="en-US" dirty="0" smtClean="0"/>
+              <a:t>There are many implementations, depending on the content type.</a:t>
+            </a:r>
+          </a:p>
+          <a:p>
+            <a:pPr marL="285750" indent="-285750">
+              <a:buFont typeface="Wingdings" charset="2"/>
+              <a:buChar char="§"/>
+            </a:pPr>
+            <a:endParaRPr lang="en-US" dirty="0"/>
+          </a:p>
+          <a:p>
+            <a:pPr marL="285750" indent="-285750">
+              <a:buFont typeface="Wingdings" charset="2"/>
+              <a:buChar char="§"/>
+            </a:pPr>
+            <a:r>
+              <a:rPr lang="en-US" dirty="0" smtClean="0"/>
+              <a:t>A Document contains:</a:t>
+            </a:r>
+          </a:p>
+          <a:p>
+            <a:pPr marL="285750" indent="-285750">
+              <a:buFont typeface="Wingdings" charset="2"/>
+              <a:buChar char="§"/>
+            </a:pPr>
+            <a:endParaRPr lang="en-US" dirty="0"/>
+          </a:p>
+        </p:txBody>
+      </p:sp>
+      <p:sp>
+        <p:nvSpPr>
+          <p:cNvPr id="3" name="Title 2"/>
+          <p:cNvSpPr>
+            <a:spLocks noGrp="1"/>
+          </p:cNvSpPr>
+          <p:nvPr>
+            <p:ph type="title"/>
+          </p:nvPr>
+        </p:nvSpPr>
+        <p:spPr/>
+        <p:txBody>
+          <a:bodyPr/>
+          <a:lstStyle/>
+          <a:p>
+            <a:r>
+              <a:rPr lang="en-US" dirty="0" smtClean="0"/>
+              <a:t>The Document</a:t>
+            </a:r>
+            <a:endParaRPr lang="en-US" dirty="0"/>
+          </a:p>
+        </p:txBody>
+      </p:sp>
+      <p:sp>
+        <p:nvSpPr>
+          <p:cNvPr id="6" name="TextBox 5"/>
+          <p:cNvSpPr txBox="1"/>
+          <p:nvPr/>
+        </p:nvSpPr>
+        <p:spPr>
+          <a:xfrm>
+            <a:off x="1241632" y="-1364650"/>
+            <a:ext cx="184666" cy="369332"/>
+          </a:xfrm>
+          <a:prstGeom prst="rect">
+            <a:avLst/>
+          </a:prstGeom>
+          <a:noFill/>
+        </p:spPr>
+        <p:txBody>
+          <a:bodyPr wrap="none" rtlCol="0">
+            <a:spAutoFit/>
+          </a:bodyPr>
+          <a:lstStyle/>
+          <a:p>
+            <a:endParaRPr lang="en-US" dirty="0" err="1">
+              <a:solidFill>
+                <a:srgbClr val="333333"/>
+              </a:solidFill>
+              <a:latin typeface="Arial"/>
+              <a:cs typeface="Arial"/>
+            </a:endParaRPr>
+          </a:p>
+        </p:txBody>
+      </p:sp>
+      <p:sp>
+        <p:nvSpPr>
+          <p:cNvPr id="7" name="Rectangle 6"/>
+          <p:cNvSpPr/>
+          <p:nvPr/>
+        </p:nvSpPr>
+        <p:spPr>
+          <a:xfrm>
+            <a:off x="2928734" y="-1895348"/>
+            <a:ext cx="2521175" cy="1222500"/>
+          </a:xfrm>
+          <a:prstGeom prst="rect">
+            <a:avLst/>
+          </a:prstGeom>
+          <a:solidFill>
+            <a:schemeClr val="accent1"/>
+          </a:solidFill>
+          <a:ln>
+            <a:noFill/>
+          </a:ln>
+          <a:effectLst/>
+        </p:spPr>
+        <p:style>
+          <a:lnRef idx="1">
+            <a:schemeClr val="accent1"/>
+          </a:lnRef>
+          <a:fillRef idx="3">
+            <a:schemeClr val="accent1"/>
+          </a:fillRef>
+          <a:effectRef idx="2">
+            <a:schemeClr val="accent1"/>
+          </a:effectRef>
+          <a:fontRef idx="minor">
+            <a:schemeClr val="lt1"/>
+          </a:fontRef>
+        </p:style>
+        <p:txBody>
+          <a:bodyPr rtlCol="0" anchor="ctr"/>
+          <a:lstStyle/>
+          <a:p>
+            <a:pPr algn="ctr"/>
+            <a:r>
+              <a:rPr lang="en-US" dirty="0" smtClean="0">
+                <a:solidFill>
+                  <a:srgbClr val="333333"/>
+                </a:solidFill>
+                <a:latin typeface="Arial"/>
+                <a:cs typeface="Arial"/>
+              </a:rPr>
+              <a:t>j</a:t>
+            </a:r>
+            <a:endParaRPr lang="en-US" dirty="0">
+              <a:solidFill>
+                <a:srgbClr val="333333"/>
+              </a:solidFill>
+              <a:latin typeface="Arial"/>
+              <a:cs typeface="Arial"/>
+            </a:endParaRPr>
+          </a:p>
+        </p:txBody>
+      </p:sp>
+      <p:graphicFrame>
+        <p:nvGraphicFramePr>
+          <p:cNvPr id="9" name="Table 4"/>
+          <p:cNvGraphicFramePr>
+            <a:graphicFrameLocks noGrp="1"/>
+          </p:cNvGraphicFramePr>
+          <p:nvPr>
+            <p:extLst>
+              <p:ext uri="{D42A27DB-BD31-4B8C-83A1-F6EECF244321}">
+                <p14:modId xmlns:p14="http://schemas.microsoft.com/office/powerpoint/2010/main" val="873057609"/>
+              </p:ext>
+            </p:extLst>
+          </p:nvPr>
+        </p:nvGraphicFramePr>
+        <p:xfrm>
+          <a:off x="1680836" y="2902382"/>
+          <a:ext cx="6233804" cy="1523999"/>
+        </p:xfrm>
+        <a:graphic>
+          <a:graphicData uri="http://schemas.openxmlformats.org/drawingml/2006/table">
+            <a:tbl>
+              <a:tblPr>
+                <a:tableStyleId>{5C22544A-7EE6-4342-B048-85BDC9FD1C3A}</a:tableStyleId>
+              </a:tblPr>
+              <a:tblGrid>
+                <a:gridCol w="2271404"/>
+                <a:gridCol w="3962400"/>
+              </a:tblGrid>
+              <a:tr h="205456">
+                <a:tc>
+                  <a:txBody>
+                    <a:bodyPr/>
+                    <a:lstStyle/>
+                    <a:p>
+                      <a:pPr algn="ctr"/>
+                      <a:r>
+                        <a:rPr lang="en-US" sz="1400" b="1" dirty="0" smtClean="0">
+                          <a:solidFill>
+                            <a:schemeClr val="bg1"/>
+                          </a:solidFill>
+                        </a:rPr>
+                        <a:t>Property</a:t>
+                      </a:r>
+                      <a:endParaRPr lang="en-US" sz="1400" b="1" dirty="0">
+                        <a:solidFill>
+                          <a:schemeClr val="bg1"/>
+                        </a:solidFill>
+                      </a:endParaRPr>
+                    </a:p>
+                  </a:txBody>
+                  <a:tcPr anchor="ctr">
+                    <a:lnL w="9525" cap="flat" cmpd="sng" algn="ctr">
+                      <a:solidFill>
+                        <a:srgbClr val="E40121"/>
+                      </a:solidFill>
+                      <a:prstDash val="solid"/>
+                      <a:round/>
+                      <a:headEnd type="none" w="med" len="med"/>
+                      <a:tailEnd type="none" w="med" len="med"/>
+                    </a:lnL>
+                    <a:lnR w="12700" cmpd="sng">
+                      <a:noFill/>
+                    </a:lnR>
+                    <a:lnT w="9525" cap="flat" cmpd="sng" algn="ctr">
+                      <a:solidFill>
+                        <a:srgbClr val="E40121"/>
+                      </a:solidFill>
+                      <a:prstDash val="solid"/>
+                      <a:round/>
+                      <a:headEnd type="none" w="med" len="med"/>
+                      <a:tailEnd type="none" w="med" len="med"/>
+                    </a:lnT>
+                    <a:lnB w="9525" cap="flat" cmpd="sng" algn="ctr">
+                      <a:solidFill>
+                        <a:srgbClr val="E40121"/>
+                      </a:solidFill>
+                      <a:prstDash val="solid"/>
+                      <a:round/>
+                      <a:headEnd type="none" w="med" len="med"/>
+                      <a:tailEnd type="none" w="med" len="med"/>
+                    </a:lnB>
+                    <a:solidFill>
+                      <a:srgbClr val="E40121"/>
+                    </a:solidFill>
+                  </a:tcPr>
+                </a:tc>
+                <a:tc>
+                  <a:txBody>
+                    <a:bodyPr/>
+                    <a:lstStyle/>
+                    <a:p>
+                      <a:pPr algn="ctr"/>
+                      <a:r>
+                        <a:rPr lang="en-US" sz="1400" b="1" dirty="0" smtClean="0">
+                          <a:solidFill>
+                            <a:schemeClr val="bg1"/>
+                          </a:solidFill>
+                        </a:rPr>
+                        <a:t>Desc</a:t>
+                      </a:r>
+                      <a:r>
+                        <a:rPr lang="en-US" sz="1400" b="1" baseline="0" dirty="0" smtClean="0">
+                          <a:solidFill>
+                            <a:schemeClr val="bg1"/>
+                          </a:solidFill>
+                        </a:rPr>
+                        <a:t>ription</a:t>
+                      </a:r>
+                      <a:endParaRPr lang="en-US" sz="1400" b="1" dirty="0">
+                        <a:solidFill>
+                          <a:schemeClr val="bg1"/>
+                        </a:solidFill>
+                      </a:endParaRPr>
+                    </a:p>
+                  </a:txBody>
+                  <a:tcPr anchor="ctr">
+                    <a:lnL w="12700" cmpd="sng">
+                      <a:noFill/>
+                    </a:lnL>
+                    <a:lnR w="12700" cmpd="sng">
+                      <a:noFill/>
+                    </a:lnR>
+                    <a:lnT w="9525" cap="flat" cmpd="sng" algn="ctr">
+                      <a:solidFill>
+                        <a:srgbClr val="E40121"/>
+                      </a:solidFill>
+                      <a:prstDash val="solid"/>
+                      <a:round/>
+                      <a:headEnd type="none" w="med" len="med"/>
+                      <a:tailEnd type="none" w="med" len="med"/>
+                    </a:lnT>
+                    <a:lnB w="9525" cap="flat" cmpd="sng" algn="ctr">
+                      <a:solidFill>
+                        <a:srgbClr val="E40121"/>
+                      </a:solidFill>
+                      <a:prstDash val="solid"/>
+                      <a:round/>
+                      <a:headEnd type="none" w="med" len="med"/>
+                      <a:tailEnd type="none" w="med" len="med"/>
+                    </a:lnB>
+                    <a:solidFill>
+                      <a:srgbClr val="E40121"/>
+                    </a:solidFill>
+                  </a:tcPr>
+                </a:tc>
+              </a:tr>
+              <a:tr h="205456">
+                <a:tc>
+                  <a:txBody>
+                    <a:bodyPr/>
+                    <a:lstStyle/>
+                    <a:p>
+                      <a:r>
+                        <a:rPr lang="en-US" sz="1400" b="1" dirty="0" smtClean="0">
+                          <a:solidFill>
+                            <a:schemeClr val="tx1"/>
+                          </a:solidFill>
+                        </a:rPr>
+                        <a:t>ID</a:t>
+                      </a:r>
+                      <a:endParaRPr lang="en-US" sz="1400" b="1" dirty="0">
+                        <a:solidFill>
+                          <a:schemeClr val="tx1"/>
+                        </a:solidFill>
+                      </a:endParaRPr>
+                    </a:p>
+                  </a:txBody>
+                  <a:tcPr anchor="ctr">
+                    <a:lnL w="9525" cap="flat" cmpd="sng" algn="ctr">
+                      <a:solidFill>
+                        <a:srgbClr val="E40121"/>
+                      </a:solidFill>
+                      <a:prstDash val="solid"/>
+                      <a:round/>
+                      <a:headEnd type="none" w="med" len="med"/>
+                      <a:tailEnd type="none" w="med" len="med"/>
+                    </a:lnL>
+                    <a:lnR w="9525" cap="flat" cmpd="sng" algn="ctr">
+                      <a:solidFill>
+                        <a:srgbClr val="E40121"/>
+                      </a:solidFill>
+                      <a:prstDash val="solid"/>
+                      <a:round/>
+                      <a:headEnd type="none" w="med" len="med"/>
+                      <a:tailEnd type="none" w="med" len="med"/>
+                    </a:lnR>
+                    <a:lnT w="9525" cap="flat" cmpd="sng" algn="ctr">
+                      <a:solidFill>
+                        <a:srgbClr val="E40121"/>
+                      </a:solidFill>
+                      <a:prstDash val="solid"/>
+                      <a:round/>
+                      <a:headEnd type="none" w="med" len="med"/>
+                      <a:tailEnd type="none" w="med" len="med"/>
+                    </a:lnT>
+                    <a:lnB w="9525" cap="flat" cmpd="sng" algn="ctr">
+                      <a:solidFill>
+                        <a:srgbClr val="E40121"/>
+                      </a:solidFill>
+                      <a:prstDash val="solid"/>
+                      <a:round/>
+                      <a:headEnd type="none" w="med" len="med"/>
+                      <a:tailEnd type="none" w="med" len="med"/>
+                    </a:lnB>
+                    <a:noFill/>
+                  </a:tcPr>
+                </a:tc>
+                <a:tc>
+                  <a:txBody>
+                    <a:bodyPr/>
+                    <a:lstStyle/>
+                    <a:p>
+                      <a:pPr marL="0" marR="0" indent="0" algn="l" defTabSz="457200" rtl="0" eaLnBrk="1" fontAlgn="auto" latinLnBrk="0" hangingPunct="1">
+                        <a:lnSpc>
+                          <a:spcPct val="100000"/>
+                        </a:lnSpc>
+                        <a:spcBef>
+                          <a:spcPts val="0"/>
+                        </a:spcBef>
+                        <a:spcAft>
+                          <a:spcPts val="0"/>
+                        </a:spcAft>
+                        <a:buClrTx/>
+                        <a:buSzTx/>
+                        <a:buFontTx/>
+                        <a:buNone/>
+                        <a:tabLst/>
+                        <a:defRPr/>
+                      </a:pPr>
+                      <a:r>
+                        <a:rPr lang="en-US" sz="1400" dirty="0" smtClean="0"/>
+                        <a:t>The bucket-unique identifier</a:t>
+                      </a:r>
+                    </a:p>
+                  </a:txBody>
+                  <a:tcPr>
+                    <a:lnL w="9525" cap="flat" cmpd="sng" algn="ctr">
+                      <a:solidFill>
+                        <a:srgbClr val="E40121"/>
+                      </a:solidFill>
+                      <a:prstDash val="solid"/>
+                      <a:round/>
+                      <a:headEnd type="none" w="med" len="med"/>
+                      <a:tailEnd type="none" w="med" len="med"/>
+                    </a:lnL>
+                    <a:lnR w="9525" cap="flat" cmpd="sng" algn="ctr">
+                      <a:solidFill>
+                        <a:srgbClr val="E40121"/>
+                      </a:solidFill>
+                      <a:prstDash val="solid"/>
+                      <a:round/>
+                      <a:headEnd type="none" w="med" len="med"/>
+                      <a:tailEnd type="none" w="med" len="med"/>
+                    </a:lnR>
+                    <a:lnT w="9525" cap="flat" cmpd="sng" algn="ctr">
+                      <a:solidFill>
+                        <a:srgbClr val="E40121"/>
+                      </a:solidFill>
+                      <a:prstDash val="solid"/>
+                      <a:round/>
+                      <a:headEnd type="none" w="med" len="med"/>
+                      <a:tailEnd type="none" w="med" len="med"/>
+                    </a:lnT>
+                    <a:lnB w="9525" cap="flat" cmpd="sng" algn="ctr">
+                      <a:solidFill>
+                        <a:srgbClr val="E40121"/>
+                      </a:solidFill>
+                      <a:prstDash val="solid"/>
+                      <a:round/>
+                      <a:headEnd type="none" w="med" len="med"/>
+                      <a:tailEnd type="none" w="med" len="med"/>
+                    </a:lnB>
+                    <a:noFill/>
+                  </a:tcPr>
+                </a:tc>
+              </a:tr>
+              <a:tr h="205456">
+                <a:tc>
+                  <a:txBody>
+                    <a:bodyPr/>
+                    <a:lstStyle/>
+                    <a:p>
+                      <a:r>
+                        <a:rPr lang="en-US" sz="1400" b="1" dirty="0" smtClean="0">
+                          <a:solidFill>
+                            <a:schemeClr val="tx1"/>
+                          </a:solidFill>
+                        </a:rPr>
+                        <a:t>Content</a:t>
+                      </a:r>
+                      <a:endParaRPr lang="en-US" sz="1400" b="1" dirty="0">
+                        <a:solidFill>
+                          <a:schemeClr val="tx1"/>
+                        </a:solidFill>
+                      </a:endParaRPr>
+                    </a:p>
+                  </a:txBody>
+                  <a:tcPr>
+                    <a:lnL w="9525" cap="flat" cmpd="sng" algn="ctr">
+                      <a:solidFill>
+                        <a:srgbClr val="E40121"/>
+                      </a:solidFill>
+                      <a:prstDash val="solid"/>
+                      <a:round/>
+                      <a:headEnd type="none" w="med" len="med"/>
+                      <a:tailEnd type="none" w="med" len="med"/>
+                    </a:lnL>
+                    <a:lnR w="9525" cap="flat" cmpd="sng" algn="ctr">
+                      <a:solidFill>
+                        <a:srgbClr val="E40121"/>
+                      </a:solidFill>
+                      <a:prstDash val="solid"/>
+                      <a:round/>
+                      <a:headEnd type="none" w="med" len="med"/>
+                      <a:tailEnd type="none" w="med" len="med"/>
+                    </a:lnR>
+                    <a:lnT w="9525" cap="flat" cmpd="sng" algn="ctr">
+                      <a:solidFill>
+                        <a:srgbClr val="E40121"/>
+                      </a:solidFill>
+                      <a:prstDash val="solid"/>
+                      <a:round/>
+                      <a:headEnd type="none" w="med" len="med"/>
+                      <a:tailEnd type="none" w="med" len="med"/>
+                    </a:lnT>
+                    <a:lnB w="9525" cap="flat" cmpd="sng" algn="ctr">
+                      <a:solidFill>
+                        <a:srgbClr val="E40121"/>
+                      </a:solidFill>
+                      <a:prstDash val="solid"/>
+                      <a:round/>
+                      <a:headEnd type="none" w="med" len="med"/>
+                      <a:tailEnd type="none" w="med" len="med"/>
+                    </a:lnB>
+                    <a:noFill/>
+                  </a:tcPr>
+                </a:tc>
+                <a:tc>
+                  <a:txBody>
+                    <a:bodyPr/>
+                    <a:lstStyle/>
+                    <a:p>
+                      <a:pPr marL="0" marR="0" indent="0" algn="l" defTabSz="457200" rtl="0" eaLnBrk="1" fontAlgn="auto" latinLnBrk="0" hangingPunct="1">
+                        <a:lnSpc>
+                          <a:spcPct val="100000"/>
+                        </a:lnSpc>
+                        <a:spcBef>
+                          <a:spcPts val="0"/>
+                        </a:spcBef>
+                        <a:spcAft>
+                          <a:spcPts val="0"/>
+                        </a:spcAft>
+                        <a:buClrTx/>
+                        <a:buSzTx/>
+                        <a:buFontTx/>
+                        <a:buNone/>
+                        <a:tabLst/>
+                        <a:defRPr/>
+                      </a:pPr>
+                      <a:r>
+                        <a:rPr lang="en-US" sz="1400" dirty="0" smtClean="0"/>
+                        <a:t>The value that is stored</a:t>
+                      </a:r>
+                    </a:p>
+                  </a:txBody>
+                  <a:tcPr>
+                    <a:lnL w="9525" cap="flat" cmpd="sng" algn="ctr">
+                      <a:solidFill>
+                        <a:srgbClr val="E40121"/>
+                      </a:solidFill>
+                      <a:prstDash val="solid"/>
+                      <a:round/>
+                      <a:headEnd type="none" w="med" len="med"/>
+                      <a:tailEnd type="none" w="med" len="med"/>
+                    </a:lnL>
+                    <a:lnR w="9525" cap="flat" cmpd="sng" algn="ctr">
+                      <a:solidFill>
+                        <a:srgbClr val="E40121"/>
+                      </a:solidFill>
+                      <a:prstDash val="solid"/>
+                      <a:round/>
+                      <a:headEnd type="none" w="med" len="med"/>
+                      <a:tailEnd type="none" w="med" len="med"/>
+                    </a:lnR>
+                    <a:lnT w="9525" cap="flat" cmpd="sng" algn="ctr">
+                      <a:solidFill>
+                        <a:srgbClr val="E40121"/>
+                      </a:solidFill>
+                      <a:prstDash val="solid"/>
+                      <a:round/>
+                      <a:headEnd type="none" w="med" len="med"/>
+                      <a:tailEnd type="none" w="med" len="med"/>
+                    </a:lnT>
+                    <a:lnB w="9525" cap="flat" cmpd="sng" algn="ctr">
+                      <a:solidFill>
+                        <a:srgbClr val="E40121"/>
+                      </a:solidFill>
+                      <a:prstDash val="solid"/>
+                      <a:round/>
+                      <a:headEnd type="none" w="med" len="med"/>
+                      <a:tailEnd type="none" w="med" len="med"/>
+                    </a:lnB>
+                    <a:noFill/>
+                  </a:tcPr>
+                </a:tc>
+              </a:tr>
+              <a:tr h="205456">
+                <a:tc>
+                  <a:txBody>
+                    <a:bodyPr/>
+                    <a:lstStyle/>
+                    <a:p>
+                      <a:r>
+                        <a:rPr lang="en-US" sz="1400" b="1" dirty="0" smtClean="0">
+                          <a:solidFill>
+                            <a:schemeClr val="tx1"/>
+                          </a:solidFill>
+                        </a:rPr>
+                        <a:t>Expiry</a:t>
+                      </a:r>
+                      <a:endParaRPr lang="en-US" sz="1400" b="1" dirty="0">
+                        <a:solidFill>
+                          <a:schemeClr val="tx1"/>
+                        </a:solidFill>
+                      </a:endParaRPr>
+                    </a:p>
+                  </a:txBody>
+                  <a:tcPr>
+                    <a:lnL w="9525" cap="flat" cmpd="sng" algn="ctr">
+                      <a:solidFill>
+                        <a:srgbClr val="E40121"/>
+                      </a:solidFill>
+                      <a:prstDash val="solid"/>
+                      <a:round/>
+                      <a:headEnd type="none" w="med" len="med"/>
+                      <a:tailEnd type="none" w="med" len="med"/>
+                    </a:lnL>
+                    <a:lnR w="9525" cap="flat" cmpd="sng" algn="ctr">
+                      <a:solidFill>
+                        <a:srgbClr val="E40121"/>
+                      </a:solidFill>
+                      <a:prstDash val="solid"/>
+                      <a:round/>
+                      <a:headEnd type="none" w="med" len="med"/>
+                      <a:tailEnd type="none" w="med" len="med"/>
+                    </a:lnR>
+                    <a:lnT w="9525" cap="flat" cmpd="sng" algn="ctr">
+                      <a:solidFill>
+                        <a:srgbClr val="E40121"/>
+                      </a:solidFill>
+                      <a:prstDash val="solid"/>
+                      <a:round/>
+                      <a:headEnd type="none" w="med" len="med"/>
+                      <a:tailEnd type="none" w="med" len="med"/>
+                    </a:lnT>
+                    <a:lnB w="9525" cap="flat" cmpd="sng" algn="ctr">
+                      <a:solidFill>
+                        <a:srgbClr val="E40121"/>
+                      </a:solidFill>
+                      <a:prstDash val="solid"/>
+                      <a:round/>
+                      <a:headEnd type="none" w="med" len="med"/>
+                      <a:tailEnd type="none" w="med" len="med"/>
+                    </a:lnB>
+                    <a:noFill/>
+                  </a:tcPr>
+                </a:tc>
+                <a:tc>
+                  <a:txBody>
+                    <a:bodyPr/>
+                    <a:lstStyle/>
+                    <a:p>
+                      <a:pPr marL="0" marR="0" indent="0" algn="l" defTabSz="457200" rtl="0" eaLnBrk="1" fontAlgn="auto" latinLnBrk="0" hangingPunct="1">
+                        <a:lnSpc>
+                          <a:spcPct val="100000"/>
+                        </a:lnSpc>
+                        <a:spcBef>
+                          <a:spcPts val="0"/>
+                        </a:spcBef>
+                        <a:spcAft>
+                          <a:spcPts val="0"/>
+                        </a:spcAft>
+                        <a:buClrTx/>
+                        <a:buSzTx/>
+                        <a:buFontTx/>
+                        <a:buNone/>
+                        <a:tabLst/>
+                        <a:defRPr/>
+                      </a:pPr>
+                      <a:r>
+                        <a:rPr lang="en-US" sz="1400" dirty="0" smtClean="0"/>
+                        <a:t>An expiration</a:t>
+                      </a:r>
+                      <a:r>
+                        <a:rPr lang="en-US" sz="1400" baseline="0" dirty="0" smtClean="0"/>
+                        <a:t> time</a:t>
+                      </a:r>
+                      <a:endParaRPr lang="en-US" sz="1400" dirty="0" smtClean="0"/>
+                    </a:p>
+                  </a:txBody>
+                  <a:tcPr>
+                    <a:lnL w="9525" cap="flat" cmpd="sng" algn="ctr">
+                      <a:solidFill>
+                        <a:srgbClr val="E40121"/>
+                      </a:solidFill>
+                      <a:prstDash val="solid"/>
+                      <a:round/>
+                      <a:headEnd type="none" w="med" len="med"/>
+                      <a:tailEnd type="none" w="med" len="med"/>
+                    </a:lnL>
+                    <a:lnR w="9525" cap="flat" cmpd="sng" algn="ctr">
+                      <a:solidFill>
+                        <a:srgbClr val="E40121"/>
+                      </a:solidFill>
+                      <a:prstDash val="solid"/>
+                      <a:round/>
+                      <a:headEnd type="none" w="med" len="med"/>
+                      <a:tailEnd type="none" w="med" len="med"/>
+                    </a:lnR>
+                    <a:lnT w="9525" cap="flat" cmpd="sng" algn="ctr">
+                      <a:solidFill>
+                        <a:srgbClr val="E40121"/>
+                      </a:solidFill>
+                      <a:prstDash val="solid"/>
+                      <a:round/>
+                      <a:headEnd type="none" w="med" len="med"/>
+                      <a:tailEnd type="none" w="med" len="med"/>
+                    </a:lnT>
+                    <a:lnB w="9525" cap="flat" cmpd="sng" algn="ctr">
+                      <a:solidFill>
+                        <a:srgbClr val="E40121"/>
+                      </a:solidFill>
+                      <a:prstDash val="solid"/>
+                      <a:round/>
+                      <a:headEnd type="none" w="med" len="med"/>
+                      <a:tailEnd type="none" w="med" len="med"/>
+                    </a:lnB>
+                    <a:noFill/>
+                  </a:tcPr>
+                </a:tc>
+              </a:tr>
+              <a:tr h="205456">
+                <a:tc>
+                  <a:txBody>
+                    <a:bodyPr/>
+                    <a:lstStyle/>
+                    <a:p>
+                      <a:r>
+                        <a:rPr lang="en-US" sz="1400" b="1" dirty="0" smtClean="0">
+                          <a:solidFill>
+                            <a:schemeClr val="tx1"/>
+                          </a:solidFill>
+                        </a:rPr>
+                        <a:t>CAS</a:t>
+                      </a:r>
+                      <a:endParaRPr lang="en-US" sz="1400" b="1" dirty="0">
+                        <a:solidFill>
+                          <a:schemeClr val="tx1"/>
+                        </a:solidFill>
+                      </a:endParaRPr>
+                    </a:p>
+                  </a:txBody>
+                  <a:tcPr>
+                    <a:lnL w="9525" cap="flat" cmpd="sng" algn="ctr">
+                      <a:solidFill>
+                        <a:srgbClr val="E40121"/>
+                      </a:solidFill>
+                      <a:prstDash val="solid"/>
+                      <a:round/>
+                      <a:headEnd type="none" w="med" len="med"/>
+                      <a:tailEnd type="none" w="med" len="med"/>
+                    </a:lnL>
+                    <a:lnR w="9525" cap="flat" cmpd="sng" algn="ctr">
+                      <a:solidFill>
+                        <a:srgbClr val="E40121"/>
+                      </a:solidFill>
+                      <a:prstDash val="solid"/>
+                      <a:round/>
+                      <a:headEnd type="none" w="med" len="med"/>
+                      <a:tailEnd type="none" w="med" len="med"/>
+                    </a:lnR>
+                    <a:lnT w="9525" cap="flat" cmpd="sng" algn="ctr">
+                      <a:solidFill>
+                        <a:srgbClr val="E40121"/>
+                      </a:solidFill>
+                      <a:prstDash val="solid"/>
+                      <a:round/>
+                      <a:headEnd type="none" w="med" len="med"/>
+                      <a:tailEnd type="none" w="med" len="med"/>
+                    </a:lnT>
+                    <a:lnB w="9525" cap="flat" cmpd="sng" algn="ctr">
+                      <a:solidFill>
+                        <a:srgbClr val="E40121"/>
+                      </a:solidFill>
+                      <a:prstDash val="solid"/>
+                      <a:round/>
+                      <a:headEnd type="none" w="med" len="med"/>
+                      <a:tailEnd type="none" w="med" len="med"/>
+                    </a:lnB>
+                    <a:noFill/>
+                  </a:tcPr>
+                </a:tc>
+                <a:tc>
+                  <a:txBody>
+                    <a:bodyPr/>
+                    <a:lstStyle/>
+                    <a:p>
+                      <a:pPr marL="0" marR="0" indent="0" algn="l" defTabSz="457200" rtl="0" eaLnBrk="1" fontAlgn="auto" latinLnBrk="0" hangingPunct="1">
+                        <a:lnSpc>
+                          <a:spcPct val="100000"/>
+                        </a:lnSpc>
+                        <a:spcBef>
+                          <a:spcPts val="0"/>
+                        </a:spcBef>
+                        <a:spcAft>
+                          <a:spcPts val="0"/>
+                        </a:spcAft>
+                        <a:buClrTx/>
+                        <a:buSzTx/>
+                        <a:buFontTx/>
+                        <a:buNone/>
+                        <a:tabLst/>
+                        <a:defRPr/>
+                      </a:pPr>
+                      <a:r>
+                        <a:rPr lang="en-US" sz="1400" dirty="0" smtClean="0"/>
+                        <a:t>The Compare-And-Swap</a:t>
+                      </a:r>
+                      <a:r>
+                        <a:rPr lang="en-US" sz="1400" baseline="0" dirty="0" smtClean="0"/>
+                        <a:t> identifier</a:t>
+                      </a:r>
+                      <a:endParaRPr lang="en-US" sz="1400" dirty="0" smtClean="0"/>
+                    </a:p>
+                  </a:txBody>
+                  <a:tcPr>
+                    <a:lnL w="9525" cap="flat" cmpd="sng" algn="ctr">
+                      <a:solidFill>
+                        <a:srgbClr val="E40121"/>
+                      </a:solidFill>
+                      <a:prstDash val="solid"/>
+                      <a:round/>
+                      <a:headEnd type="none" w="med" len="med"/>
+                      <a:tailEnd type="none" w="med" len="med"/>
+                    </a:lnL>
+                    <a:lnR w="9525" cap="flat" cmpd="sng" algn="ctr">
+                      <a:solidFill>
+                        <a:srgbClr val="E40121"/>
+                      </a:solidFill>
+                      <a:prstDash val="solid"/>
+                      <a:round/>
+                      <a:headEnd type="none" w="med" len="med"/>
+                      <a:tailEnd type="none" w="med" len="med"/>
+                    </a:lnR>
+                    <a:lnT w="9525" cap="flat" cmpd="sng" algn="ctr">
+                      <a:solidFill>
+                        <a:srgbClr val="E40121"/>
+                      </a:solidFill>
+                      <a:prstDash val="solid"/>
+                      <a:round/>
+                      <a:headEnd type="none" w="med" len="med"/>
+                      <a:tailEnd type="none" w="med" len="med"/>
+                    </a:lnT>
+                    <a:lnB w="9525" cap="flat" cmpd="sng" algn="ctr">
+                      <a:solidFill>
+                        <a:srgbClr val="E40121"/>
+                      </a:solidFill>
+                      <a:prstDash val="solid"/>
+                      <a:round/>
+                      <a:headEnd type="none" w="med" len="med"/>
+                      <a:tailEnd type="none" w="med" len="med"/>
+                    </a:lnB>
+                    <a:noFill/>
+                  </a:tcPr>
+                </a:tc>
+              </a:tr>
+            </a:tbl>
+          </a:graphicData>
+        </a:graphic>
+      </p:graphicFrame>
+    </p:spTree>
+    <p:extLst>
+      <p:ext uri="{BB962C8B-B14F-4D97-AF65-F5344CB8AC3E}">
+        <p14:creationId xmlns:p14="http://schemas.microsoft.com/office/powerpoint/2010/main" val="636974870"/>
+      </p:ext>
+    </p:extLst>
+  </p:cSld>
+  <p:clrMapOvr>
+    <a:masterClrMapping/>
+  </p:clrMapOvr>
+  <p:timing>
+    <p:tnLst>
+      <p:par>
+        <p:cTn xmlns:p14="http://schemas.microsoft.com/office/powerpoint/2010/main" id="1" dur="indefinite" restart="never" nodeType="tmRoot"/>
+      </p:par>
+    </p:tnLst>
+  </p:timing>
 </p:sld>
 </file>
 

</xml_diff>